<commit_message>
Ajout des choses pour la présentation
</commit_message>
<xml_diff>
--- a/Documentation/Présentation.pptx
+++ b/Documentation/Présentation.pptx
@@ -9,6 +9,11 @@
     <p:sldId id="257" r:id="rId3"/>
     <p:sldId id="258" r:id="rId4"/>
     <p:sldId id="259" r:id="rId5"/>
+    <p:sldId id="263" r:id="rId6"/>
+    <p:sldId id="260" r:id="rId7"/>
+    <p:sldId id="261" r:id="rId8"/>
+    <p:sldId id="264" r:id="rId9"/>
+    <p:sldId id="265" r:id="rId10"/>
   </p:sldIdLst>
   <p:sldSz cx="12192000" cy="6858000"/>
   <p:notesSz cx="6858000" cy="9144000"/>
@@ -107,6 +112,11 @@
       </a:defRPr>
     </a:lvl9pPr>
   </p:defaultTextStyle>
+  <p:extLst>
+    <p:ext uri="{EFAFB233-063F-42B5-8137-9DF3F51BA10A}">
+      <p15:sldGuideLst xmlns:p15="http://schemas.microsoft.com/office/powerpoint/2012/main"/>
+    </p:ext>
+  </p:extLst>
 </p:presentation>
 </file>
 
@@ -205,7 +215,7 @@
           <a:effectLst/>
           <a:extLst>
             <a:ext uri="{91240B29-F687-4f45-9708-019B960494DF}">
-              <a14:hiddenLine xmlns:a14="http://schemas.microsoft.com/office/drawing/2010/main" xmlns="" w="9525">
+              <a14:hiddenLine xmlns="" xmlns:a14="http://schemas.microsoft.com/office/drawing/2010/main" w="9525">
                 <a:solidFill>
                   <a:srgbClr val="000000"/>
                 </a:solidFill>
@@ -398,7 +408,7 @@
             <a:fld id="{08B9EBBA-996F-894A-B54A-D6246ED52CEA}" type="datetimeFigureOut">
               <a:rPr lang="en-US" dirty="0"/>
               <a:pPr/>
-              <a:t>4/17/18</a:t>
+              <a:t>4/19/18</a:t>
             </a:fld>
             <a:endParaRPr lang="en-US" dirty="0"/>
           </a:p>
@@ -713,7 +723,7 @@
             <a:fld id="{18C79C5D-2A6F-F04D-97DA-BEF2467B64E4}" type="datetimeFigureOut">
               <a:rPr lang="en-US" dirty="0"/>
               <a:pPr/>
-              <a:t>4/17/18</a:t>
+              <a:t>4/19/18</a:t>
             </a:fld>
             <a:endParaRPr lang="en-US" dirty="0"/>
           </a:p>
@@ -1198,7 +1208,7 @@
             <a:fld id="{8DFA1846-DA80-1C48-A609-854EA85C59AD}" type="datetimeFigureOut">
               <a:rPr lang="en-US" dirty="0"/>
               <a:pPr/>
-              <a:t>4/17/18</a:t>
+              <a:t>4/19/18</a:t>
             </a:fld>
             <a:endParaRPr lang="en-US" dirty="0"/>
           </a:p>
@@ -1564,7 +1574,7 @@
             <a:fld id="{FBF54567-0DE4-3F47-BF90-CB84690072F9}" type="datetimeFigureOut">
               <a:rPr lang="en-US" dirty="0"/>
               <a:pPr/>
-              <a:t>4/17/18</a:t>
+              <a:t>4/19/18</a:t>
             </a:fld>
             <a:endParaRPr lang="en-US" dirty="0"/>
           </a:p>
@@ -1715,7 +1725,7 @@
           <a:ln/>
           <a:extLst>
             <a:ext uri="{91240B29-F687-4f45-9708-019B960494DF}">
-              <a14:hiddenLine xmlns:a14="http://schemas.microsoft.com/office/drawing/2010/main" xmlns="" w="9525">
+              <a14:hiddenLine xmlns="" xmlns:a14="http://schemas.microsoft.com/office/drawing/2010/main" w="9525">
                 <a:solidFill>
                   <a:srgbClr val="000000"/>
                 </a:solidFill>
@@ -1834,7 +1844,7 @@
             <a:fld id="{C6C52C72-DE31-F449-A4ED-4C594FD91407}" type="datetimeFigureOut">
               <a:rPr lang="en-US" dirty="0"/>
               <a:pPr/>
-              <a:t>4/17/18</a:t>
+              <a:t>4/19/18</a:t>
             </a:fld>
             <a:endParaRPr lang="en-US" dirty="0"/>
           </a:p>
@@ -1987,7 +1997,7 @@
           <a:ln/>
           <a:extLst>
             <a:ext uri="{91240B29-F687-4f45-9708-019B960494DF}">
-              <a14:hiddenLine xmlns:a14="http://schemas.microsoft.com/office/drawing/2010/main" xmlns="" w="9525">
+              <a14:hiddenLine xmlns="" xmlns:a14="http://schemas.microsoft.com/office/drawing/2010/main" w="9525">
                 <a:solidFill>
                   <a:srgbClr val="000000"/>
                 </a:solidFill>
@@ -2116,7 +2126,7 @@
             <a:fld id="{ED62726E-379B-B349-9EED-81ED093FA806}" type="datetimeFigureOut">
               <a:rPr lang="en-US" dirty="0"/>
               <a:pPr/>
-              <a:t>4/17/18</a:t>
+              <a:t>4/19/18</a:t>
             </a:fld>
             <a:endParaRPr lang="en-US" dirty="0"/>
           </a:p>
@@ -2267,7 +2277,7 @@
           <a:ln/>
           <a:extLst>
             <a:ext uri="{91240B29-F687-4f45-9708-019B960494DF}">
-              <a14:hiddenLine xmlns:a14="http://schemas.microsoft.com/office/drawing/2010/main" xmlns="" w="9525">
+              <a14:hiddenLine xmlns="" xmlns:a14="http://schemas.microsoft.com/office/drawing/2010/main" w="9525">
                 <a:solidFill>
                   <a:srgbClr val="000000"/>
                 </a:solidFill>
@@ -2396,7 +2406,7 @@
             <a:fld id="{9B3A1323-8D79-1946-B0D7-40001CF92E9D}" type="datetimeFigureOut">
               <a:rPr lang="en-US" dirty="0"/>
               <a:pPr/>
-              <a:t>4/17/18</a:t>
+              <a:t>4/19/18</a:t>
             </a:fld>
             <a:endParaRPr lang="en-US" dirty="0"/>
           </a:p>
@@ -2736,7 +2746,7 @@
             <a:fld id="{8DFA1846-DA80-1C48-A609-854EA85C59AD}" type="datetimeFigureOut">
               <a:rPr lang="en-US" dirty="0"/>
               <a:pPr/>
-              <a:t>4/17/18</a:t>
+              <a:t>4/19/18</a:t>
             </a:fld>
             <a:endParaRPr lang="en-US" dirty="0"/>
           </a:p>
@@ -2887,7 +2897,7 @@
           <a:ln/>
           <a:extLst>
             <a:ext uri="{91240B29-F687-4f45-9708-019B960494DF}">
-              <a14:hiddenLine xmlns:a14="http://schemas.microsoft.com/office/drawing/2010/main" xmlns="" w="9525">
+              <a14:hiddenLine xmlns="" xmlns:a14="http://schemas.microsoft.com/office/drawing/2010/main" w="9525">
                 <a:solidFill>
                   <a:srgbClr val="000000"/>
                 </a:solidFill>
@@ -3072,7 +3082,7 @@
             <a:fld id="{57302355-E14B-8545-A8F8-0FE83CC9D524}" type="datetimeFigureOut">
               <a:rPr lang="en-US" dirty="0"/>
               <a:pPr/>
-              <a:t>4/17/18</a:t>
+              <a:t>4/19/18</a:t>
             </a:fld>
             <a:endParaRPr lang="en-US" dirty="0"/>
           </a:p>
@@ -3223,7 +3233,7 @@
           <a:ln/>
           <a:extLst>
             <a:ext uri="{91240B29-F687-4f45-9708-019B960494DF}">
-              <a14:hiddenLine xmlns:a14="http://schemas.microsoft.com/office/drawing/2010/main" xmlns="" w="9525">
+              <a14:hiddenLine xmlns="" xmlns:a14="http://schemas.microsoft.com/office/drawing/2010/main" w="9525">
                 <a:solidFill>
                   <a:srgbClr val="000000"/>
                 </a:solidFill>
@@ -3546,7 +3556,7 @@
             <a:fld id="{02640F58-564D-2B4F-AE67-E407BA4FCF45}" type="datetimeFigureOut">
               <a:rPr lang="en-US" dirty="0"/>
               <a:pPr/>
-              <a:t>4/17/18</a:t>
+              <a:t>4/19/18</a:t>
             </a:fld>
             <a:endParaRPr lang="en-US" dirty="0"/>
           </a:p>
@@ -3697,7 +3707,7 @@
           <a:ln/>
           <a:extLst>
             <a:ext uri="{91240B29-F687-4f45-9708-019B960494DF}">
-              <a14:hiddenLine xmlns:a14="http://schemas.microsoft.com/office/drawing/2010/main" xmlns="" w="9525">
+              <a14:hiddenLine xmlns="" xmlns:a14="http://schemas.microsoft.com/office/drawing/2010/main" w="9525">
                 <a:solidFill>
                   <a:srgbClr val="000000"/>
                 </a:solidFill>
@@ -3764,7 +3774,7 @@
             <a:fld id="{F13A34C8-038E-2045-AF43-DF7DBB8E0E9E}" type="datetimeFigureOut">
               <a:rPr lang="en-US" dirty="0"/>
               <a:pPr/>
-              <a:t>4/17/18</a:t>
+              <a:t>4/19/18</a:t>
             </a:fld>
             <a:endParaRPr lang="en-US" dirty="0"/>
           </a:p>
@@ -3856,7 +3866,7 @@
             <a:fld id="{8818C68F-D26B-8F47-958C-23B49CF8A634}" type="datetimeFigureOut">
               <a:rPr lang="en-US" dirty="0"/>
               <a:pPr/>
-              <a:t>4/17/18</a:t>
+              <a:t>4/19/18</a:t>
             </a:fld>
             <a:endParaRPr lang="en-US" dirty="0"/>
           </a:p>
@@ -4120,7 +4130,7 @@
           <a:ln/>
           <a:extLst>
             <a:ext uri="{91240B29-F687-4f45-9708-019B960494DF}">
-              <a14:hiddenLine xmlns:a14="http://schemas.microsoft.com/office/drawing/2010/main" xmlns="" w="9525">
+              <a14:hiddenLine xmlns="" xmlns:a14="http://schemas.microsoft.com/office/drawing/2010/main" w="9525">
                 <a:solidFill>
                   <a:srgbClr val="000000"/>
                 </a:solidFill>
@@ -4320,7 +4330,7 @@
             <a:fld id="{D0DF5E60-9974-AC48-9591-99C2BB44B7CF}" type="datetimeFigureOut">
               <a:rPr lang="en-US" dirty="0"/>
               <a:pPr/>
-              <a:t>4/17/18</a:t>
+              <a:t>4/19/18</a:t>
             </a:fld>
             <a:endParaRPr lang="en-US" dirty="0"/>
           </a:p>
@@ -4630,7 +4640,7 @@
             <a:fld id="{18C79C5D-2A6F-F04D-97DA-BEF2467B64E4}" type="datetimeFigureOut">
               <a:rPr lang="en-US" dirty="0"/>
               <a:pPr/>
-              <a:t>4/17/18</a:t>
+              <a:t>4/19/18</a:t>
             </a:fld>
             <a:endParaRPr lang="en-US" dirty="0"/>
           </a:p>
@@ -4897,7 +4907,7 @@
             <a:fld id="{09B482E8-6E0E-1B4F-B1FD-C69DB9E858D9}" type="datetimeFigureOut">
               <a:rPr lang="en-US" dirty="0"/>
               <a:pPr/>
-              <a:t>4/17/18</a:t>
+              <a:t>4/19/18</a:t>
             </a:fld>
             <a:endParaRPr lang="en-US" dirty="0"/>
           </a:p>
@@ -5734,7 +5744,10 @@
           <a:bodyPr/>
           <a:lstStyle/>
           <a:p>
-            <a:endParaRPr lang="fr-FR" dirty="0"/>
+            <a:r>
+              <a:rPr lang="fr-FR" dirty="0"/>
+              <a:t>Objectifs du projet </a:t>
+            </a:r>
           </a:p>
         </p:txBody>
       </p:sp>
@@ -5815,10 +5828,159 @@
         </p:nvSpPr>
         <p:spPr/>
         <p:txBody>
-          <a:bodyPr/>
-          <a:lstStyle/>
-          <a:p>
-            <a:endParaRPr lang="fr-FR"/>
+          <a:bodyPr>
+            <a:normAutofit fontScale="62500" lnSpcReduction="20000"/>
+          </a:bodyPr>
+          <a:lstStyle/>
+          <a:p>
+            <a:pPr lvl="0"/>
+            <a:r>
+              <a:rPr lang="fr-FR" dirty="0"/>
+              <a:t>Modéliser et créer la base de données de l’application</a:t>
+            </a:r>
+            <a:endParaRPr lang="fr-CH" dirty="0"/>
+          </a:p>
+          <a:p>
+            <a:pPr lvl="0"/>
+            <a:r>
+              <a:rPr lang="fr-FR" dirty="0"/>
+              <a:t>Le site contiendra :</a:t>
+            </a:r>
+            <a:endParaRPr lang="fr-CH" dirty="0"/>
+          </a:p>
+          <a:p>
+            <a:pPr lvl="1"/>
+            <a:r>
+              <a:rPr lang="fr-FR" dirty="0"/>
+              <a:t>Un espace public avec :</a:t>
+            </a:r>
+            <a:endParaRPr lang="fr-CH" dirty="0"/>
+          </a:p>
+          <a:p>
+            <a:pPr lvl="2"/>
+            <a:r>
+              <a:rPr lang="fr-FR" dirty="0"/>
+              <a:t>Une page d’accueil</a:t>
+            </a:r>
+            <a:endParaRPr lang="fr-CH" dirty="0"/>
+          </a:p>
+          <a:p>
+            <a:pPr lvl="2"/>
+            <a:r>
+              <a:rPr lang="fr-FR" dirty="0"/>
+              <a:t>Une page de contact</a:t>
+            </a:r>
+            <a:endParaRPr lang="fr-CH" dirty="0"/>
+          </a:p>
+          <a:p>
+            <a:pPr lvl="2"/>
+            <a:r>
+              <a:rPr lang="fr-FR" dirty="0"/>
+              <a:t>Un formulaire de login (membre ou administrateur)	</a:t>
+            </a:r>
+            <a:endParaRPr lang="fr-CH" dirty="0"/>
+          </a:p>
+          <a:p>
+            <a:pPr lvl="2"/>
+            <a:r>
+              <a:rPr lang="fr-FR" dirty="0"/>
+              <a:t>Un formulaire d’inscription</a:t>
+            </a:r>
+            <a:endParaRPr lang="fr-CH" dirty="0"/>
+          </a:p>
+          <a:p>
+            <a:pPr lvl="1"/>
+            <a:r>
+              <a:rPr lang="fr-FR" dirty="0"/>
+              <a:t>Un espace membre :</a:t>
+            </a:r>
+            <a:endParaRPr lang="fr-CH" dirty="0"/>
+          </a:p>
+          <a:p>
+            <a:pPr lvl="2"/>
+            <a:r>
+              <a:rPr lang="fr-FR" dirty="0"/>
+              <a:t>Un formulaire pour choisir un produit et sa quantité, puis d’enregistrer une commande </a:t>
+            </a:r>
+            <a:endParaRPr lang="fr-CH" dirty="0"/>
+          </a:p>
+          <a:p>
+            <a:pPr lvl="1"/>
+            <a:r>
+              <a:rPr lang="fr-FR" dirty="0"/>
+              <a:t>Un espace administrateur</a:t>
+            </a:r>
+            <a:endParaRPr lang="fr-CH" dirty="0"/>
+          </a:p>
+          <a:p>
+            <a:pPr lvl="2"/>
+            <a:r>
+              <a:rPr lang="fr-FR" dirty="0"/>
+              <a:t>Un formulaire pour ajouter, modifier ou supprimer des produits à la vente</a:t>
+            </a:r>
+            <a:endParaRPr lang="fr-CH" dirty="0"/>
+          </a:p>
+          <a:p>
+            <a:pPr lvl="2"/>
+            <a:r>
+              <a:rPr lang="fr-FR" dirty="0"/>
+              <a:t>Une page permettant de consulter le stock actuel de chaque article</a:t>
+            </a:r>
+            <a:endParaRPr lang="fr-CH" dirty="0"/>
+          </a:p>
+          <a:p>
+            <a:pPr lvl="1"/>
+            <a:r>
+              <a:rPr lang="fr-FR" dirty="0"/>
+              <a:t>Une API permettant à une application mobile de consulter le stock d’un produit donné </a:t>
+            </a:r>
+            <a:endParaRPr lang="fr-CH" dirty="0"/>
+          </a:p>
+          <a:p>
+            <a:pPr lvl="0"/>
+            <a:r>
+              <a:rPr lang="fr-FR" dirty="0"/>
+              <a:t>Créer une application mobile avec un Framework </a:t>
+            </a:r>
+            <a:r>
+              <a:rPr lang="fr-FR" dirty="0" err="1"/>
+              <a:t>Ionic</a:t>
+            </a:r>
+            <a:r>
+              <a:rPr lang="fr-FR" dirty="0"/>
+              <a:t> (</a:t>
+            </a:r>
+            <a:r>
+              <a:rPr lang="fr-FR" u="sng" dirty="0">
+                <a:hlinkClick r:id="rId2"/>
+              </a:rPr>
+              <a:t>https://ionicframework.com</a:t>
+            </a:r>
+            <a:r>
+              <a:rPr lang="fr-FR" dirty="0"/>
+              <a:t>). L’application ne contient qu’une seule page avec :</a:t>
+            </a:r>
+            <a:endParaRPr lang="fr-CH" dirty="0"/>
+          </a:p>
+          <a:p>
+            <a:pPr lvl="1"/>
+            <a:r>
+              <a:rPr lang="fr-FR" dirty="0"/>
+              <a:t>Un bouton permettant de lancer le scan d’un QR-Code </a:t>
+            </a:r>
+            <a:endParaRPr lang="fr-CH" dirty="0"/>
+          </a:p>
+          <a:p>
+            <a:pPr lvl="1"/>
+            <a:r>
+              <a:rPr lang="fr-FR" dirty="0"/>
+              <a:t>Les informations de l’article s’afficheront </a:t>
+            </a:r>
+            <a:r>
+              <a:rPr lang="fr-FR"/>
+              <a:t>en dessous</a:t>
+            </a:r>
+            <a:endParaRPr lang="fr-CH"/>
           </a:p>
         </p:txBody>
       </p:sp>
@@ -5826,6 +5988,513 @@
     <p:extLst>
       <p:ext uri="{BB962C8B-B14F-4D97-AF65-F5344CB8AC3E}">
         <p14:creationId xmlns:p14="http://schemas.microsoft.com/office/powerpoint/2010/main" val="1669379113"/>
+      </p:ext>
+    </p:extLst>
+  </p:cSld>
+  <p:clrMapOvr>
+    <a:masterClrMapping/>
+  </p:clrMapOvr>
+</p:sld>
+</file>
+
+<file path=ppt/slides/slide5.xml><?xml version="1.0" encoding="utf-8"?>
+<p:sld xmlns:a="http://schemas.openxmlformats.org/drawingml/2006/main" xmlns:r="http://schemas.openxmlformats.org/officeDocument/2006/relationships" xmlns:p="http://schemas.openxmlformats.org/presentationml/2006/main">
+  <p:cSld>
+    <p:spTree>
+      <p:nvGrpSpPr>
+        <p:cNvPr id="1" name=""/>
+        <p:cNvGrpSpPr/>
+        <p:nvPr/>
+      </p:nvGrpSpPr>
+      <p:grpSpPr>
+        <a:xfrm>
+          <a:off x="0" y="0"/>
+          <a:ext cx="0" cy="0"/>
+          <a:chOff x="0" y="0"/>
+          <a:chExt cx="0" cy="0"/>
+        </a:xfrm>
+      </p:grpSpPr>
+      <p:sp>
+        <p:nvSpPr>
+          <p:cNvPr id="2" name="Titre 1">
+            <a:extLst>
+              <a:ext uri="{FF2B5EF4-FFF2-40B4-BE49-F238E27FC236}">
+                <a16:creationId xmlns:a16="http://schemas.microsoft.com/office/drawing/2014/main" id="{3A231524-80B7-5949-B3E6-9DC30893805B}"/>
+              </a:ext>
+            </a:extLst>
+          </p:cNvPr>
+          <p:cNvSpPr>
+            <a:spLocks noGrp="1"/>
+          </p:cNvSpPr>
+          <p:nvPr>
+            <p:ph type="title"/>
+          </p:nvPr>
+        </p:nvSpPr>
+        <p:spPr/>
+        <p:txBody>
+          <a:bodyPr/>
+          <a:lstStyle/>
+          <a:p>
+            <a:r>
+              <a:rPr lang="fr-FR" dirty="0"/>
+              <a:t>Déroulement</a:t>
+            </a:r>
+          </a:p>
+        </p:txBody>
+      </p:sp>
+      <p:sp>
+        <p:nvSpPr>
+          <p:cNvPr id="3" name="Espace réservé du contenu 2">
+            <a:extLst>
+              <a:ext uri="{FF2B5EF4-FFF2-40B4-BE49-F238E27FC236}">
+                <a16:creationId xmlns:a16="http://schemas.microsoft.com/office/drawing/2014/main" id="{B739A553-B529-0846-9A65-EFE8CD3C6372}"/>
+              </a:ext>
+            </a:extLst>
+          </p:cNvPr>
+          <p:cNvSpPr>
+            <a:spLocks noGrp="1"/>
+          </p:cNvSpPr>
+          <p:nvPr>
+            <p:ph idx="1"/>
+          </p:nvPr>
+        </p:nvSpPr>
+        <p:spPr/>
+        <p:txBody>
+          <a:bodyPr/>
+          <a:lstStyle/>
+          <a:p>
+            <a:endParaRPr lang="fr-FR" dirty="0"/>
+          </a:p>
+        </p:txBody>
+      </p:sp>
+      <p:sp>
+        <p:nvSpPr>
+          <p:cNvPr id="5" name="Rectangle à coins arrondis 4">
+            <a:extLst>
+              <a:ext uri="{FF2B5EF4-FFF2-40B4-BE49-F238E27FC236}">
+                <a16:creationId xmlns:a16="http://schemas.microsoft.com/office/drawing/2014/main" id="{BCC53A2B-3A97-BC4F-8416-831BA129DF11}"/>
+              </a:ext>
+            </a:extLst>
+          </p:cNvPr>
+          <p:cNvSpPr/>
+          <p:nvPr/>
+        </p:nvSpPr>
+        <p:spPr>
+          <a:xfrm>
+            <a:off x="4477839" y="3136694"/>
+            <a:ext cx="3136174" cy="2641727"/>
+          </a:xfrm>
+          <a:prstGeom prst="roundRect">
+            <a:avLst/>
+          </a:prstGeom>
+        </p:spPr>
+        <p:style>
+          <a:lnRef idx="2">
+            <a:schemeClr val="accent1">
+              <a:shade val="50000"/>
+            </a:schemeClr>
+          </a:lnRef>
+          <a:fillRef idx="1">
+            <a:schemeClr val="accent1"/>
+          </a:fillRef>
+          <a:effectRef idx="0">
+            <a:schemeClr val="accent1"/>
+          </a:effectRef>
+          <a:fontRef idx="minor">
+            <a:schemeClr val="lt1"/>
+          </a:fontRef>
+        </p:style>
+        <p:txBody>
+          <a:bodyPr rtlCol="0" anchor="ctr"/>
+          <a:lstStyle/>
+          <a:p>
+            <a:pPr algn="ctr"/>
+            <a:r>
+              <a:rPr lang="fr-FR" dirty="0"/>
+              <a:t>Fonctionnement du site </a:t>
+            </a:r>
+          </a:p>
+        </p:txBody>
+      </p:sp>
+    </p:spTree>
+    <p:extLst>
+      <p:ext uri="{BB962C8B-B14F-4D97-AF65-F5344CB8AC3E}">
+        <p14:creationId xmlns:p14="http://schemas.microsoft.com/office/powerpoint/2010/main" val="3944030250"/>
+      </p:ext>
+    </p:extLst>
+  </p:cSld>
+  <p:clrMapOvr>
+    <a:masterClrMapping/>
+  </p:clrMapOvr>
+</p:sld>
+</file>
+
+<file path=ppt/slides/slide6.xml><?xml version="1.0" encoding="utf-8"?>
+<p:sld xmlns:a="http://schemas.openxmlformats.org/drawingml/2006/main" xmlns:r="http://schemas.openxmlformats.org/officeDocument/2006/relationships" xmlns:p="http://schemas.openxmlformats.org/presentationml/2006/main">
+  <p:cSld>
+    <p:spTree>
+      <p:nvGrpSpPr>
+        <p:cNvPr id="1" name=""/>
+        <p:cNvGrpSpPr/>
+        <p:nvPr/>
+      </p:nvGrpSpPr>
+      <p:grpSpPr>
+        <a:xfrm>
+          <a:off x="0" y="0"/>
+          <a:ext cx="0" cy="0"/>
+          <a:chOff x="0" y="0"/>
+          <a:chExt cx="0" cy="0"/>
+        </a:xfrm>
+      </p:grpSpPr>
+      <p:sp>
+        <p:nvSpPr>
+          <p:cNvPr id="2" name="Titre 1">
+            <a:extLst>
+              <a:ext uri="{FF2B5EF4-FFF2-40B4-BE49-F238E27FC236}">
+                <a16:creationId xmlns:a16="http://schemas.microsoft.com/office/drawing/2014/main" id="{3257FA9A-D498-5A4A-8C8C-2FF4466D43F7}"/>
+              </a:ext>
+            </a:extLst>
+          </p:cNvPr>
+          <p:cNvSpPr>
+            <a:spLocks noGrp="1"/>
+          </p:cNvSpPr>
+          <p:nvPr>
+            <p:ph type="title"/>
+          </p:nvPr>
+        </p:nvSpPr>
+        <p:spPr/>
+        <p:txBody>
+          <a:bodyPr/>
+          <a:lstStyle/>
+          <a:p>
+            <a:r>
+              <a:rPr lang="fr-FR" dirty="0"/>
+              <a:t>Sommaire fonctionnement du site</a:t>
+            </a:r>
+          </a:p>
+        </p:txBody>
+      </p:sp>
+      <p:sp>
+        <p:nvSpPr>
+          <p:cNvPr id="3" name="Espace réservé du contenu 2">
+            <a:extLst>
+              <a:ext uri="{FF2B5EF4-FFF2-40B4-BE49-F238E27FC236}">
+                <a16:creationId xmlns:a16="http://schemas.microsoft.com/office/drawing/2014/main" id="{8C1F6B1D-E9FA-8242-AD00-52D0C69D330D}"/>
+              </a:ext>
+            </a:extLst>
+          </p:cNvPr>
+          <p:cNvSpPr>
+            <a:spLocks noGrp="1"/>
+          </p:cNvSpPr>
+          <p:nvPr>
+            <p:ph idx="1"/>
+          </p:nvPr>
+        </p:nvSpPr>
+        <p:spPr/>
+        <p:txBody>
+          <a:bodyPr/>
+          <a:lstStyle/>
+          <a:p>
+            <a:endParaRPr lang="fr-FR"/>
+          </a:p>
+        </p:txBody>
+      </p:sp>
+    </p:spTree>
+    <p:extLst>
+      <p:ext uri="{BB962C8B-B14F-4D97-AF65-F5344CB8AC3E}">
+        <p14:creationId xmlns:p14="http://schemas.microsoft.com/office/powerpoint/2010/main" val="3204152657"/>
+      </p:ext>
+    </p:extLst>
+  </p:cSld>
+  <p:clrMapOvr>
+    <a:masterClrMapping/>
+  </p:clrMapOvr>
+</p:sld>
+</file>
+
+<file path=ppt/slides/slide7.xml><?xml version="1.0" encoding="utf-8"?>
+<p:sld xmlns:a="http://schemas.openxmlformats.org/drawingml/2006/main" xmlns:r="http://schemas.openxmlformats.org/officeDocument/2006/relationships" xmlns:p="http://schemas.openxmlformats.org/presentationml/2006/main">
+  <p:cSld>
+    <p:spTree>
+      <p:nvGrpSpPr>
+        <p:cNvPr id="1" name=""/>
+        <p:cNvGrpSpPr/>
+        <p:nvPr/>
+      </p:nvGrpSpPr>
+      <p:grpSpPr>
+        <a:xfrm>
+          <a:off x="0" y="0"/>
+          <a:ext cx="0" cy="0"/>
+          <a:chOff x="0" y="0"/>
+          <a:chExt cx="0" cy="0"/>
+        </a:xfrm>
+      </p:grpSpPr>
+      <p:sp>
+        <p:nvSpPr>
+          <p:cNvPr id="2" name="Titre 1">
+            <a:extLst>
+              <a:ext uri="{FF2B5EF4-FFF2-40B4-BE49-F238E27FC236}">
+                <a16:creationId xmlns:a16="http://schemas.microsoft.com/office/drawing/2014/main" id="{A82AF29E-BCB1-7E43-B371-525D02459596}"/>
+              </a:ext>
+            </a:extLst>
+          </p:cNvPr>
+          <p:cNvSpPr>
+            <a:spLocks noGrp="1"/>
+          </p:cNvSpPr>
+          <p:nvPr>
+            <p:ph type="title"/>
+          </p:nvPr>
+        </p:nvSpPr>
+        <p:spPr/>
+        <p:txBody>
+          <a:bodyPr/>
+          <a:lstStyle/>
+          <a:p>
+            <a:endParaRPr lang="fr-FR"/>
+          </a:p>
+        </p:txBody>
+      </p:sp>
+      <p:sp>
+        <p:nvSpPr>
+          <p:cNvPr id="3" name="Espace réservé du contenu 2">
+            <a:extLst>
+              <a:ext uri="{FF2B5EF4-FFF2-40B4-BE49-F238E27FC236}">
+                <a16:creationId xmlns:a16="http://schemas.microsoft.com/office/drawing/2014/main" id="{9BDA6180-8A67-5E40-8F75-F4993C45AB09}"/>
+              </a:ext>
+            </a:extLst>
+          </p:cNvPr>
+          <p:cNvSpPr>
+            <a:spLocks noGrp="1"/>
+          </p:cNvSpPr>
+          <p:nvPr>
+            <p:ph idx="1"/>
+          </p:nvPr>
+        </p:nvSpPr>
+        <p:spPr/>
+        <p:txBody>
+          <a:bodyPr/>
+          <a:lstStyle/>
+          <a:p>
+            <a:endParaRPr lang="fr-FR"/>
+          </a:p>
+        </p:txBody>
+      </p:sp>
+    </p:spTree>
+    <p:extLst>
+      <p:ext uri="{BB962C8B-B14F-4D97-AF65-F5344CB8AC3E}">
+        <p14:creationId xmlns:p14="http://schemas.microsoft.com/office/powerpoint/2010/main" val="3171497421"/>
+      </p:ext>
+    </p:extLst>
+  </p:cSld>
+  <p:clrMapOvr>
+    <a:masterClrMapping/>
+  </p:clrMapOvr>
+</p:sld>
+</file>
+
+<file path=ppt/slides/slide8.xml><?xml version="1.0" encoding="utf-8"?>
+<p:sld xmlns:a="http://schemas.openxmlformats.org/drawingml/2006/main" xmlns:r="http://schemas.openxmlformats.org/officeDocument/2006/relationships" xmlns:p="http://schemas.openxmlformats.org/presentationml/2006/main">
+  <p:cSld>
+    <p:spTree>
+      <p:nvGrpSpPr>
+        <p:cNvPr id="1" name=""/>
+        <p:cNvGrpSpPr/>
+        <p:nvPr/>
+      </p:nvGrpSpPr>
+      <p:grpSpPr>
+        <a:xfrm>
+          <a:off x="0" y="0"/>
+          <a:ext cx="0" cy="0"/>
+          <a:chOff x="0" y="0"/>
+          <a:chExt cx="0" cy="0"/>
+        </a:xfrm>
+      </p:grpSpPr>
+      <p:sp>
+        <p:nvSpPr>
+          <p:cNvPr id="2" name="Titre 1">
+            <a:extLst>
+              <a:ext uri="{FF2B5EF4-FFF2-40B4-BE49-F238E27FC236}">
+                <a16:creationId xmlns:a16="http://schemas.microsoft.com/office/drawing/2014/main" id="{3A231524-80B7-5949-B3E6-9DC30893805B}"/>
+              </a:ext>
+            </a:extLst>
+          </p:cNvPr>
+          <p:cNvSpPr>
+            <a:spLocks noGrp="1"/>
+          </p:cNvSpPr>
+          <p:nvPr>
+            <p:ph type="title"/>
+          </p:nvPr>
+        </p:nvSpPr>
+        <p:spPr/>
+        <p:txBody>
+          <a:bodyPr/>
+          <a:lstStyle/>
+          <a:p>
+            <a:r>
+              <a:rPr lang="fr-FR" dirty="0"/>
+              <a:t>Déroulement</a:t>
+            </a:r>
+          </a:p>
+        </p:txBody>
+      </p:sp>
+      <p:sp>
+        <p:nvSpPr>
+          <p:cNvPr id="3" name="Espace réservé du contenu 2">
+            <a:extLst>
+              <a:ext uri="{FF2B5EF4-FFF2-40B4-BE49-F238E27FC236}">
+                <a16:creationId xmlns:a16="http://schemas.microsoft.com/office/drawing/2014/main" id="{B739A553-B529-0846-9A65-EFE8CD3C6372}"/>
+              </a:ext>
+            </a:extLst>
+          </p:cNvPr>
+          <p:cNvSpPr>
+            <a:spLocks noGrp="1"/>
+          </p:cNvSpPr>
+          <p:nvPr>
+            <p:ph idx="1"/>
+          </p:nvPr>
+        </p:nvSpPr>
+        <p:spPr/>
+        <p:txBody>
+          <a:bodyPr/>
+          <a:lstStyle/>
+          <a:p>
+            <a:endParaRPr lang="fr-FR" dirty="0"/>
+          </a:p>
+        </p:txBody>
+      </p:sp>
+      <p:sp>
+        <p:nvSpPr>
+          <p:cNvPr id="6" name="Rectangle à coins arrondis 5">
+            <a:extLst>
+              <a:ext uri="{FF2B5EF4-FFF2-40B4-BE49-F238E27FC236}">
+                <a16:creationId xmlns:a16="http://schemas.microsoft.com/office/drawing/2014/main" id="{184B17EE-6FBA-6149-B135-45DAD6C22B12}"/>
+              </a:ext>
+            </a:extLst>
+          </p:cNvPr>
+          <p:cNvSpPr/>
+          <p:nvPr/>
+        </p:nvSpPr>
+        <p:spPr>
+          <a:xfrm>
+            <a:off x="8594167" y="3136694"/>
+            <a:ext cx="3136174" cy="2641727"/>
+          </a:xfrm>
+          <a:prstGeom prst="roundRect">
+            <a:avLst/>
+          </a:prstGeom>
+        </p:spPr>
+        <p:style>
+          <a:lnRef idx="2">
+            <a:schemeClr val="accent1">
+              <a:shade val="50000"/>
+            </a:schemeClr>
+          </a:lnRef>
+          <a:fillRef idx="1">
+            <a:schemeClr val="accent1"/>
+          </a:fillRef>
+          <a:effectRef idx="0">
+            <a:schemeClr val="accent1"/>
+          </a:effectRef>
+          <a:fontRef idx="minor">
+            <a:schemeClr val="lt1"/>
+          </a:fontRef>
+        </p:style>
+        <p:txBody>
+          <a:bodyPr rtlCol="0" anchor="ctr"/>
+          <a:lstStyle/>
+          <a:p>
+            <a:pPr algn="ctr"/>
+            <a:r>
+              <a:rPr lang="fr-FR" dirty="0"/>
+              <a:t>Conclusion</a:t>
+            </a:r>
+          </a:p>
+        </p:txBody>
+      </p:sp>
+    </p:spTree>
+    <p:extLst>
+      <p:ext uri="{BB962C8B-B14F-4D97-AF65-F5344CB8AC3E}">
+        <p14:creationId xmlns:p14="http://schemas.microsoft.com/office/powerpoint/2010/main" val="212312981"/>
+      </p:ext>
+    </p:extLst>
+  </p:cSld>
+  <p:clrMapOvr>
+    <a:masterClrMapping/>
+  </p:clrMapOvr>
+</p:sld>
+</file>
+
+<file path=ppt/slides/slide9.xml><?xml version="1.0" encoding="utf-8"?>
+<p:sld xmlns:a="http://schemas.openxmlformats.org/drawingml/2006/main" xmlns:r="http://schemas.openxmlformats.org/officeDocument/2006/relationships" xmlns:p="http://schemas.openxmlformats.org/presentationml/2006/main">
+  <p:cSld>
+    <p:spTree>
+      <p:nvGrpSpPr>
+        <p:cNvPr id="1" name=""/>
+        <p:cNvGrpSpPr/>
+        <p:nvPr/>
+      </p:nvGrpSpPr>
+      <p:grpSpPr>
+        <a:xfrm>
+          <a:off x="0" y="0"/>
+          <a:ext cx="0" cy="0"/>
+          <a:chOff x="0" y="0"/>
+          <a:chExt cx="0" cy="0"/>
+        </a:xfrm>
+      </p:grpSpPr>
+      <p:sp>
+        <p:nvSpPr>
+          <p:cNvPr id="2" name="Titre 1">
+            <a:extLst>
+              <a:ext uri="{FF2B5EF4-FFF2-40B4-BE49-F238E27FC236}">
+                <a16:creationId xmlns:a16="http://schemas.microsoft.com/office/drawing/2014/main" id="{2A2D0E5B-08BF-2447-849B-7EF4C7E1AE34}"/>
+              </a:ext>
+            </a:extLst>
+          </p:cNvPr>
+          <p:cNvSpPr>
+            <a:spLocks noGrp="1"/>
+          </p:cNvSpPr>
+          <p:nvPr>
+            <p:ph type="title"/>
+          </p:nvPr>
+        </p:nvSpPr>
+        <p:spPr/>
+        <p:txBody>
+          <a:bodyPr/>
+          <a:lstStyle/>
+          <a:p>
+            <a:endParaRPr lang="fr-FR"/>
+          </a:p>
+        </p:txBody>
+      </p:sp>
+      <p:sp>
+        <p:nvSpPr>
+          <p:cNvPr id="3" name="Espace réservé du contenu 2">
+            <a:extLst>
+              <a:ext uri="{FF2B5EF4-FFF2-40B4-BE49-F238E27FC236}">
+                <a16:creationId xmlns:a16="http://schemas.microsoft.com/office/drawing/2014/main" id="{0C3D3EDC-1278-7E42-9277-4CDC395390A5}"/>
+              </a:ext>
+            </a:extLst>
+          </p:cNvPr>
+          <p:cNvSpPr>
+            <a:spLocks noGrp="1"/>
+          </p:cNvSpPr>
+          <p:nvPr>
+            <p:ph idx="1"/>
+          </p:nvPr>
+        </p:nvSpPr>
+        <p:spPr/>
+        <p:txBody>
+          <a:bodyPr/>
+          <a:lstStyle/>
+          <a:p>
+            <a:endParaRPr lang="fr-FR"/>
+          </a:p>
+        </p:txBody>
+      </p:sp>
+    </p:spTree>
+    <p:extLst>
+      <p:ext uri="{BB962C8B-B14F-4D97-AF65-F5344CB8AC3E}">
+        <p14:creationId xmlns:p14="http://schemas.microsoft.com/office/powerpoint/2010/main" val="3359474809"/>
       </p:ext>
     </p:extLst>
   </p:cSld>

</xml_diff>

<commit_message>
Ajout de nouvelles slides
</commit_message>
<xml_diff>
--- a/Documentation/Présentation.pptx
+++ b/Documentation/Présentation.pptx
@@ -7,15 +7,16 @@
   <p:sldIdLst>
     <p:sldId id="256" r:id="rId2"/>
     <p:sldId id="257" r:id="rId3"/>
-    <p:sldId id="259" r:id="rId4"/>
-    <p:sldId id="267" r:id="rId5"/>
-    <p:sldId id="268" r:id="rId6"/>
-    <p:sldId id="269" r:id="rId7"/>
-    <p:sldId id="263" r:id="rId8"/>
-    <p:sldId id="260" r:id="rId9"/>
-    <p:sldId id="261" r:id="rId10"/>
-    <p:sldId id="264" r:id="rId11"/>
-    <p:sldId id="265" r:id="rId12"/>
+    <p:sldId id="270" r:id="rId4"/>
+    <p:sldId id="273" r:id="rId5"/>
+    <p:sldId id="259" r:id="rId6"/>
+    <p:sldId id="267" r:id="rId7"/>
+    <p:sldId id="268" r:id="rId8"/>
+    <p:sldId id="269" r:id="rId9"/>
+    <p:sldId id="271" r:id="rId10"/>
+    <p:sldId id="261" r:id="rId11"/>
+    <p:sldId id="272" r:id="rId12"/>
+    <p:sldId id="265" r:id="rId13"/>
   </p:sldIdLst>
   <p:sldSz cx="12192000" cy="6858000"/>
   <p:notesSz cx="6858000" cy="9144000"/>
@@ -186,7 +187,7 @@
           </a:lstStyle>
           <a:p>
             <a:r>
-              <a:rPr lang="fr-FR" smtClean="0"/>
+              <a:rPr lang="fr-FR"/>
               <a:t>Modifiez le style du titre</a:t>
             </a:r>
             <a:endParaRPr lang="en-US" dirty="0"/>
@@ -261,7 +262,7 @@
           </a:lstStyle>
           <a:p>
             <a:r>
-              <a:rPr lang="fr-FR" smtClean="0"/>
+              <a:rPr lang="fr-FR"/>
               <a:t>Modifier le style des sous-titres du masque</a:t>
             </a:r>
             <a:endParaRPr lang="en-US" dirty="0"/>
@@ -286,7 +287,7 @@
             <a:fld id="{08B9EBBA-996F-894A-B54A-D6246ED52CEA}" type="datetimeFigureOut">
               <a:rPr lang="en-US" smtClean="0"/>
               <a:pPr/>
-              <a:t>4/19/2018</a:t>
+              <a:t>4/19/18</a:t>
             </a:fld>
             <a:endParaRPr lang="en-US" dirty="0"/>
           </a:p>
@@ -381,7 +382,7 @@
           <a:lstStyle/>
           <a:p>
             <a:r>
-              <a:rPr lang="fr-FR" smtClean="0"/>
+              <a:rPr lang="fr-FR"/>
               <a:t>Modifiez le style du titre</a:t>
             </a:r>
             <a:endParaRPr lang="en-US" dirty="0"/>
@@ -405,35 +406,35 @@
           <a:p>
             <a:pPr lvl="0"/>
             <a:r>
-              <a:rPr lang="fr-FR" smtClean="0"/>
+              <a:rPr lang="fr-FR"/>
               <a:t>Modifier les styles du texte du masque</a:t>
             </a:r>
           </a:p>
           <a:p>
             <a:pPr lvl="1"/>
             <a:r>
-              <a:rPr lang="fr-FR" smtClean="0"/>
+              <a:rPr lang="fr-FR"/>
               <a:t>Deuxième niveau</a:t>
             </a:r>
           </a:p>
           <a:p>
             <a:pPr lvl="2"/>
             <a:r>
-              <a:rPr lang="fr-FR" smtClean="0"/>
+              <a:rPr lang="fr-FR"/>
               <a:t>Troisième niveau</a:t>
             </a:r>
           </a:p>
           <a:p>
             <a:pPr lvl="3"/>
             <a:r>
-              <a:rPr lang="fr-FR" smtClean="0"/>
+              <a:rPr lang="fr-FR"/>
               <a:t>Quatrième niveau</a:t>
             </a:r>
           </a:p>
           <a:p>
             <a:pPr lvl="4"/>
             <a:r>
-              <a:rPr lang="fr-FR" smtClean="0"/>
+              <a:rPr lang="fr-FR"/>
               <a:t>Cinquième niveau</a:t>
             </a:r>
             <a:endParaRPr lang="en-US" dirty="0"/>
@@ -458,7 +459,7 @@
             <a:fld id="{C6C52C72-DE31-F449-A4ED-4C594FD91407}" type="datetimeFigureOut">
               <a:rPr lang="en-US" smtClean="0"/>
               <a:pPr/>
-              <a:t>4/19/2018</a:t>
+              <a:t>4/19/18</a:t>
             </a:fld>
             <a:endParaRPr lang="en-US" dirty="0"/>
           </a:p>
@@ -558,7 +559,7 @@
           <a:lstStyle/>
           <a:p>
             <a:r>
-              <a:rPr lang="fr-FR" smtClean="0"/>
+              <a:rPr lang="fr-FR"/>
               <a:t>Modifiez le style du titre</a:t>
             </a:r>
             <a:endParaRPr lang="en-US" dirty="0"/>
@@ -587,35 +588,35 @@
           <a:p>
             <a:pPr lvl="0"/>
             <a:r>
-              <a:rPr lang="fr-FR" smtClean="0"/>
+              <a:rPr lang="fr-FR"/>
               <a:t>Modifier les styles du texte du masque</a:t>
             </a:r>
           </a:p>
           <a:p>
             <a:pPr lvl="1"/>
             <a:r>
-              <a:rPr lang="fr-FR" smtClean="0"/>
+              <a:rPr lang="fr-FR"/>
               <a:t>Deuxième niveau</a:t>
             </a:r>
           </a:p>
           <a:p>
             <a:pPr lvl="2"/>
             <a:r>
-              <a:rPr lang="fr-FR" smtClean="0"/>
+              <a:rPr lang="fr-FR"/>
               <a:t>Troisième niveau</a:t>
             </a:r>
           </a:p>
           <a:p>
             <a:pPr lvl="3"/>
             <a:r>
-              <a:rPr lang="fr-FR" smtClean="0"/>
+              <a:rPr lang="fr-FR"/>
               <a:t>Quatrième niveau</a:t>
             </a:r>
           </a:p>
           <a:p>
             <a:pPr lvl="4"/>
             <a:r>
-              <a:rPr lang="fr-FR" smtClean="0"/>
+              <a:rPr lang="fr-FR"/>
               <a:t>Cinquième niveau</a:t>
             </a:r>
             <a:endParaRPr lang="en-US" dirty="0"/>
@@ -640,7 +641,7 @@
             <a:fld id="{ED62726E-379B-B349-9EED-81ED093FA806}" type="datetimeFigureOut">
               <a:rPr lang="en-US" smtClean="0"/>
               <a:pPr/>
-              <a:t>4/19/2018</a:t>
+              <a:t>4/19/18</a:t>
             </a:fld>
             <a:endParaRPr lang="en-US" dirty="0"/>
           </a:p>
@@ -735,7 +736,7 @@
           <a:lstStyle/>
           <a:p>
             <a:r>
-              <a:rPr lang="fr-FR" smtClean="0"/>
+              <a:rPr lang="fr-FR"/>
               <a:t>Modifiez le style du titre</a:t>
             </a:r>
             <a:endParaRPr lang="en-US" dirty="0"/>
@@ -759,35 +760,35 @@
           <a:p>
             <a:pPr lvl="0"/>
             <a:r>
-              <a:rPr lang="fr-FR" smtClean="0"/>
+              <a:rPr lang="fr-FR"/>
               <a:t>Modifier les styles du texte du masque</a:t>
             </a:r>
           </a:p>
           <a:p>
             <a:pPr lvl="1"/>
             <a:r>
-              <a:rPr lang="fr-FR" smtClean="0"/>
+              <a:rPr lang="fr-FR"/>
               <a:t>Deuxième niveau</a:t>
             </a:r>
           </a:p>
           <a:p>
             <a:pPr lvl="2"/>
             <a:r>
-              <a:rPr lang="fr-FR" smtClean="0"/>
+              <a:rPr lang="fr-FR"/>
               <a:t>Troisième niveau</a:t>
             </a:r>
           </a:p>
           <a:p>
             <a:pPr lvl="3"/>
             <a:r>
-              <a:rPr lang="fr-FR" smtClean="0"/>
+              <a:rPr lang="fr-FR"/>
               <a:t>Quatrième niveau</a:t>
             </a:r>
           </a:p>
           <a:p>
             <a:pPr lvl="4"/>
             <a:r>
-              <a:rPr lang="fr-FR" smtClean="0"/>
+              <a:rPr lang="fr-FR"/>
               <a:t>Cinquième niveau</a:t>
             </a:r>
             <a:endParaRPr lang="en-US" dirty="0"/>
@@ -812,7 +813,7 @@
             <a:fld id="{9B3A1323-8D79-1946-B0D7-40001CF92E9D}" type="datetimeFigureOut">
               <a:rPr lang="en-US" smtClean="0"/>
               <a:pPr/>
-              <a:t>4/19/2018</a:t>
+              <a:t>4/19/18</a:t>
             </a:fld>
             <a:endParaRPr lang="en-US" dirty="0"/>
           </a:p>
@@ -938,7 +939,7 @@
           </a:lstStyle>
           <a:p>
             <a:r>
-              <a:rPr lang="fr-FR" smtClean="0"/>
+              <a:rPr lang="fr-FR"/>
               <a:t>Modifiez le style du titre</a:t>
             </a:r>
             <a:endParaRPr lang="en-US" dirty="0"/>
@@ -1058,7 +1059,7 @@
           <a:p>
             <a:pPr lvl="0"/>
             <a:r>
-              <a:rPr lang="fr-FR" smtClean="0"/>
+              <a:rPr lang="fr-FR"/>
               <a:t>Modifier les styles du texte du masque</a:t>
             </a:r>
           </a:p>
@@ -1082,7 +1083,7 @@
             <a:fld id="{8DFA1846-DA80-1C48-A609-854EA85C59AD}" type="datetimeFigureOut">
               <a:rPr lang="en-US" smtClean="0"/>
               <a:pPr/>
-              <a:t>4/19/2018</a:t>
+              <a:t>4/19/18</a:t>
             </a:fld>
             <a:endParaRPr lang="en-US" dirty="0"/>
           </a:p>
@@ -1177,7 +1178,7 @@
           <a:lstStyle/>
           <a:p>
             <a:r>
-              <a:rPr lang="fr-FR" smtClean="0"/>
+              <a:rPr lang="fr-FR"/>
               <a:t>Modifiez le style du titre</a:t>
             </a:r>
             <a:endParaRPr lang="en-US" dirty="0"/>
@@ -1206,35 +1207,35 @@
           <a:p>
             <a:pPr lvl="0"/>
             <a:r>
-              <a:rPr lang="fr-FR" smtClean="0"/>
+              <a:rPr lang="fr-FR"/>
               <a:t>Modifier les styles du texte du masque</a:t>
             </a:r>
           </a:p>
           <a:p>
             <a:pPr lvl="1"/>
             <a:r>
-              <a:rPr lang="fr-FR" smtClean="0"/>
+              <a:rPr lang="fr-FR"/>
               <a:t>Deuxième niveau</a:t>
             </a:r>
           </a:p>
           <a:p>
             <a:pPr lvl="2"/>
             <a:r>
-              <a:rPr lang="fr-FR" smtClean="0"/>
+              <a:rPr lang="fr-FR"/>
               <a:t>Troisième niveau</a:t>
             </a:r>
           </a:p>
           <a:p>
             <a:pPr lvl="3"/>
             <a:r>
-              <a:rPr lang="fr-FR" smtClean="0"/>
+              <a:rPr lang="fr-FR"/>
               <a:t>Quatrième niveau</a:t>
             </a:r>
           </a:p>
           <a:p>
             <a:pPr lvl="4"/>
             <a:r>
-              <a:rPr lang="fr-FR" smtClean="0"/>
+              <a:rPr lang="fr-FR"/>
               <a:t>Cinquième niveau</a:t>
             </a:r>
             <a:endParaRPr lang="en-US" dirty="0"/>
@@ -1263,35 +1264,35 @@
           <a:p>
             <a:pPr lvl="0"/>
             <a:r>
-              <a:rPr lang="fr-FR" smtClean="0"/>
+              <a:rPr lang="fr-FR"/>
               <a:t>Modifier les styles du texte du masque</a:t>
             </a:r>
           </a:p>
           <a:p>
             <a:pPr lvl="1"/>
             <a:r>
-              <a:rPr lang="fr-FR" smtClean="0"/>
+              <a:rPr lang="fr-FR"/>
               <a:t>Deuxième niveau</a:t>
             </a:r>
           </a:p>
           <a:p>
             <a:pPr lvl="2"/>
             <a:r>
-              <a:rPr lang="fr-FR" smtClean="0"/>
+              <a:rPr lang="fr-FR"/>
               <a:t>Troisième niveau</a:t>
             </a:r>
           </a:p>
           <a:p>
             <a:pPr lvl="3"/>
             <a:r>
-              <a:rPr lang="fr-FR" smtClean="0"/>
+              <a:rPr lang="fr-FR"/>
               <a:t>Quatrième niveau</a:t>
             </a:r>
           </a:p>
           <a:p>
             <a:pPr lvl="4"/>
             <a:r>
-              <a:rPr lang="fr-FR" smtClean="0"/>
+              <a:rPr lang="fr-FR"/>
               <a:t>Cinquième niveau</a:t>
             </a:r>
             <a:endParaRPr lang="en-US" dirty="0"/>
@@ -1316,7 +1317,7 @@
             <a:fld id="{57302355-E14B-8545-A8F8-0FE83CC9D524}" type="datetimeFigureOut">
               <a:rPr lang="en-US" smtClean="0"/>
               <a:pPr/>
-              <a:t>4/19/2018</a:t>
+              <a:t>4/19/18</a:t>
             </a:fld>
             <a:endParaRPr lang="en-US" dirty="0"/>
           </a:p>
@@ -1462,7 +1463,7 @@
           <a:p>
             <a:pPr lvl="0"/>
             <a:r>
-              <a:rPr lang="fr-FR" smtClean="0"/>
+              <a:rPr lang="fr-FR"/>
               <a:t>Modifier les styles du texte du masque</a:t>
             </a:r>
           </a:p>
@@ -1490,35 +1491,35 @@
           <a:p>
             <a:pPr lvl="0"/>
             <a:r>
-              <a:rPr lang="fr-FR" smtClean="0"/>
+              <a:rPr lang="fr-FR"/>
               <a:t>Modifier les styles du texte du masque</a:t>
             </a:r>
           </a:p>
           <a:p>
             <a:pPr lvl="1"/>
             <a:r>
-              <a:rPr lang="fr-FR" smtClean="0"/>
+              <a:rPr lang="fr-FR"/>
               <a:t>Deuxième niveau</a:t>
             </a:r>
           </a:p>
           <a:p>
             <a:pPr lvl="2"/>
             <a:r>
-              <a:rPr lang="fr-FR" smtClean="0"/>
+              <a:rPr lang="fr-FR"/>
               <a:t>Troisième niveau</a:t>
             </a:r>
           </a:p>
           <a:p>
             <a:pPr lvl="3"/>
             <a:r>
-              <a:rPr lang="fr-FR" smtClean="0"/>
+              <a:rPr lang="fr-FR"/>
               <a:t>Quatrième niveau</a:t>
             </a:r>
           </a:p>
           <a:p>
             <a:pPr lvl="4"/>
             <a:r>
-              <a:rPr lang="fr-FR" smtClean="0"/>
+              <a:rPr lang="fr-FR"/>
               <a:t>Cinquième niveau</a:t>
             </a:r>
             <a:endParaRPr lang="en-US" dirty="0"/>
@@ -1551,35 +1552,35 @@
           <a:p>
             <a:pPr lvl="0"/>
             <a:r>
-              <a:rPr lang="fr-FR" smtClean="0"/>
+              <a:rPr lang="fr-FR"/>
               <a:t>Modifier les styles du texte du masque</a:t>
             </a:r>
           </a:p>
           <a:p>
             <a:pPr lvl="1"/>
             <a:r>
-              <a:rPr lang="fr-FR" smtClean="0"/>
+              <a:rPr lang="fr-FR"/>
               <a:t>Deuxième niveau</a:t>
             </a:r>
           </a:p>
           <a:p>
             <a:pPr lvl="2"/>
             <a:r>
-              <a:rPr lang="fr-FR" smtClean="0"/>
+              <a:rPr lang="fr-FR"/>
               <a:t>Troisième niveau</a:t>
             </a:r>
           </a:p>
           <a:p>
             <a:pPr lvl="3"/>
             <a:r>
-              <a:rPr lang="fr-FR" smtClean="0"/>
+              <a:rPr lang="fr-FR"/>
               <a:t>Quatrième niveau</a:t>
             </a:r>
           </a:p>
           <a:p>
             <a:pPr lvl="4"/>
             <a:r>
-              <a:rPr lang="fr-FR" smtClean="0"/>
+              <a:rPr lang="fr-FR"/>
               <a:t>Cinquième niveau</a:t>
             </a:r>
             <a:endParaRPr lang="en-US" dirty="0"/>
@@ -1653,7 +1654,7 @@
           <a:p>
             <a:pPr lvl="0"/>
             <a:r>
-              <a:rPr lang="fr-FR" smtClean="0"/>
+              <a:rPr lang="fr-FR"/>
               <a:t>Modifier les styles du texte du masque</a:t>
             </a:r>
           </a:p>
@@ -1677,7 +1678,7 @@
             <a:fld id="{09B482E8-6E0E-1B4F-B1FD-C69DB9E858D9}" type="datetimeFigureOut">
               <a:rPr lang="en-US" smtClean="0"/>
               <a:pPr/>
-              <a:t>4/19/2018</a:t>
+              <a:t>4/19/18</a:t>
             </a:fld>
             <a:endParaRPr lang="en-US" dirty="0"/>
           </a:p>
@@ -1742,7 +1743,7 @@
           <a:lstStyle/>
           <a:p>
             <a:r>
-              <a:rPr lang="fr-FR" smtClean="0"/>
+              <a:rPr lang="fr-FR"/>
               <a:t>Modifiez le style du titre</a:t>
             </a:r>
             <a:endParaRPr lang="en-US" dirty="0"/>
@@ -1796,7 +1797,7 @@
           <a:lstStyle/>
           <a:p>
             <a:r>
-              <a:rPr lang="fr-FR" smtClean="0"/>
+              <a:rPr lang="fr-FR"/>
               <a:t>Modifiez le style du titre</a:t>
             </a:r>
             <a:endParaRPr lang="en-US" dirty="0"/>
@@ -1821,7 +1822,7 @@
             <a:fld id="{F13A34C8-038E-2045-AF43-DF7DBB8E0E9E}" type="datetimeFigureOut">
               <a:rPr lang="en-US" smtClean="0"/>
               <a:pPr/>
-              <a:t>4/19/2018</a:t>
+              <a:t>4/19/18</a:t>
             </a:fld>
             <a:endParaRPr lang="en-US" dirty="0"/>
           </a:p>
@@ -1918,7 +1919,7 @@
             <a:fld id="{8818C68F-D26B-8F47-958C-23B49CF8A634}" type="datetimeFigureOut">
               <a:rPr lang="en-US" smtClean="0"/>
               <a:pPr/>
-              <a:t>4/19/2018</a:t>
+              <a:t>4/19/18</a:t>
             </a:fld>
             <a:endParaRPr lang="en-US" dirty="0"/>
           </a:p>
@@ -2074,7 +2075,7 @@
           </a:lstStyle>
           <a:p>
             <a:r>
-              <a:rPr lang="fr-FR" smtClean="0"/>
+              <a:rPr lang="fr-FR"/>
               <a:t>Modifiez le style du titre</a:t>
             </a:r>
             <a:endParaRPr lang="en-US" dirty="0"/>
@@ -2153,35 +2154,35 @@
           <a:p>
             <a:pPr lvl="0"/>
             <a:r>
-              <a:rPr lang="fr-FR" smtClean="0"/>
+              <a:rPr lang="fr-FR"/>
               <a:t>Modifier les styles du texte du masque</a:t>
             </a:r>
           </a:p>
           <a:p>
             <a:pPr lvl="1"/>
             <a:r>
-              <a:rPr lang="fr-FR" smtClean="0"/>
+              <a:rPr lang="fr-FR"/>
               <a:t>Deuxième niveau</a:t>
             </a:r>
           </a:p>
           <a:p>
             <a:pPr lvl="2"/>
             <a:r>
-              <a:rPr lang="fr-FR" smtClean="0"/>
+              <a:rPr lang="fr-FR"/>
               <a:t>Troisième niveau</a:t>
             </a:r>
           </a:p>
           <a:p>
             <a:pPr lvl="3"/>
             <a:r>
-              <a:rPr lang="fr-FR" smtClean="0"/>
+              <a:rPr lang="fr-FR"/>
               <a:t>Quatrième niveau</a:t>
             </a:r>
           </a:p>
           <a:p>
             <a:pPr lvl="4"/>
             <a:r>
-              <a:rPr lang="fr-FR" smtClean="0"/>
+              <a:rPr lang="fr-FR"/>
               <a:t>Cinquième niveau</a:t>
             </a:r>
             <a:endParaRPr lang="en-US" dirty="0"/>
@@ -2253,7 +2254,7 @@
           <a:p>
             <a:pPr lvl="0"/>
             <a:r>
-              <a:rPr lang="fr-FR" smtClean="0"/>
+              <a:rPr lang="fr-FR"/>
               <a:t>Modifier les styles du texte du masque</a:t>
             </a:r>
           </a:p>
@@ -2277,7 +2278,7 @@
             <a:fld id="{D0DF5E60-9974-AC48-9591-99C2BB44B7CF}" type="datetimeFigureOut">
               <a:rPr lang="en-US" smtClean="0"/>
               <a:pPr/>
-              <a:t>4/19/2018</a:t>
+              <a:t>4/19/18</a:t>
             </a:fld>
             <a:endParaRPr lang="en-US" dirty="0"/>
           </a:p>
@@ -2448,7 +2449,7 @@
           </a:lstStyle>
           <a:p>
             <a:r>
-              <a:rPr lang="fr-FR" smtClean="0"/>
+              <a:rPr lang="fr-FR"/>
               <a:t>Modifiez le style du titre</a:t>
             </a:r>
             <a:endParaRPr lang="en-US" dirty="0"/>
@@ -2525,7 +2526,7 @@
           </a:lstStyle>
           <a:p>
             <a:r>
-              <a:rPr lang="fr-FR" smtClean="0"/>
+              <a:rPr lang="fr-FR"/>
               <a:t>Cliquez sur l'icône pour ajouter une image</a:t>
             </a:r>
             <a:endParaRPr lang="en-US" dirty="0"/>
@@ -2597,7 +2598,7 @@
           <a:p>
             <a:pPr lvl="0"/>
             <a:r>
-              <a:rPr lang="fr-FR" smtClean="0"/>
+              <a:rPr lang="fr-FR"/>
               <a:t>Modifier les styles du texte du masque</a:t>
             </a:r>
           </a:p>
@@ -2636,7 +2637,7 @@
             <a:fld id="{09B482E8-6E0E-1B4F-B1FD-C69DB9E858D9}" type="datetimeFigureOut">
               <a:rPr lang="en-US" smtClean="0"/>
               <a:pPr/>
-              <a:t>4/19/2018</a:t>
+              <a:t>4/19/18</a:t>
             </a:fld>
             <a:endParaRPr lang="en-US" dirty="0"/>
           </a:p>
@@ -2776,7 +2777,7 @@
           <a:lstStyle/>
           <a:p>
             <a:r>
-              <a:rPr lang="fr-FR" smtClean="0"/>
+              <a:rPr lang="fr-FR"/>
               <a:t>Modifiez le style du titre</a:t>
             </a:r>
             <a:endParaRPr lang="en-US" dirty="0"/>
@@ -2880,7 +2881,7 @@
             <a:fld id="{09B482E8-6E0E-1B4F-B1FD-C69DB9E858D9}" type="datetimeFigureOut">
               <a:rPr lang="en-US" smtClean="0"/>
               <a:pPr/>
-              <a:t>4/19/2018</a:t>
+              <a:t>4/19/18</a:t>
             </a:fld>
             <a:endParaRPr lang="en-US" dirty="0"/>
           </a:p>
@@ -3450,13 +3451,6 @@
   <p:clrMapOvr>
     <a:masterClrMapping/>
   </p:clrMapOvr>
-  <p:timing>
-    <p:tnLst>
-      <p:par>
-        <p:cTn id="1" dur="indefinite" restart="never" nodeType="tmRoot"/>
-      </p:par>
-    </p:tnLst>
-  </p:timing>
 </p:sld>
 </file>
 
@@ -3482,6 +3476,86 @@
           <p:cNvPr id="2" name="Titre 1">
             <a:extLst>
               <a:ext uri="{FF2B5EF4-FFF2-40B4-BE49-F238E27FC236}">
+                <a16:creationId xmlns:a16="http://schemas.microsoft.com/office/drawing/2014/main" id="{A82AF29E-BCB1-7E43-B371-525D02459596}"/>
+              </a:ext>
+            </a:extLst>
+          </p:cNvPr>
+          <p:cNvSpPr>
+            <a:spLocks noGrp="1"/>
+          </p:cNvSpPr>
+          <p:nvPr>
+            <p:ph type="title"/>
+          </p:nvPr>
+        </p:nvSpPr>
+        <p:spPr/>
+        <p:txBody>
+          <a:bodyPr/>
+          <a:lstStyle/>
+          <a:p>
+            <a:endParaRPr lang="fr-FR"/>
+          </a:p>
+        </p:txBody>
+      </p:sp>
+      <p:sp>
+        <p:nvSpPr>
+          <p:cNvPr id="3" name="Espace réservé du contenu 2">
+            <a:extLst>
+              <a:ext uri="{FF2B5EF4-FFF2-40B4-BE49-F238E27FC236}">
+                <a16:creationId xmlns:a16="http://schemas.microsoft.com/office/drawing/2014/main" id="{9BDA6180-8A67-5E40-8F75-F4993C45AB09}"/>
+              </a:ext>
+            </a:extLst>
+          </p:cNvPr>
+          <p:cNvSpPr>
+            <a:spLocks noGrp="1"/>
+          </p:cNvSpPr>
+          <p:nvPr>
+            <p:ph idx="1"/>
+          </p:nvPr>
+        </p:nvSpPr>
+        <p:spPr/>
+        <p:txBody>
+          <a:bodyPr/>
+          <a:lstStyle/>
+          <a:p>
+            <a:endParaRPr lang="fr-FR"/>
+          </a:p>
+        </p:txBody>
+      </p:sp>
+    </p:spTree>
+    <p:extLst>
+      <p:ext uri="{BB962C8B-B14F-4D97-AF65-F5344CB8AC3E}">
+        <p14:creationId xmlns:p14="http://schemas.microsoft.com/office/powerpoint/2010/main" val="3171497421"/>
+      </p:ext>
+    </p:extLst>
+  </p:cSld>
+  <p:clrMapOvr>
+    <a:masterClrMapping/>
+  </p:clrMapOvr>
+</p:sld>
+</file>
+
+<file path=ppt/slides/slide11.xml><?xml version="1.0" encoding="utf-8"?>
+<p:sld xmlns:a="http://schemas.openxmlformats.org/drawingml/2006/main" xmlns:r="http://schemas.openxmlformats.org/officeDocument/2006/relationships" xmlns:p="http://schemas.openxmlformats.org/presentationml/2006/main">
+  <p:cSld>
+    <p:spTree>
+      <p:nvGrpSpPr>
+        <p:cNvPr id="1" name=""/>
+        <p:cNvGrpSpPr/>
+        <p:nvPr/>
+      </p:nvGrpSpPr>
+      <p:grpSpPr>
+        <a:xfrm>
+          <a:off x="0" y="0"/>
+          <a:ext cx="0" cy="0"/>
+          <a:chOff x="0" y="0"/>
+          <a:chExt cx="0" cy="0"/>
+        </a:xfrm>
+      </p:grpSpPr>
+      <p:sp>
+        <p:nvSpPr>
+          <p:cNvPr id="2" name="Titre 1">
+            <a:extLst>
+              <a:ext uri="{FF2B5EF4-FFF2-40B4-BE49-F238E27FC236}">
                 <a16:creationId xmlns:a16="http://schemas.microsoft.com/office/drawing/2014/main" id="{3A231524-80B7-5949-B3E6-9DC30893805B}"/>
               </a:ext>
             </a:extLst>
@@ -3527,6 +3601,132 @@
           <a:lstStyle/>
           <a:p>
             <a:endParaRPr lang="fr-FR" dirty="0"/>
+          </a:p>
+        </p:txBody>
+      </p:sp>
+      <p:sp>
+        <p:nvSpPr>
+          <p:cNvPr id="4" name="Rectangle à coins arrondis 3">
+            <a:extLst>
+              <a:ext uri="{FF2B5EF4-FFF2-40B4-BE49-F238E27FC236}">
+                <a16:creationId xmlns:a16="http://schemas.microsoft.com/office/drawing/2014/main" id="{9D44FDBD-3BBD-3E48-B1EF-B88AC0626924}"/>
+              </a:ext>
+            </a:extLst>
+          </p:cNvPr>
+          <p:cNvSpPr/>
+          <p:nvPr/>
+        </p:nvSpPr>
+        <p:spPr>
+          <a:xfrm>
+            <a:off x="361511" y="3136694"/>
+            <a:ext cx="3136174" cy="2641727"/>
+          </a:xfrm>
+          <a:prstGeom prst="roundRect">
+            <a:avLst/>
+          </a:prstGeom>
+          <a:solidFill>
+            <a:schemeClr val="tx2">
+              <a:lumMod val="20000"/>
+              <a:lumOff val="80000"/>
+            </a:schemeClr>
+          </a:solidFill>
+          <a:ln>
+            <a:solidFill>
+              <a:schemeClr val="tx2">
+                <a:lumMod val="20000"/>
+                <a:lumOff val="80000"/>
+              </a:schemeClr>
+            </a:solidFill>
+          </a:ln>
+        </p:spPr>
+        <p:style>
+          <a:lnRef idx="2">
+            <a:schemeClr val="accent1">
+              <a:shade val="50000"/>
+            </a:schemeClr>
+          </a:lnRef>
+          <a:fillRef idx="1">
+            <a:schemeClr val="accent1"/>
+          </a:fillRef>
+          <a:effectRef idx="0">
+            <a:schemeClr val="accent1"/>
+          </a:effectRef>
+          <a:fontRef idx="minor">
+            <a:schemeClr val="lt1"/>
+          </a:fontRef>
+        </p:style>
+        <p:txBody>
+          <a:bodyPr rtlCol="0" anchor="ctr"/>
+          <a:lstStyle/>
+          <a:p>
+            <a:pPr algn="ctr"/>
+            <a:r>
+              <a:rPr lang="fr-FR" dirty="0"/>
+              <a:t>Introduction</a:t>
+            </a:r>
+          </a:p>
+        </p:txBody>
+      </p:sp>
+      <p:sp>
+        <p:nvSpPr>
+          <p:cNvPr id="5" name="Rectangle à coins arrondis 4">
+            <a:extLst>
+              <a:ext uri="{FF2B5EF4-FFF2-40B4-BE49-F238E27FC236}">
+                <a16:creationId xmlns:a16="http://schemas.microsoft.com/office/drawing/2014/main" id="{BCC53A2B-3A97-BC4F-8416-831BA129DF11}"/>
+              </a:ext>
+            </a:extLst>
+          </p:cNvPr>
+          <p:cNvSpPr/>
+          <p:nvPr/>
+        </p:nvSpPr>
+        <p:spPr>
+          <a:xfrm>
+            <a:off x="4477839" y="3136694"/>
+            <a:ext cx="3136174" cy="2641727"/>
+          </a:xfrm>
+          <a:prstGeom prst="roundRect">
+            <a:avLst/>
+          </a:prstGeom>
+          <a:solidFill>
+            <a:schemeClr val="tx2">
+              <a:lumMod val="20000"/>
+              <a:lumOff val="80000"/>
+            </a:schemeClr>
+          </a:solidFill>
+          <a:ln>
+            <a:solidFill>
+              <a:schemeClr val="tx2">
+                <a:lumMod val="20000"/>
+                <a:lumOff val="80000"/>
+              </a:schemeClr>
+            </a:solidFill>
+          </a:ln>
+        </p:spPr>
+        <p:style>
+          <a:lnRef idx="2">
+            <a:schemeClr val="accent1">
+              <a:shade val="50000"/>
+            </a:schemeClr>
+          </a:lnRef>
+          <a:fillRef idx="1">
+            <a:schemeClr val="accent1"/>
+          </a:fillRef>
+          <a:effectRef idx="0">
+            <a:schemeClr val="accent1"/>
+          </a:effectRef>
+          <a:fontRef idx="minor">
+            <a:schemeClr val="lt1"/>
+          </a:fontRef>
+        </p:style>
+        <p:txBody>
+          <a:bodyPr rtlCol="0" anchor="ctr"/>
+          <a:lstStyle/>
+          <a:p>
+            <a:pPr algn="ctr"/>
+            <a:r>
+              <a:rPr lang="fr-FR" dirty="0"/>
+              <a:t>Fonctionnement du site </a:t>
+            </a:r>
           </a:p>
         </p:txBody>
       </p:sp>
@@ -3596,24 +3796,17 @@
     </p:spTree>
     <p:extLst>
       <p:ext uri="{BB962C8B-B14F-4D97-AF65-F5344CB8AC3E}">
-        <p14:creationId xmlns:p14="http://schemas.microsoft.com/office/powerpoint/2010/main" val="212312981"/>
+        <p14:creationId xmlns:p14="http://schemas.microsoft.com/office/powerpoint/2010/main" val="4155125952"/>
       </p:ext>
     </p:extLst>
   </p:cSld>
   <p:clrMapOvr>
     <a:masterClrMapping/>
   </p:clrMapOvr>
-  <p:timing>
-    <p:tnLst>
-      <p:par>
-        <p:cTn id="1" dur="indefinite" restart="never" nodeType="tmRoot"/>
-      </p:par>
-    </p:tnLst>
-  </p:timing>
 </p:sld>
 </file>
 
-<file path=ppt/slides/slide11.xml><?xml version="1.0" encoding="utf-8"?>
+<file path=ppt/slides/slide12.xml><?xml version="1.0" encoding="utf-8"?>
 <p:sld xmlns:a="http://schemas.openxmlformats.org/drawingml/2006/main" xmlns:r="http://schemas.openxmlformats.org/officeDocument/2006/relationships" xmlns:p="http://schemas.openxmlformats.org/presentationml/2006/main">
   <p:cSld>
     <p:spTree>
@@ -3690,13 +3883,6 @@
   <p:clrMapOvr>
     <a:masterClrMapping/>
   </p:clrMapOvr>
-  <p:timing>
-    <p:tnLst>
-      <p:par>
-        <p:cTn id="1" dur="indefinite" restart="never" nodeType="tmRoot"/>
-      </p:par>
-    </p:tnLst>
-  </p:timing>
 </p:sld>
 </file>
 
@@ -3969,13 +4155,6 @@
   <p:clrMapOvr>
     <a:masterClrMapping/>
   </p:clrMapOvr>
-  <p:timing>
-    <p:tnLst>
-      <p:par>
-        <p:cTn id="1" dur="indefinite" restart="never" nodeType="tmRoot"/>
-      </p:par>
-    </p:tnLst>
-  </p:timing>
 </p:sld>
 </file>
 
@@ -4001,6 +4180,378 @@
           <p:cNvPr id="2" name="Titre 1">
             <a:extLst>
               <a:ext uri="{FF2B5EF4-FFF2-40B4-BE49-F238E27FC236}">
+                <a16:creationId xmlns:a16="http://schemas.microsoft.com/office/drawing/2014/main" id="{3A231524-80B7-5949-B3E6-9DC30893805B}"/>
+              </a:ext>
+            </a:extLst>
+          </p:cNvPr>
+          <p:cNvSpPr>
+            <a:spLocks noGrp="1"/>
+          </p:cNvSpPr>
+          <p:nvPr>
+            <p:ph type="title"/>
+          </p:nvPr>
+        </p:nvSpPr>
+        <p:spPr/>
+        <p:txBody>
+          <a:bodyPr/>
+          <a:lstStyle/>
+          <a:p>
+            <a:r>
+              <a:rPr lang="fr-FR" dirty="0"/>
+              <a:t>Déroulement</a:t>
+            </a:r>
+          </a:p>
+        </p:txBody>
+      </p:sp>
+      <p:sp>
+        <p:nvSpPr>
+          <p:cNvPr id="3" name="Espace réservé du contenu 2">
+            <a:extLst>
+              <a:ext uri="{FF2B5EF4-FFF2-40B4-BE49-F238E27FC236}">
+                <a16:creationId xmlns:a16="http://schemas.microsoft.com/office/drawing/2014/main" id="{B739A553-B529-0846-9A65-EFE8CD3C6372}"/>
+              </a:ext>
+            </a:extLst>
+          </p:cNvPr>
+          <p:cNvSpPr>
+            <a:spLocks noGrp="1"/>
+          </p:cNvSpPr>
+          <p:nvPr>
+            <p:ph idx="1"/>
+          </p:nvPr>
+        </p:nvSpPr>
+        <p:spPr/>
+        <p:txBody>
+          <a:bodyPr/>
+          <a:lstStyle/>
+          <a:p>
+            <a:endParaRPr lang="fr-FR" dirty="0"/>
+          </a:p>
+        </p:txBody>
+      </p:sp>
+      <p:sp>
+        <p:nvSpPr>
+          <p:cNvPr id="4" name="Rectangle à coins arrondis 3">
+            <a:extLst>
+              <a:ext uri="{FF2B5EF4-FFF2-40B4-BE49-F238E27FC236}">
+                <a16:creationId xmlns:a16="http://schemas.microsoft.com/office/drawing/2014/main" id="{9D44FDBD-3BBD-3E48-B1EF-B88AC0626924}"/>
+              </a:ext>
+            </a:extLst>
+          </p:cNvPr>
+          <p:cNvSpPr/>
+          <p:nvPr/>
+        </p:nvSpPr>
+        <p:spPr>
+          <a:xfrm>
+            <a:off x="361511" y="3136694"/>
+            <a:ext cx="3136174" cy="2641727"/>
+          </a:xfrm>
+          <a:prstGeom prst="roundRect">
+            <a:avLst/>
+          </a:prstGeom>
+          <a:solidFill>
+            <a:schemeClr val="tx2">
+              <a:lumMod val="60000"/>
+              <a:lumOff val="40000"/>
+            </a:schemeClr>
+          </a:solidFill>
+          <a:ln>
+            <a:solidFill>
+              <a:schemeClr val="tx2">
+                <a:lumMod val="60000"/>
+                <a:lumOff val="40000"/>
+              </a:schemeClr>
+            </a:solidFill>
+          </a:ln>
+        </p:spPr>
+        <p:style>
+          <a:lnRef idx="2">
+            <a:schemeClr val="accent1">
+              <a:shade val="50000"/>
+            </a:schemeClr>
+          </a:lnRef>
+          <a:fillRef idx="1">
+            <a:schemeClr val="accent1"/>
+          </a:fillRef>
+          <a:effectRef idx="0">
+            <a:schemeClr val="accent1"/>
+          </a:effectRef>
+          <a:fontRef idx="minor">
+            <a:schemeClr val="lt1"/>
+          </a:fontRef>
+        </p:style>
+        <p:txBody>
+          <a:bodyPr rtlCol="0" anchor="ctr"/>
+          <a:lstStyle/>
+          <a:p>
+            <a:pPr algn="ctr"/>
+            <a:r>
+              <a:rPr lang="fr-FR" dirty="0"/>
+              <a:t>Introduction</a:t>
+            </a:r>
+          </a:p>
+        </p:txBody>
+      </p:sp>
+      <p:sp>
+        <p:nvSpPr>
+          <p:cNvPr id="5" name="Rectangle à coins arrondis 4">
+            <a:extLst>
+              <a:ext uri="{FF2B5EF4-FFF2-40B4-BE49-F238E27FC236}">
+                <a16:creationId xmlns:a16="http://schemas.microsoft.com/office/drawing/2014/main" id="{BCC53A2B-3A97-BC4F-8416-831BA129DF11}"/>
+              </a:ext>
+            </a:extLst>
+          </p:cNvPr>
+          <p:cNvSpPr/>
+          <p:nvPr/>
+        </p:nvSpPr>
+        <p:spPr>
+          <a:xfrm>
+            <a:off x="4477839" y="3136694"/>
+            <a:ext cx="3136174" cy="2641727"/>
+          </a:xfrm>
+          <a:prstGeom prst="roundRect">
+            <a:avLst/>
+          </a:prstGeom>
+          <a:solidFill>
+            <a:schemeClr val="tx2">
+              <a:lumMod val="20000"/>
+              <a:lumOff val="80000"/>
+            </a:schemeClr>
+          </a:solidFill>
+          <a:ln>
+            <a:solidFill>
+              <a:schemeClr val="tx2">
+                <a:lumMod val="20000"/>
+                <a:lumOff val="80000"/>
+              </a:schemeClr>
+            </a:solidFill>
+          </a:ln>
+        </p:spPr>
+        <p:style>
+          <a:lnRef idx="2">
+            <a:schemeClr val="accent1">
+              <a:shade val="50000"/>
+            </a:schemeClr>
+          </a:lnRef>
+          <a:fillRef idx="1">
+            <a:schemeClr val="accent1"/>
+          </a:fillRef>
+          <a:effectRef idx="0">
+            <a:schemeClr val="accent1"/>
+          </a:effectRef>
+          <a:fontRef idx="minor">
+            <a:schemeClr val="lt1"/>
+          </a:fontRef>
+        </p:style>
+        <p:txBody>
+          <a:bodyPr rtlCol="0" anchor="ctr"/>
+          <a:lstStyle/>
+          <a:p>
+            <a:pPr algn="ctr"/>
+            <a:r>
+              <a:rPr lang="fr-FR" dirty="0"/>
+              <a:t>Fonctionnement du site </a:t>
+            </a:r>
+          </a:p>
+        </p:txBody>
+      </p:sp>
+      <p:sp>
+        <p:nvSpPr>
+          <p:cNvPr id="6" name="Rectangle à coins arrondis 5">
+            <a:extLst>
+              <a:ext uri="{FF2B5EF4-FFF2-40B4-BE49-F238E27FC236}">
+                <a16:creationId xmlns:a16="http://schemas.microsoft.com/office/drawing/2014/main" id="{184B17EE-6FBA-6149-B135-45DAD6C22B12}"/>
+              </a:ext>
+            </a:extLst>
+          </p:cNvPr>
+          <p:cNvSpPr/>
+          <p:nvPr/>
+        </p:nvSpPr>
+        <p:spPr>
+          <a:xfrm>
+            <a:off x="8594167" y="3136694"/>
+            <a:ext cx="3136174" cy="2641727"/>
+          </a:xfrm>
+          <a:prstGeom prst="roundRect">
+            <a:avLst/>
+          </a:prstGeom>
+          <a:solidFill>
+            <a:schemeClr val="tx2">
+              <a:lumMod val="20000"/>
+              <a:lumOff val="80000"/>
+            </a:schemeClr>
+          </a:solidFill>
+          <a:ln>
+            <a:solidFill>
+              <a:schemeClr val="tx2">
+                <a:lumMod val="20000"/>
+                <a:lumOff val="80000"/>
+              </a:schemeClr>
+            </a:solidFill>
+          </a:ln>
+        </p:spPr>
+        <p:style>
+          <a:lnRef idx="2">
+            <a:schemeClr val="accent1">
+              <a:shade val="50000"/>
+            </a:schemeClr>
+          </a:lnRef>
+          <a:fillRef idx="1">
+            <a:schemeClr val="accent1"/>
+          </a:fillRef>
+          <a:effectRef idx="0">
+            <a:schemeClr val="accent1"/>
+          </a:effectRef>
+          <a:fontRef idx="minor">
+            <a:schemeClr val="lt1"/>
+          </a:fontRef>
+        </p:style>
+        <p:txBody>
+          <a:bodyPr rtlCol="0" anchor="ctr"/>
+          <a:lstStyle/>
+          <a:p>
+            <a:pPr algn="ctr"/>
+            <a:r>
+              <a:rPr lang="fr-FR" dirty="0"/>
+              <a:t>Conclusion</a:t>
+            </a:r>
+          </a:p>
+        </p:txBody>
+      </p:sp>
+    </p:spTree>
+    <p:extLst>
+      <p:ext uri="{BB962C8B-B14F-4D97-AF65-F5344CB8AC3E}">
+        <p14:creationId xmlns:p14="http://schemas.microsoft.com/office/powerpoint/2010/main" val="3183436525"/>
+      </p:ext>
+    </p:extLst>
+  </p:cSld>
+  <p:clrMapOvr>
+    <a:masterClrMapping/>
+  </p:clrMapOvr>
+</p:sld>
+</file>
+
+<file path=ppt/slides/slide4.xml><?xml version="1.0" encoding="utf-8"?>
+<p:sld xmlns:a="http://schemas.openxmlformats.org/drawingml/2006/main" xmlns:r="http://schemas.openxmlformats.org/officeDocument/2006/relationships" xmlns:p="http://schemas.openxmlformats.org/presentationml/2006/main">
+  <p:cSld>
+    <p:spTree>
+      <p:nvGrpSpPr>
+        <p:cNvPr id="1" name=""/>
+        <p:cNvGrpSpPr/>
+        <p:nvPr/>
+      </p:nvGrpSpPr>
+      <p:grpSpPr>
+        <a:xfrm>
+          <a:off x="0" y="0"/>
+          <a:ext cx="0" cy="0"/>
+          <a:chOff x="0" y="0"/>
+          <a:chExt cx="0" cy="0"/>
+        </a:xfrm>
+      </p:grpSpPr>
+      <p:sp>
+        <p:nvSpPr>
+          <p:cNvPr id="2" name="Titre 1">
+            <a:extLst>
+              <a:ext uri="{FF2B5EF4-FFF2-40B4-BE49-F238E27FC236}">
+                <a16:creationId xmlns:a16="http://schemas.microsoft.com/office/drawing/2014/main" id="{FB223375-D25D-6942-9640-B3EC56AB30A6}"/>
+              </a:ext>
+            </a:extLst>
+          </p:cNvPr>
+          <p:cNvSpPr>
+            <a:spLocks noGrp="1"/>
+          </p:cNvSpPr>
+          <p:nvPr>
+            <p:ph type="title"/>
+          </p:nvPr>
+        </p:nvSpPr>
+        <p:spPr/>
+        <p:txBody>
+          <a:bodyPr/>
+          <a:lstStyle/>
+          <a:p>
+            <a:r>
+              <a:rPr lang="fr-FR" dirty="0"/>
+              <a:t>Sommaire</a:t>
+            </a:r>
+          </a:p>
+        </p:txBody>
+      </p:sp>
+      <p:sp>
+        <p:nvSpPr>
+          <p:cNvPr id="3" name="Espace réservé du contenu 2">
+            <a:extLst>
+              <a:ext uri="{FF2B5EF4-FFF2-40B4-BE49-F238E27FC236}">
+                <a16:creationId xmlns:a16="http://schemas.microsoft.com/office/drawing/2014/main" id="{54B4E58C-E4E8-C34C-903C-BB4E78253D5C}"/>
+              </a:ext>
+            </a:extLst>
+          </p:cNvPr>
+          <p:cNvSpPr>
+            <a:spLocks noGrp="1"/>
+          </p:cNvSpPr>
+          <p:nvPr>
+            <p:ph idx="1"/>
+          </p:nvPr>
+        </p:nvSpPr>
+        <p:spPr>
+          <a:xfrm>
+            <a:off x="2231136" y="2638044"/>
+            <a:ext cx="7729728" cy="3101983"/>
+          </a:xfrm>
+        </p:spPr>
+        <p:txBody>
+          <a:bodyPr/>
+          <a:lstStyle/>
+          <a:p>
+            <a:r>
+              <a:rPr lang="fr-FR" dirty="0"/>
+              <a:t>Objectifs</a:t>
+            </a:r>
+          </a:p>
+          <a:p>
+            <a:r>
+              <a:rPr lang="fr-FR" dirty="0"/>
+              <a:t>Captures d’écran du site</a:t>
+            </a:r>
+          </a:p>
+          <a:p>
+            <a:endParaRPr lang="fr-FR" dirty="0"/>
+          </a:p>
+        </p:txBody>
+      </p:sp>
+    </p:spTree>
+    <p:extLst>
+      <p:ext uri="{BB962C8B-B14F-4D97-AF65-F5344CB8AC3E}">
+        <p14:creationId xmlns:p14="http://schemas.microsoft.com/office/powerpoint/2010/main" val="3686479324"/>
+      </p:ext>
+    </p:extLst>
+  </p:cSld>
+  <p:clrMapOvr>
+    <a:masterClrMapping/>
+  </p:clrMapOvr>
+</p:sld>
+</file>
+
+<file path=ppt/slides/slide5.xml><?xml version="1.0" encoding="utf-8"?>
+<p:sld xmlns:a="http://schemas.openxmlformats.org/drawingml/2006/main" xmlns:r="http://schemas.openxmlformats.org/officeDocument/2006/relationships" xmlns:p="http://schemas.openxmlformats.org/presentationml/2006/main">
+  <p:cSld>
+    <p:spTree>
+      <p:nvGrpSpPr>
+        <p:cNvPr id="1" name=""/>
+        <p:cNvGrpSpPr/>
+        <p:nvPr/>
+      </p:nvGrpSpPr>
+      <p:grpSpPr>
+        <a:xfrm>
+          <a:off x="0" y="0"/>
+          <a:ext cx="0" cy="0"/>
+          <a:chOff x="0" y="0"/>
+          <a:chExt cx="0" cy="0"/>
+        </a:xfrm>
+      </p:grpSpPr>
+      <p:sp>
+        <p:nvSpPr>
+          <p:cNvPr id="2" name="Titre 1">
+            <a:extLst>
+              <a:ext uri="{FF2B5EF4-FFF2-40B4-BE49-F238E27FC236}">
                 <a16:creationId xmlns:a16="http://schemas.microsoft.com/office/drawing/2014/main" id="{97D80975-548B-F241-A0AF-8B0D1A0E51A7}"/>
               </a:ext>
             </a:extLst>
@@ -4054,72 +4605,71 @@
           <a:p>
             <a:pPr lvl="0"/>
             <a:r>
-              <a:rPr lang="fr-FR" dirty="0" smtClean="0"/>
+              <a:rPr lang="fr-FR" dirty="0"/>
               <a:t>Création d’un site d’e-commerce</a:t>
             </a:r>
           </a:p>
           <a:p>
             <a:pPr lvl="0"/>
             <a:r>
-              <a:rPr lang="fr-FR" dirty="0" smtClean="0"/>
+              <a:rPr lang="fr-FR" dirty="0"/>
               <a:t>Plusieurs pages à disposition</a:t>
             </a:r>
           </a:p>
           <a:p>
             <a:pPr lvl="1"/>
             <a:r>
-              <a:rPr lang="fr-FR" dirty="0" smtClean="0"/>
+              <a:rPr lang="fr-FR" dirty="0"/>
               <a:t>Accueil</a:t>
             </a:r>
           </a:p>
           <a:p>
             <a:pPr lvl="1"/>
             <a:r>
-              <a:rPr lang="fr-FR" dirty="0" smtClean="0"/>
+              <a:rPr lang="fr-FR" dirty="0"/>
               <a:t>La page article</a:t>
             </a:r>
           </a:p>
           <a:p>
             <a:pPr lvl="1"/>
             <a:r>
-              <a:rPr lang="fr-FR" dirty="0" smtClean="0"/>
+              <a:rPr lang="fr-FR" dirty="0"/>
               <a:t>Les détails des articles </a:t>
             </a:r>
           </a:p>
           <a:p>
             <a:pPr lvl="1"/>
             <a:r>
-              <a:rPr lang="fr-FR" dirty="0" smtClean="0"/>
+              <a:rPr lang="fr-FR" dirty="0"/>
               <a:t>Panier</a:t>
             </a:r>
           </a:p>
           <a:p>
             <a:pPr lvl="1"/>
             <a:r>
-              <a:rPr lang="fr-FR" dirty="0" smtClean="0"/>
+              <a:rPr lang="fr-FR" dirty="0"/>
               <a:t>Contact</a:t>
             </a:r>
           </a:p>
           <a:p>
             <a:r>
-              <a:rPr lang="fr-FR" dirty="0" smtClean="0"/>
+              <a:rPr lang="fr-FR" dirty="0"/>
               <a:t>Page pour les administrateurs </a:t>
             </a:r>
           </a:p>
           <a:p>
             <a:pPr lvl="1"/>
             <a:r>
-              <a:rPr lang="fr-FR" dirty="0" smtClean="0"/>
+              <a:rPr lang="fr-FR" dirty="0"/>
               <a:t>Ajouter un article </a:t>
             </a:r>
           </a:p>
           <a:p>
             <a:pPr lvl="1"/>
             <a:r>
-              <a:rPr lang="fr-FR" dirty="0" smtClean="0"/>
+              <a:rPr lang="fr-FR" dirty="0"/>
               <a:t>Gérer les articles 	</a:t>
             </a:r>
-            <a:endParaRPr lang="fr-FR" dirty="0"/>
           </a:p>
         </p:txBody>
       </p:sp>
@@ -4133,17 +4683,10 @@
   <p:clrMapOvr>
     <a:masterClrMapping/>
   </p:clrMapOvr>
-  <p:timing>
-    <p:tnLst>
-      <p:par>
-        <p:cTn id="1" dur="indefinite" restart="never" nodeType="tmRoot"/>
-      </p:par>
-    </p:tnLst>
-  </p:timing>
 </p:sld>
 </file>
 
-<file path=ppt/slides/slide4.xml><?xml version="1.0" encoding="utf-8"?>
+<file path=ppt/slides/slide6.xml><?xml version="1.0" encoding="utf-8"?>
 <p:sld xmlns:a="http://schemas.openxmlformats.org/drawingml/2006/main" xmlns:r="http://schemas.openxmlformats.org/officeDocument/2006/relationships" xmlns:p="http://schemas.openxmlformats.org/presentationml/2006/main">
   <p:cSld>
     <p:spTree>
@@ -4184,8 +4727,8 @@
         </p:blipFill>
         <p:spPr>
           <a:xfrm>
-            <a:off x="258600" y="515388"/>
-            <a:ext cx="11607302" cy="5710844"/>
+            <a:off x="8370" y="321733"/>
+            <a:ext cx="12183630" cy="5994400"/>
           </a:xfrm>
         </p:spPr>
       </p:pic>
@@ -4199,17 +4742,10 @@
   <p:clrMapOvr>
     <a:masterClrMapping/>
   </p:clrMapOvr>
-  <p:timing>
-    <p:tnLst>
-      <p:par>
-        <p:cTn id="1" dur="indefinite" restart="never" nodeType="tmRoot"/>
-      </p:par>
-    </p:tnLst>
-  </p:timing>
 </p:sld>
 </file>
 
-<file path=ppt/slides/slide5.xml><?xml version="1.0" encoding="utf-8"?>
+<file path=ppt/slides/slide7.xml><?xml version="1.0" encoding="utf-8"?>
 <p:sld xmlns:a="http://schemas.openxmlformats.org/drawingml/2006/main" xmlns:r="http://schemas.openxmlformats.org/officeDocument/2006/relationships" xmlns:p="http://schemas.openxmlformats.org/presentationml/2006/main">
   <p:cSld>
     <p:spTree>
@@ -4248,8 +4784,8 @@
         </p:blipFill>
         <p:spPr>
           <a:xfrm>
-            <a:off x="290945" y="946964"/>
-            <a:ext cx="11594979" cy="5179515"/>
+            <a:off x="1874" y="574431"/>
+            <a:ext cx="12190126" cy="5445369"/>
           </a:xfrm>
           <a:prstGeom prst="rect">
             <a:avLst/>
@@ -4266,17 +4802,10 @@
   <p:clrMapOvr>
     <a:masterClrMapping/>
   </p:clrMapOvr>
-  <p:timing>
-    <p:tnLst>
-      <p:par>
-        <p:cTn id="1" dur="indefinite" restart="never" nodeType="tmRoot"/>
-      </p:par>
-    </p:tnLst>
-  </p:timing>
 </p:sld>
 </file>
 
-<file path=ppt/slides/slide6.xml><?xml version="1.0" encoding="utf-8"?>
+<file path=ppt/slides/slide8.xml><?xml version="1.0" encoding="utf-8"?>
 <p:sld xmlns:a="http://schemas.openxmlformats.org/drawingml/2006/main" xmlns:r="http://schemas.openxmlformats.org/officeDocument/2006/relationships" xmlns:p="http://schemas.openxmlformats.org/presentationml/2006/main">
   <p:cSld>
     <p:spTree>
@@ -4315,8 +4844,8 @@
         </p:blipFill>
         <p:spPr>
           <a:xfrm>
-            <a:off x="315883" y="629247"/>
-            <a:ext cx="11610775" cy="5364229"/>
+            <a:off x="0" y="603848"/>
+            <a:ext cx="12199204" cy="5636086"/>
           </a:xfrm>
           <a:prstGeom prst="rect">
             <a:avLst/>
@@ -4333,17 +4862,10 @@
   <p:clrMapOvr>
     <a:masterClrMapping/>
   </p:clrMapOvr>
-  <p:timing>
-    <p:tnLst>
-      <p:par>
-        <p:cTn id="1" dur="indefinite" restart="never" nodeType="tmRoot"/>
-      </p:par>
-    </p:tnLst>
-  </p:timing>
 </p:sld>
 </file>
 
-<file path=ppt/slides/slide7.xml><?xml version="1.0" encoding="utf-8"?>
+<file path=ppt/slides/slide9.xml><?xml version="1.0" encoding="utf-8"?>
 <p:sld xmlns:a="http://schemas.openxmlformats.org/drawingml/2006/main" xmlns:r="http://schemas.openxmlformats.org/officeDocument/2006/relationships" xmlns:p="http://schemas.openxmlformats.org/presentationml/2006/main">
   <p:cSld>
     <p:spTree>
@@ -4410,6 +4932,69 @@
           <a:lstStyle/>
           <a:p>
             <a:endParaRPr lang="fr-FR" dirty="0"/>
+          </a:p>
+        </p:txBody>
+      </p:sp>
+      <p:sp>
+        <p:nvSpPr>
+          <p:cNvPr id="4" name="Rectangle à coins arrondis 3">
+            <a:extLst>
+              <a:ext uri="{FF2B5EF4-FFF2-40B4-BE49-F238E27FC236}">
+                <a16:creationId xmlns:a16="http://schemas.microsoft.com/office/drawing/2014/main" id="{9D44FDBD-3BBD-3E48-B1EF-B88AC0626924}"/>
+              </a:ext>
+            </a:extLst>
+          </p:cNvPr>
+          <p:cNvSpPr/>
+          <p:nvPr/>
+        </p:nvSpPr>
+        <p:spPr>
+          <a:xfrm>
+            <a:off x="361511" y="3136694"/>
+            <a:ext cx="3136174" cy="2641727"/>
+          </a:xfrm>
+          <a:prstGeom prst="roundRect">
+            <a:avLst/>
+          </a:prstGeom>
+          <a:solidFill>
+            <a:schemeClr val="tx2">
+              <a:lumMod val="20000"/>
+              <a:lumOff val="80000"/>
+            </a:schemeClr>
+          </a:solidFill>
+          <a:ln>
+            <a:solidFill>
+              <a:schemeClr val="tx2">
+                <a:lumMod val="20000"/>
+                <a:lumOff val="80000"/>
+              </a:schemeClr>
+            </a:solidFill>
+          </a:ln>
+        </p:spPr>
+        <p:style>
+          <a:lnRef idx="2">
+            <a:schemeClr val="accent1">
+              <a:shade val="50000"/>
+            </a:schemeClr>
+          </a:lnRef>
+          <a:fillRef idx="1">
+            <a:schemeClr val="accent1"/>
+          </a:fillRef>
+          <a:effectRef idx="0">
+            <a:schemeClr val="accent1"/>
+          </a:effectRef>
+          <a:fontRef idx="minor">
+            <a:schemeClr val="lt1"/>
+          </a:fontRef>
+        </p:style>
+        <p:txBody>
+          <a:bodyPr rtlCol="0" anchor="ctr"/>
+          <a:lstStyle/>
+          <a:p>
+            <a:pPr algn="ctr"/>
+            <a:r>
+              <a:rPr lang="fr-FR" dirty="0"/>
+              <a:t>Introduction</a:t>
+            </a:r>
           </a:p>
         </p:txBody>
       </p:sp>
@@ -4476,200 +5061,79 @@
           </a:p>
         </p:txBody>
       </p:sp>
+      <p:sp>
+        <p:nvSpPr>
+          <p:cNvPr id="6" name="Rectangle à coins arrondis 5">
+            <a:extLst>
+              <a:ext uri="{FF2B5EF4-FFF2-40B4-BE49-F238E27FC236}">
+                <a16:creationId xmlns:a16="http://schemas.microsoft.com/office/drawing/2014/main" id="{184B17EE-6FBA-6149-B135-45DAD6C22B12}"/>
+              </a:ext>
+            </a:extLst>
+          </p:cNvPr>
+          <p:cNvSpPr/>
+          <p:nvPr/>
+        </p:nvSpPr>
+        <p:spPr>
+          <a:xfrm>
+            <a:off x="8594167" y="3136694"/>
+            <a:ext cx="3136174" cy="2641727"/>
+          </a:xfrm>
+          <a:prstGeom prst="roundRect">
+            <a:avLst/>
+          </a:prstGeom>
+          <a:solidFill>
+            <a:schemeClr val="tx2">
+              <a:lumMod val="20000"/>
+              <a:lumOff val="80000"/>
+            </a:schemeClr>
+          </a:solidFill>
+          <a:ln>
+            <a:solidFill>
+              <a:schemeClr val="tx2">
+                <a:lumMod val="20000"/>
+                <a:lumOff val="80000"/>
+              </a:schemeClr>
+            </a:solidFill>
+          </a:ln>
+        </p:spPr>
+        <p:style>
+          <a:lnRef idx="2">
+            <a:schemeClr val="accent1">
+              <a:shade val="50000"/>
+            </a:schemeClr>
+          </a:lnRef>
+          <a:fillRef idx="1">
+            <a:schemeClr val="accent1"/>
+          </a:fillRef>
+          <a:effectRef idx="0">
+            <a:schemeClr val="accent1"/>
+          </a:effectRef>
+          <a:fontRef idx="minor">
+            <a:schemeClr val="lt1"/>
+          </a:fontRef>
+        </p:style>
+        <p:txBody>
+          <a:bodyPr rtlCol="0" anchor="ctr"/>
+          <a:lstStyle/>
+          <a:p>
+            <a:pPr algn="ctr"/>
+            <a:r>
+              <a:rPr lang="fr-FR" dirty="0"/>
+              <a:t>Conclusion</a:t>
+            </a:r>
+          </a:p>
+        </p:txBody>
+      </p:sp>
     </p:spTree>
     <p:extLst>
       <p:ext uri="{BB962C8B-B14F-4D97-AF65-F5344CB8AC3E}">
-        <p14:creationId xmlns:p14="http://schemas.microsoft.com/office/powerpoint/2010/main" val="3944030250"/>
+        <p14:creationId xmlns:p14="http://schemas.microsoft.com/office/powerpoint/2010/main" val="4082113685"/>
       </p:ext>
     </p:extLst>
   </p:cSld>
   <p:clrMapOvr>
     <a:masterClrMapping/>
   </p:clrMapOvr>
-  <p:timing>
-    <p:tnLst>
-      <p:par>
-        <p:cTn id="1" dur="indefinite" restart="never" nodeType="tmRoot"/>
-      </p:par>
-    </p:tnLst>
-  </p:timing>
-</p:sld>
-</file>
-
-<file path=ppt/slides/slide8.xml><?xml version="1.0" encoding="utf-8"?>
-<p:sld xmlns:a="http://schemas.openxmlformats.org/drawingml/2006/main" xmlns:r="http://schemas.openxmlformats.org/officeDocument/2006/relationships" xmlns:p="http://schemas.openxmlformats.org/presentationml/2006/main">
-  <p:cSld>
-    <p:spTree>
-      <p:nvGrpSpPr>
-        <p:cNvPr id="1" name=""/>
-        <p:cNvGrpSpPr/>
-        <p:nvPr/>
-      </p:nvGrpSpPr>
-      <p:grpSpPr>
-        <a:xfrm>
-          <a:off x="0" y="0"/>
-          <a:ext cx="0" cy="0"/>
-          <a:chOff x="0" y="0"/>
-          <a:chExt cx="0" cy="0"/>
-        </a:xfrm>
-      </p:grpSpPr>
-      <p:sp>
-        <p:nvSpPr>
-          <p:cNvPr id="2" name="Titre 1">
-            <a:extLst>
-              <a:ext uri="{FF2B5EF4-FFF2-40B4-BE49-F238E27FC236}">
-                <a16:creationId xmlns:a16="http://schemas.microsoft.com/office/drawing/2014/main" id="{3257FA9A-D498-5A4A-8C8C-2FF4466D43F7}"/>
-              </a:ext>
-            </a:extLst>
-          </p:cNvPr>
-          <p:cNvSpPr>
-            <a:spLocks noGrp="1"/>
-          </p:cNvSpPr>
-          <p:nvPr>
-            <p:ph type="title"/>
-          </p:nvPr>
-        </p:nvSpPr>
-        <p:spPr/>
-        <p:txBody>
-          <a:bodyPr/>
-          <a:lstStyle/>
-          <a:p>
-            <a:r>
-              <a:rPr lang="fr-FR" dirty="0"/>
-              <a:t>Sommaire fonctionnement du site</a:t>
-            </a:r>
-          </a:p>
-        </p:txBody>
-      </p:sp>
-      <p:sp>
-        <p:nvSpPr>
-          <p:cNvPr id="3" name="Espace réservé du contenu 2">
-            <a:extLst>
-              <a:ext uri="{FF2B5EF4-FFF2-40B4-BE49-F238E27FC236}">
-                <a16:creationId xmlns:a16="http://schemas.microsoft.com/office/drawing/2014/main" id="{8C1F6B1D-E9FA-8242-AD00-52D0C69D330D}"/>
-              </a:ext>
-            </a:extLst>
-          </p:cNvPr>
-          <p:cNvSpPr>
-            <a:spLocks noGrp="1"/>
-          </p:cNvSpPr>
-          <p:nvPr>
-            <p:ph idx="1"/>
-          </p:nvPr>
-        </p:nvSpPr>
-        <p:spPr/>
-        <p:txBody>
-          <a:bodyPr/>
-          <a:lstStyle/>
-          <a:p>
-            <a:endParaRPr lang="fr-FR"/>
-          </a:p>
-        </p:txBody>
-      </p:sp>
-    </p:spTree>
-    <p:extLst>
-      <p:ext uri="{BB962C8B-B14F-4D97-AF65-F5344CB8AC3E}">
-        <p14:creationId xmlns:p14="http://schemas.microsoft.com/office/powerpoint/2010/main" val="3204152657"/>
-      </p:ext>
-    </p:extLst>
-  </p:cSld>
-  <p:clrMapOvr>
-    <a:masterClrMapping/>
-  </p:clrMapOvr>
-  <p:timing>
-    <p:tnLst>
-      <p:par>
-        <p:cTn id="1" dur="indefinite" restart="never" nodeType="tmRoot"/>
-      </p:par>
-    </p:tnLst>
-  </p:timing>
-</p:sld>
-</file>
-
-<file path=ppt/slides/slide9.xml><?xml version="1.0" encoding="utf-8"?>
-<p:sld xmlns:a="http://schemas.openxmlformats.org/drawingml/2006/main" xmlns:r="http://schemas.openxmlformats.org/officeDocument/2006/relationships" xmlns:p="http://schemas.openxmlformats.org/presentationml/2006/main">
-  <p:cSld>
-    <p:spTree>
-      <p:nvGrpSpPr>
-        <p:cNvPr id="1" name=""/>
-        <p:cNvGrpSpPr/>
-        <p:nvPr/>
-      </p:nvGrpSpPr>
-      <p:grpSpPr>
-        <a:xfrm>
-          <a:off x="0" y="0"/>
-          <a:ext cx="0" cy="0"/>
-          <a:chOff x="0" y="0"/>
-          <a:chExt cx="0" cy="0"/>
-        </a:xfrm>
-      </p:grpSpPr>
-      <p:sp>
-        <p:nvSpPr>
-          <p:cNvPr id="2" name="Titre 1">
-            <a:extLst>
-              <a:ext uri="{FF2B5EF4-FFF2-40B4-BE49-F238E27FC236}">
-                <a16:creationId xmlns:a16="http://schemas.microsoft.com/office/drawing/2014/main" id="{A82AF29E-BCB1-7E43-B371-525D02459596}"/>
-              </a:ext>
-            </a:extLst>
-          </p:cNvPr>
-          <p:cNvSpPr>
-            <a:spLocks noGrp="1"/>
-          </p:cNvSpPr>
-          <p:nvPr>
-            <p:ph type="title"/>
-          </p:nvPr>
-        </p:nvSpPr>
-        <p:spPr/>
-        <p:txBody>
-          <a:bodyPr/>
-          <a:lstStyle/>
-          <a:p>
-            <a:endParaRPr lang="fr-FR"/>
-          </a:p>
-        </p:txBody>
-      </p:sp>
-      <p:sp>
-        <p:nvSpPr>
-          <p:cNvPr id="3" name="Espace réservé du contenu 2">
-            <a:extLst>
-              <a:ext uri="{FF2B5EF4-FFF2-40B4-BE49-F238E27FC236}">
-                <a16:creationId xmlns:a16="http://schemas.microsoft.com/office/drawing/2014/main" id="{9BDA6180-8A67-5E40-8F75-F4993C45AB09}"/>
-              </a:ext>
-            </a:extLst>
-          </p:cNvPr>
-          <p:cNvSpPr>
-            <a:spLocks noGrp="1"/>
-          </p:cNvSpPr>
-          <p:nvPr>
-            <p:ph idx="1"/>
-          </p:nvPr>
-        </p:nvSpPr>
-        <p:spPr/>
-        <p:txBody>
-          <a:bodyPr/>
-          <a:lstStyle/>
-          <a:p>
-            <a:endParaRPr lang="fr-FR"/>
-          </a:p>
-        </p:txBody>
-      </p:sp>
-    </p:spTree>
-    <p:extLst>
-      <p:ext uri="{BB962C8B-B14F-4D97-AF65-F5344CB8AC3E}">
-        <p14:creationId xmlns:p14="http://schemas.microsoft.com/office/powerpoint/2010/main" val="3171497421"/>
-      </p:ext>
-    </p:extLst>
-  </p:cSld>
-  <p:clrMapOvr>
-    <a:masterClrMapping/>
-  </p:clrMapOvr>
-  <p:timing>
-    <p:tnLst>
-      <p:par>
-        <p:cTn id="1" dur="indefinite" restart="never" nodeType="tmRoot"/>
-      </p:par>
-    </p:tnLst>
-  </p:timing>
 </p:sld>
 </file>
 

</xml_diff>

<commit_message>
Ajout de nouvelles slides dans la présentation
</commit_message>
<xml_diff>
--- a/Documentation/Présentation.pptx
+++ b/Documentation/Présentation.pptx
@@ -8,15 +8,14 @@
     <p:sldId id="256" r:id="rId2"/>
     <p:sldId id="257" r:id="rId3"/>
     <p:sldId id="270" r:id="rId4"/>
-    <p:sldId id="273" r:id="rId5"/>
-    <p:sldId id="259" r:id="rId6"/>
-    <p:sldId id="267" r:id="rId7"/>
-    <p:sldId id="268" r:id="rId8"/>
-    <p:sldId id="269" r:id="rId9"/>
-    <p:sldId id="271" r:id="rId10"/>
-    <p:sldId id="261" r:id="rId11"/>
-    <p:sldId id="272" r:id="rId12"/>
-    <p:sldId id="265" r:id="rId13"/>
+    <p:sldId id="259" r:id="rId5"/>
+    <p:sldId id="267" r:id="rId6"/>
+    <p:sldId id="268" r:id="rId7"/>
+    <p:sldId id="269" r:id="rId8"/>
+    <p:sldId id="271" r:id="rId9"/>
+    <p:sldId id="261" r:id="rId10"/>
+    <p:sldId id="272" r:id="rId11"/>
+    <p:sldId id="265" r:id="rId12"/>
   </p:sldIdLst>
   <p:sldSz cx="12192000" cy="6858000"/>
   <p:notesSz cx="6858000" cy="9144000"/>
@@ -3410,7 +3409,7 @@
                   <a:schemeClr val="bg1"/>
                 </a:solidFill>
               </a:rPr>
-              <a:t>Projet Pré-TPI – site d’e-commerce</a:t>
+              <a:t>Pré-TPI – Site d’e-commerce</a:t>
             </a:r>
           </a:p>
           <a:p>
@@ -3455,86 +3454,6 @@
 </file>
 
 <file path=ppt/slides/slide10.xml><?xml version="1.0" encoding="utf-8"?>
-<p:sld xmlns:a="http://schemas.openxmlformats.org/drawingml/2006/main" xmlns:r="http://schemas.openxmlformats.org/officeDocument/2006/relationships" xmlns:p="http://schemas.openxmlformats.org/presentationml/2006/main">
-  <p:cSld>
-    <p:spTree>
-      <p:nvGrpSpPr>
-        <p:cNvPr id="1" name=""/>
-        <p:cNvGrpSpPr/>
-        <p:nvPr/>
-      </p:nvGrpSpPr>
-      <p:grpSpPr>
-        <a:xfrm>
-          <a:off x="0" y="0"/>
-          <a:ext cx="0" cy="0"/>
-          <a:chOff x="0" y="0"/>
-          <a:chExt cx="0" cy="0"/>
-        </a:xfrm>
-      </p:grpSpPr>
-      <p:sp>
-        <p:nvSpPr>
-          <p:cNvPr id="2" name="Titre 1">
-            <a:extLst>
-              <a:ext uri="{FF2B5EF4-FFF2-40B4-BE49-F238E27FC236}">
-                <a16:creationId xmlns:a16="http://schemas.microsoft.com/office/drawing/2014/main" id="{A82AF29E-BCB1-7E43-B371-525D02459596}"/>
-              </a:ext>
-            </a:extLst>
-          </p:cNvPr>
-          <p:cNvSpPr>
-            <a:spLocks noGrp="1"/>
-          </p:cNvSpPr>
-          <p:nvPr>
-            <p:ph type="title"/>
-          </p:nvPr>
-        </p:nvSpPr>
-        <p:spPr/>
-        <p:txBody>
-          <a:bodyPr/>
-          <a:lstStyle/>
-          <a:p>
-            <a:endParaRPr lang="fr-FR"/>
-          </a:p>
-        </p:txBody>
-      </p:sp>
-      <p:sp>
-        <p:nvSpPr>
-          <p:cNvPr id="3" name="Espace réservé du contenu 2">
-            <a:extLst>
-              <a:ext uri="{FF2B5EF4-FFF2-40B4-BE49-F238E27FC236}">
-                <a16:creationId xmlns:a16="http://schemas.microsoft.com/office/drawing/2014/main" id="{9BDA6180-8A67-5E40-8F75-F4993C45AB09}"/>
-              </a:ext>
-            </a:extLst>
-          </p:cNvPr>
-          <p:cNvSpPr>
-            <a:spLocks noGrp="1"/>
-          </p:cNvSpPr>
-          <p:nvPr>
-            <p:ph idx="1"/>
-          </p:nvPr>
-        </p:nvSpPr>
-        <p:spPr/>
-        <p:txBody>
-          <a:bodyPr/>
-          <a:lstStyle/>
-          <a:p>
-            <a:endParaRPr lang="fr-FR"/>
-          </a:p>
-        </p:txBody>
-      </p:sp>
-    </p:spTree>
-    <p:extLst>
-      <p:ext uri="{BB962C8B-B14F-4D97-AF65-F5344CB8AC3E}">
-        <p14:creationId xmlns:p14="http://schemas.microsoft.com/office/powerpoint/2010/main" val="3171497421"/>
-      </p:ext>
-    </p:extLst>
-  </p:cSld>
-  <p:clrMapOvr>
-    <a:masterClrMapping/>
-  </p:clrMapOvr>
-</p:sld>
-</file>
-
-<file path=ppt/slides/slide11.xml><?xml version="1.0" encoding="utf-8"?>
 <p:sld xmlns:a="http://schemas.openxmlformats.org/drawingml/2006/main" xmlns:r="http://schemas.openxmlformats.org/officeDocument/2006/relationships" xmlns:p="http://schemas.openxmlformats.org/presentationml/2006/main">
   <p:cSld>
     <p:spTree>
@@ -3725,7 +3644,7 @@
             <a:pPr algn="ctr"/>
             <a:r>
               <a:rPr lang="fr-FR" dirty="0"/>
-              <a:t>Fonctionnement du site </a:t>
+              <a:t>Tâche particulière</a:t>
             </a:r>
           </a:p>
         </p:txBody>
@@ -3806,7 +3725,7 @@
 </p:sld>
 </file>
 
-<file path=ppt/slides/slide12.xml><?xml version="1.0" encoding="utf-8"?>
+<file path=ppt/slides/slide11.xml><?xml version="1.0" encoding="utf-8"?>
 <p:sld xmlns:a="http://schemas.openxmlformats.org/drawingml/2006/main" xmlns:r="http://schemas.openxmlformats.org/officeDocument/2006/relationships" xmlns:p="http://schemas.openxmlformats.org/presentationml/2006/main">
   <p:cSld>
     <p:spTree>
@@ -3844,7 +3763,10 @@
           <a:bodyPr/>
           <a:lstStyle/>
           <a:p>
-            <a:endParaRPr lang="fr-FR"/>
+            <a:r>
+              <a:rPr lang="fr-FR" dirty="0"/>
+              <a:t>Bilan personnel</a:t>
+            </a:r>
           </a:p>
         </p:txBody>
       </p:sp>
@@ -4077,7 +3999,7 @@
             <a:pPr algn="ctr"/>
             <a:r>
               <a:rPr lang="fr-FR" dirty="0"/>
-              <a:t>Fonctionnement du site </a:t>
+              <a:t>Tâche particulière</a:t>
             </a:r>
           </a:p>
         </p:txBody>
@@ -4349,7 +4271,7 @@
             <a:pPr algn="ctr"/>
             <a:r>
               <a:rPr lang="fr-FR" dirty="0"/>
-              <a:t>Fonctionnement du site </a:t>
+              <a:t>Tâche particulière</a:t>
             </a:r>
           </a:p>
         </p:txBody>
@@ -4452,7 +4374,7 @@
           <p:cNvPr id="2" name="Titre 1">
             <a:extLst>
               <a:ext uri="{FF2B5EF4-FFF2-40B4-BE49-F238E27FC236}">
-                <a16:creationId xmlns:a16="http://schemas.microsoft.com/office/drawing/2014/main" id="{FB223375-D25D-6942-9640-B3EC56AB30A6}"/>
+                <a16:creationId xmlns:a16="http://schemas.microsoft.com/office/drawing/2014/main" id="{97D80975-548B-F241-A0AF-8B0D1A0E51A7}"/>
               </a:ext>
             </a:extLst>
           </p:cNvPr>
@@ -4470,7 +4392,7 @@
           <a:p>
             <a:r>
               <a:rPr lang="fr-FR" dirty="0"/>
-              <a:t>Sommaire</a:t>
+              <a:t>Objectifs</a:t>
             </a:r>
           </a:p>
         </p:txBody>
@@ -4480,7 +4402,7 @@
           <p:cNvPr id="3" name="Espace réservé du contenu 2">
             <a:extLst>
               <a:ext uri="{FF2B5EF4-FFF2-40B4-BE49-F238E27FC236}">
-                <a16:creationId xmlns:a16="http://schemas.microsoft.com/office/drawing/2014/main" id="{54B4E58C-E4E8-C34C-903C-BB4E78253D5C}"/>
+                <a16:creationId xmlns:a16="http://schemas.microsoft.com/office/drawing/2014/main" id="{E34C3FAB-B716-5F46-904E-5AA939524112}"/>
               </a:ext>
             </a:extLst>
           </p:cNvPr>
@@ -4493,34 +4415,90 @@
         </p:nvSpPr>
         <p:spPr>
           <a:xfrm>
-            <a:off x="2231136" y="2638044"/>
-            <a:ext cx="7729728" cy="3101983"/>
+            <a:off x="2231136" y="2380229"/>
+            <a:ext cx="8650224" cy="4095386"/>
           </a:xfrm>
         </p:spPr>
         <p:txBody>
-          <a:bodyPr/>
-          <a:lstStyle/>
-          <a:p>
+          <a:bodyPr>
+            <a:normAutofit/>
+          </a:bodyPr>
+          <a:lstStyle/>
+          <a:p>
+            <a:pPr lvl="0"/>
             <a:r>
               <a:rPr lang="fr-FR" dirty="0"/>
-              <a:t>Objectifs</a:t>
-            </a:r>
-          </a:p>
-          <a:p>
+              <a:t>Création d’un site d’e-commerce</a:t>
+            </a:r>
+          </a:p>
+          <a:p>
+            <a:pPr lvl="0"/>
             <a:r>
               <a:rPr lang="fr-FR" dirty="0"/>
-              <a:t>Captures d’écran du site</a:t>
-            </a:r>
-          </a:p>
-          <a:p>
-            <a:endParaRPr lang="fr-FR" dirty="0"/>
+              <a:t>Plusieurs pages à disposition</a:t>
+            </a:r>
+          </a:p>
+          <a:p>
+            <a:pPr lvl="1"/>
+            <a:r>
+              <a:rPr lang="fr-FR" dirty="0"/>
+              <a:t>Accueil</a:t>
+            </a:r>
+          </a:p>
+          <a:p>
+            <a:pPr lvl="1"/>
+            <a:r>
+              <a:rPr lang="fr-FR" dirty="0"/>
+              <a:t>La page article</a:t>
+            </a:r>
+          </a:p>
+          <a:p>
+            <a:pPr lvl="1"/>
+            <a:r>
+              <a:rPr lang="fr-FR" dirty="0"/>
+              <a:t>Les détails des articles </a:t>
+            </a:r>
+          </a:p>
+          <a:p>
+            <a:pPr lvl="1"/>
+            <a:r>
+              <a:rPr lang="fr-FR" dirty="0"/>
+              <a:t>Panier</a:t>
+            </a:r>
+          </a:p>
+          <a:p>
+            <a:pPr lvl="1"/>
+            <a:r>
+              <a:rPr lang="fr-FR" dirty="0"/>
+              <a:t>Contact</a:t>
+            </a:r>
+          </a:p>
+          <a:p>
+            <a:r>
+              <a:rPr lang="fr-FR" dirty="0"/>
+              <a:t>Page pour les administrateurs </a:t>
+            </a:r>
+          </a:p>
+          <a:p>
+            <a:pPr lvl="1"/>
+            <a:r>
+              <a:rPr lang="fr-FR" dirty="0"/>
+              <a:t>Ajouter un article </a:t>
+            </a:r>
+          </a:p>
+          <a:p>
+            <a:pPr lvl="1"/>
+            <a:r>
+              <a:rPr lang="fr-FR" dirty="0"/>
+              <a:t>Gérer les articles 	</a:t>
+            </a:r>
           </a:p>
         </p:txBody>
       </p:sp>
     </p:spTree>
     <p:extLst>
       <p:ext uri="{BB962C8B-B14F-4D97-AF65-F5344CB8AC3E}">
-        <p14:creationId xmlns:p14="http://schemas.microsoft.com/office/powerpoint/2010/main" val="3686479324"/>
+        <p14:creationId xmlns:p14="http://schemas.microsoft.com/office/powerpoint/2010/main" val="1669379113"/>
       </p:ext>
     </p:extLst>
   </p:cSld>
@@ -4547,162 +4525,6 @@
           <a:chExt cx="0" cy="0"/>
         </a:xfrm>
       </p:grpSpPr>
-      <p:sp>
-        <p:nvSpPr>
-          <p:cNvPr id="2" name="Titre 1">
-            <a:extLst>
-              <a:ext uri="{FF2B5EF4-FFF2-40B4-BE49-F238E27FC236}">
-                <a16:creationId xmlns:a16="http://schemas.microsoft.com/office/drawing/2014/main" id="{97D80975-548B-F241-A0AF-8B0D1A0E51A7}"/>
-              </a:ext>
-            </a:extLst>
-          </p:cNvPr>
-          <p:cNvSpPr>
-            <a:spLocks noGrp="1"/>
-          </p:cNvSpPr>
-          <p:nvPr>
-            <p:ph type="title"/>
-          </p:nvPr>
-        </p:nvSpPr>
-        <p:spPr/>
-        <p:txBody>
-          <a:bodyPr/>
-          <a:lstStyle/>
-          <a:p>
-            <a:r>
-              <a:rPr lang="fr-FR" dirty="0"/>
-              <a:t>Objectifs</a:t>
-            </a:r>
-          </a:p>
-        </p:txBody>
-      </p:sp>
-      <p:sp>
-        <p:nvSpPr>
-          <p:cNvPr id="3" name="Espace réservé du contenu 2">
-            <a:extLst>
-              <a:ext uri="{FF2B5EF4-FFF2-40B4-BE49-F238E27FC236}">
-                <a16:creationId xmlns:a16="http://schemas.microsoft.com/office/drawing/2014/main" id="{E34C3FAB-B716-5F46-904E-5AA939524112}"/>
-              </a:ext>
-            </a:extLst>
-          </p:cNvPr>
-          <p:cNvSpPr>
-            <a:spLocks noGrp="1"/>
-          </p:cNvSpPr>
-          <p:nvPr>
-            <p:ph idx="1"/>
-          </p:nvPr>
-        </p:nvSpPr>
-        <p:spPr>
-          <a:xfrm>
-            <a:off x="2231136" y="2380229"/>
-            <a:ext cx="8650224" cy="4095386"/>
-          </a:xfrm>
-        </p:spPr>
-        <p:txBody>
-          <a:bodyPr>
-            <a:normAutofit/>
-          </a:bodyPr>
-          <a:lstStyle/>
-          <a:p>
-            <a:pPr lvl="0"/>
-            <a:r>
-              <a:rPr lang="fr-FR" dirty="0"/>
-              <a:t>Création d’un site d’e-commerce</a:t>
-            </a:r>
-          </a:p>
-          <a:p>
-            <a:pPr lvl="0"/>
-            <a:r>
-              <a:rPr lang="fr-FR" dirty="0"/>
-              <a:t>Plusieurs pages à disposition</a:t>
-            </a:r>
-          </a:p>
-          <a:p>
-            <a:pPr lvl="1"/>
-            <a:r>
-              <a:rPr lang="fr-FR" dirty="0"/>
-              <a:t>Accueil</a:t>
-            </a:r>
-          </a:p>
-          <a:p>
-            <a:pPr lvl="1"/>
-            <a:r>
-              <a:rPr lang="fr-FR" dirty="0"/>
-              <a:t>La page article</a:t>
-            </a:r>
-          </a:p>
-          <a:p>
-            <a:pPr lvl="1"/>
-            <a:r>
-              <a:rPr lang="fr-FR" dirty="0"/>
-              <a:t>Les détails des articles </a:t>
-            </a:r>
-          </a:p>
-          <a:p>
-            <a:pPr lvl="1"/>
-            <a:r>
-              <a:rPr lang="fr-FR" dirty="0"/>
-              <a:t>Panier</a:t>
-            </a:r>
-          </a:p>
-          <a:p>
-            <a:pPr lvl="1"/>
-            <a:r>
-              <a:rPr lang="fr-FR" dirty="0"/>
-              <a:t>Contact</a:t>
-            </a:r>
-          </a:p>
-          <a:p>
-            <a:r>
-              <a:rPr lang="fr-FR" dirty="0"/>
-              <a:t>Page pour les administrateurs </a:t>
-            </a:r>
-          </a:p>
-          <a:p>
-            <a:pPr lvl="1"/>
-            <a:r>
-              <a:rPr lang="fr-FR" dirty="0"/>
-              <a:t>Ajouter un article </a:t>
-            </a:r>
-          </a:p>
-          <a:p>
-            <a:pPr lvl="1"/>
-            <a:r>
-              <a:rPr lang="fr-FR" dirty="0"/>
-              <a:t>Gérer les articles 	</a:t>
-            </a:r>
-          </a:p>
-        </p:txBody>
-      </p:sp>
-    </p:spTree>
-    <p:extLst>
-      <p:ext uri="{BB962C8B-B14F-4D97-AF65-F5344CB8AC3E}">
-        <p14:creationId xmlns:p14="http://schemas.microsoft.com/office/powerpoint/2010/main" val="1669379113"/>
-      </p:ext>
-    </p:extLst>
-  </p:cSld>
-  <p:clrMapOvr>
-    <a:masterClrMapping/>
-  </p:clrMapOvr>
-</p:sld>
-</file>
-
-<file path=ppt/slides/slide6.xml><?xml version="1.0" encoding="utf-8"?>
-<p:sld xmlns:a="http://schemas.openxmlformats.org/drawingml/2006/main" xmlns:r="http://schemas.openxmlformats.org/officeDocument/2006/relationships" xmlns:p="http://schemas.openxmlformats.org/presentationml/2006/main">
-  <p:cSld>
-    <p:spTree>
-      <p:nvGrpSpPr>
-        <p:cNvPr id="1" name=""/>
-        <p:cNvGrpSpPr/>
-        <p:nvPr/>
-      </p:nvGrpSpPr>
-      <p:grpSpPr>
-        <a:xfrm>
-          <a:off x="0" y="0"/>
-          <a:ext cx="0" cy="0"/>
-          <a:chOff x="0" y="0"/>
-          <a:chExt cx="0" cy="0"/>
-        </a:xfrm>
-      </p:grpSpPr>
       <p:pic>
         <p:nvPicPr>
           <p:cNvPr id="4" name="Espace réservé du contenu 3"/>
@@ -4727,8 +4549,8 @@
         </p:blipFill>
         <p:spPr>
           <a:xfrm>
-            <a:off x="8370" y="321733"/>
-            <a:ext cx="12183630" cy="5994400"/>
+            <a:off x="-98" y="321733"/>
+            <a:ext cx="12192097" cy="5994400"/>
           </a:xfrm>
         </p:spPr>
       </p:pic>
@@ -4745,7 +4567,7 @@
 </p:sld>
 </file>
 
-<file path=ppt/slides/slide7.xml><?xml version="1.0" encoding="utf-8"?>
+<file path=ppt/slides/slide6.xml><?xml version="1.0" encoding="utf-8"?>
 <p:sld xmlns:a="http://schemas.openxmlformats.org/drawingml/2006/main" xmlns:r="http://schemas.openxmlformats.org/officeDocument/2006/relationships" xmlns:p="http://schemas.openxmlformats.org/presentationml/2006/main">
   <p:cSld>
     <p:spTree>
@@ -4805,7 +4627,7 @@
 </p:sld>
 </file>
 
-<file path=ppt/slides/slide8.xml><?xml version="1.0" encoding="utf-8"?>
+<file path=ppt/slides/slide7.xml><?xml version="1.0" encoding="utf-8"?>
 <p:sld xmlns:a="http://schemas.openxmlformats.org/drawingml/2006/main" xmlns:r="http://schemas.openxmlformats.org/officeDocument/2006/relationships" xmlns:p="http://schemas.openxmlformats.org/presentationml/2006/main">
   <p:cSld>
     <p:spTree>
@@ -4865,7 +4687,7 @@
 </p:sld>
 </file>
 
-<file path=ppt/slides/slide9.xml><?xml version="1.0" encoding="utf-8"?>
+<file path=ppt/slides/slide8.xml><?xml version="1.0" encoding="utf-8"?>
 <p:sld xmlns:a="http://schemas.openxmlformats.org/drawingml/2006/main" xmlns:r="http://schemas.openxmlformats.org/officeDocument/2006/relationships" xmlns:p="http://schemas.openxmlformats.org/presentationml/2006/main">
   <p:cSld>
     <p:spTree>
@@ -5056,7 +4878,7 @@
             <a:pPr algn="ctr"/>
             <a:r>
               <a:rPr lang="fr-FR" dirty="0"/>
-              <a:t>Fonctionnement du site </a:t>
+              <a:t>Tâche particulière</a:t>
             </a:r>
           </a:p>
         </p:txBody>
@@ -5128,6 +4950,131 @@
     <p:extLst>
       <p:ext uri="{BB962C8B-B14F-4D97-AF65-F5344CB8AC3E}">
         <p14:creationId xmlns:p14="http://schemas.microsoft.com/office/powerpoint/2010/main" val="4082113685"/>
+      </p:ext>
+    </p:extLst>
+  </p:cSld>
+  <p:clrMapOvr>
+    <a:masterClrMapping/>
+  </p:clrMapOvr>
+</p:sld>
+</file>
+
+<file path=ppt/slides/slide9.xml><?xml version="1.0" encoding="utf-8"?>
+<p:sld xmlns:a="http://schemas.openxmlformats.org/drawingml/2006/main" xmlns:r="http://schemas.openxmlformats.org/officeDocument/2006/relationships" xmlns:p="http://schemas.openxmlformats.org/presentationml/2006/main">
+  <p:cSld>
+    <p:spTree>
+      <p:nvGrpSpPr>
+        <p:cNvPr id="1" name=""/>
+        <p:cNvGrpSpPr/>
+        <p:nvPr/>
+      </p:nvGrpSpPr>
+      <p:grpSpPr>
+        <a:xfrm>
+          <a:off x="0" y="0"/>
+          <a:ext cx="0" cy="0"/>
+          <a:chOff x="0" y="0"/>
+          <a:chExt cx="0" cy="0"/>
+        </a:xfrm>
+      </p:grpSpPr>
+      <p:sp>
+        <p:nvSpPr>
+          <p:cNvPr id="2" name="Titre 1">
+            <a:extLst>
+              <a:ext uri="{FF2B5EF4-FFF2-40B4-BE49-F238E27FC236}">
+                <a16:creationId xmlns:a16="http://schemas.microsoft.com/office/drawing/2014/main" id="{A82AF29E-BCB1-7E43-B371-525D02459596}"/>
+              </a:ext>
+            </a:extLst>
+          </p:cNvPr>
+          <p:cNvSpPr>
+            <a:spLocks noGrp="1"/>
+          </p:cNvSpPr>
+          <p:nvPr>
+            <p:ph type="title"/>
+          </p:nvPr>
+        </p:nvSpPr>
+        <p:spPr/>
+        <p:txBody>
+          <a:bodyPr/>
+          <a:lstStyle/>
+          <a:p>
+            <a:r>
+              <a:rPr lang="fr-FR" dirty="0"/>
+              <a:t>La fonction</a:t>
+            </a:r>
+          </a:p>
+        </p:txBody>
+      </p:sp>
+      <p:sp>
+        <p:nvSpPr>
+          <p:cNvPr id="3" name="Espace réservé du contenu 2">
+            <a:extLst>
+              <a:ext uri="{FF2B5EF4-FFF2-40B4-BE49-F238E27FC236}">
+                <a16:creationId xmlns:a16="http://schemas.microsoft.com/office/drawing/2014/main" id="{9BDA6180-8A67-5E40-8F75-F4993C45AB09}"/>
+              </a:ext>
+            </a:extLst>
+          </p:cNvPr>
+          <p:cNvSpPr>
+            <a:spLocks noGrp="1"/>
+          </p:cNvSpPr>
+          <p:nvPr>
+            <p:ph idx="1"/>
+          </p:nvPr>
+        </p:nvSpPr>
+        <p:spPr/>
+        <p:txBody>
+          <a:bodyPr/>
+          <a:lstStyle/>
+          <a:p>
+            <a:r>
+              <a:rPr lang="fr-FR" dirty="0"/>
+              <a:t>Ajouter un article</a:t>
+            </a:r>
+          </a:p>
+          <a:p>
+            <a:r>
+              <a:rPr lang="fr-FR" dirty="0"/>
+              <a:t>Aller étape par étape </a:t>
+            </a:r>
+          </a:p>
+          <a:p>
+            <a:r>
+              <a:rPr lang="fr-FR" dirty="0"/>
+              <a:t>Faire tous les tests </a:t>
+            </a:r>
+          </a:p>
+          <a:p>
+            <a:pPr lvl="1"/>
+            <a:r>
+              <a:rPr lang="fr-FR" dirty="0"/>
+              <a:t>Marques </a:t>
+            </a:r>
+          </a:p>
+          <a:p>
+            <a:pPr lvl="1"/>
+            <a:r>
+              <a:rPr lang="fr-FR" dirty="0"/>
+              <a:t>Modèles </a:t>
+            </a:r>
+          </a:p>
+          <a:p>
+            <a:pPr lvl="1"/>
+            <a:r>
+              <a:rPr lang="fr-FR" dirty="0"/>
+              <a:t>Couleurs</a:t>
+            </a:r>
+          </a:p>
+          <a:p>
+            <a:r>
+              <a:rPr lang="fr-FR" dirty="0"/>
+              <a:t>Ajouter les images</a:t>
+            </a:r>
+          </a:p>
+        </p:txBody>
+      </p:sp>
+    </p:spTree>
+    <p:extLst>
+      <p:ext uri="{BB962C8B-B14F-4D97-AF65-F5344CB8AC3E}">
+        <p14:creationId xmlns:p14="http://schemas.microsoft.com/office/powerpoint/2010/main" val="3171497421"/>
       </p:ext>
     </p:extLst>
   </p:cSld>

</xml_diff>

<commit_message>
Nouvelle image dans le powerpoint
</commit_message>
<xml_diff>
--- a/Documentation/Présentation.pptx
+++ b/Documentation/Présentation.pptx
@@ -14,8 +14,10 @@
     <p:sldId id="269" r:id="rId8"/>
     <p:sldId id="271" r:id="rId9"/>
     <p:sldId id="261" r:id="rId10"/>
-    <p:sldId id="272" r:id="rId11"/>
-    <p:sldId id="265" r:id="rId12"/>
+    <p:sldId id="273" r:id="rId11"/>
+    <p:sldId id="272" r:id="rId12"/>
+    <p:sldId id="265" r:id="rId13"/>
+    <p:sldId id="274" r:id="rId14"/>
   </p:sldIdLst>
   <p:sldSz cx="12192000" cy="6858000"/>
   <p:notesSz cx="6858000" cy="9144000"/>
@@ -286,7 +288,7 @@
             <a:fld id="{08B9EBBA-996F-894A-B54A-D6246ED52CEA}" type="datetimeFigureOut">
               <a:rPr lang="en-US" smtClean="0"/>
               <a:pPr/>
-              <a:t>4/19/18</a:t>
+              <a:t>4/20/2018</a:t>
             </a:fld>
             <a:endParaRPr lang="en-US" dirty="0"/>
           </a:p>
@@ -458,7 +460,7 @@
             <a:fld id="{C6C52C72-DE31-F449-A4ED-4C594FD91407}" type="datetimeFigureOut">
               <a:rPr lang="en-US" smtClean="0"/>
               <a:pPr/>
-              <a:t>4/19/18</a:t>
+              <a:t>4/20/2018</a:t>
             </a:fld>
             <a:endParaRPr lang="en-US" dirty="0"/>
           </a:p>
@@ -640,7 +642,7 @@
             <a:fld id="{ED62726E-379B-B349-9EED-81ED093FA806}" type="datetimeFigureOut">
               <a:rPr lang="en-US" smtClean="0"/>
               <a:pPr/>
-              <a:t>4/19/18</a:t>
+              <a:t>4/20/2018</a:t>
             </a:fld>
             <a:endParaRPr lang="en-US" dirty="0"/>
           </a:p>
@@ -812,7 +814,7 @@
             <a:fld id="{9B3A1323-8D79-1946-B0D7-40001CF92E9D}" type="datetimeFigureOut">
               <a:rPr lang="en-US" smtClean="0"/>
               <a:pPr/>
-              <a:t>4/19/18</a:t>
+              <a:t>4/20/2018</a:t>
             </a:fld>
             <a:endParaRPr lang="en-US" dirty="0"/>
           </a:p>
@@ -1082,7 +1084,7 @@
             <a:fld id="{8DFA1846-DA80-1C48-A609-854EA85C59AD}" type="datetimeFigureOut">
               <a:rPr lang="en-US" smtClean="0"/>
               <a:pPr/>
-              <a:t>4/19/18</a:t>
+              <a:t>4/20/2018</a:t>
             </a:fld>
             <a:endParaRPr lang="en-US" dirty="0"/>
           </a:p>
@@ -1316,7 +1318,7 @@
             <a:fld id="{57302355-E14B-8545-A8F8-0FE83CC9D524}" type="datetimeFigureOut">
               <a:rPr lang="en-US" smtClean="0"/>
               <a:pPr/>
-              <a:t>4/19/18</a:t>
+              <a:t>4/20/2018</a:t>
             </a:fld>
             <a:endParaRPr lang="en-US" dirty="0"/>
           </a:p>
@@ -1677,7 +1679,7 @@
             <a:fld id="{09B482E8-6E0E-1B4F-B1FD-C69DB9E858D9}" type="datetimeFigureOut">
               <a:rPr lang="en-US" smtClean="0"/>
               <a:pPr/>
-              <a:t>4/19/18</a:t>
+              <a:t>4/20/2018</a:t>
             </a:fld>
             <a:endParaRPr lang="en-US" dirty="0"/>
           </a:p>
@@ -1821,7 +1823,7 @@
             <a:fld id="{F13A34C8-038E-2045-AF43-DF7DBB8E0E9E}" type="datetimeFigureOut">
               <a:rPr lang="en-US" smtClean="0"/>
               <a:pPr/>
-              <a:t>4/19/18</a:t>
+              <a:t>4/20/2018</a:t>
             </a:fld>
             <a:endParaRPr lang="en-US" dirty="0"/>
           </a:p>
@@ -1918,7 +1920,7 @@
             <a:fld id="{8818C68F-D26B-8F47-958C-23B49CF8A634}" type="datetimeFigureOut">
               <a:rPr lang="en-US" smtClean="0"/>
               <a:pPr/>
-              <a:t>4/19/18</a:t>
+              <a:t>4/20/2018</a:t>
             </a:fld>
             <a:endParaRPr lang="en-US" dirty="0"/>
           </a:p>
@@ -2277,7 +2279,7 @@
             <a:fld id="{D0DF5E60-9974-AC48-9591-99C2BB44B7CF}" type="datetimeFigureOut">
               <a:rPr lang="en-US" smtClean="0"/>
               <a:pPr/>
-              <a:t>4/19/18</a:t>
+              <a:t>4/20/2018</a:t>
             </a:fld>
             <a:endParaRPr lang="en-US" dirty="0"/>
           </a:p>
@@ -2636,7 +2638,7 @@
             <a:fld id="{09B482E8-6E0E-1B4F-B1FD-C69DB9E858D9}" type="datetimeFigureOut">
               <a:rPr lang="en-US" smtClean="0"/>
               <a:pPr/>
-              <a:t>4/19/18</a:t>
+              <a:t>4/20/2018</a:t>
             </a:fld>
             <a:endParaRPr lang="en-US" dirty="0"/>
           </a:p>
@@ -2880,7 +2882,7 @@
             <a:fld id="{09B482E8-6E0E-1B4F-B1FD-C69DB9E858D9}" type="datetimeFigureOut">
               <a:rPr lang="en-US" smtClean="0"/>
               <a:pPr/>
-              <a:t>4/19/18</a:t>
+              <a:t>4/20/2018</a:t>
             </a:fld>
             <a:endParaRPr lang="en-US" dirty="0"/>
           </a:p>
@@ -3450,10 +3452,85 @@
   <p:clrMapOvr>
     <a:masterClrMapping/>
   </p:clrMapOvr>
+  <p:timing>
+    <p:tnLst>
+      <p:par>
+        <p:cTn id="1" dur="indefinite" restart="never" nodeType="tmRoot"/>
+      </p:par>
+    </p:tnLst>
+  </p:timing>
 </p:sld>
 </file>
 
 <file path=ppt/slides/slide10.xml><?xml version="1.0" encoding="utf-8"?>
+<p:sld xmlns:a="http://schemas.openxmlformats.org/drawingml/2006/main" xmlns:r="http://schemas.openxmlformats.org/officeDocument/2006/relationships" xmlns:p="http://schemas.openxmlformats.org/presentationml/2006/main">
+  <p:cSld>
+    <p:spTree>
+      <p:nvGrpSpPr>
+        <p:cNvPr id="1" name=""/>
+        <p:cNvGrpSpPr/>
+        <p:nvPr/>
+      </p:nvGrpSpPr>
+      <p:grpSpPr>
+        <a:xfrm>
+          <a:off x="0" y="0"/>
+          <a:ext cx="0" cy="0"/>
+          <a:chOff x="0" y="0"/>
+          <a:chExt cx="0" cy="0"/>
+        </a:xfrm>
+      </p:grpSpPr>
+      <p:sp>
+        <p:nvSpPr>
+          <p:cNvPr id="2" name="Titre 1"/>
+          <p:cNvSpPr>
+            <a:spLocks noGrp="1"/>
+          </p:cNvSpPr>
+          <p:nvPr>
+            <p:ph type="title"/>
+          </p:nvPr>
+        </p:nvSpPr>
+        <p:spPr/>
+        <p:txBody>
+          <a:bodyPr/>
+          <a:lstStyle/>
+          <a:p>
+            <a:endParaRPr lang="fr-CH"/>
+          </a:p>
+        </p:txBody>
+      </p:sp>
+      <p:sp>
+        <p:nvSpPr>
+          <p:cNvPr id="3" name="Espace réservé du contenu 2"/>
+          <p:cNvSpPr>
+            <a:spLocks noGrp="1"/>
+          </p:cNvSpPr>
+          <p:nvPr>
+            <p:ph idx="1"/>
+          </p:nvPr>
+        </p:nvSpPr>
+        <p:spPr/>
+        <p:txBody>
+          <a:bodyPr/>
+          <a:lstStyle/>
+          <a:p>
+            <a:endParaRPr lang="fr-CH"/>
+          </a:p>
+        </p:txBody>
+      </p:sp>
+    </p:spTree>
+    <p:extLst>
+      <p:ext uri="{BB962C8B-B14F-4D97-AF65-F5344CB8AC3E}">
+        <p14:creationId xmlns:p14="http://schemas.microsoft.com/office/powerpoint/2010/main" val="3087270670"/>
+      </p:ext>
+    </p:extLst>
+  </p:cSld>
+  <p:clrMapOvr>
+    <a:masterClrMapping/>
+  </p:clrMapOvr>
+</p:sld>
+</file>
+
+<file path=ppt/slides/slide11.xml><?xml version="1.0" encoding="utf-8"?>
 <p:sld xmlns:a="http://schemas.openxmlformats.org/drawingml/2006/main" xmlns:r="http://schemas.openxmlformats.org/officeDocument/2006/relationships" xmlns:p="http://schemas.openxmlformats.org/presentationml/2006/main">
   <p:cSld>
     <p:spTree>
@@ -3722,10 +3799,17 @@
   <p:clrMapOvr>
     <a:masterClrMapping/>
   </p:clrMapOvr>
+  <p:timing>
+    <p:tnLst>
+      <p:par>
+        <p:cTn id="1" dur="indefinite" restart="never" nodeType="tmRoot"/>
+      </p:par>
+    </p:tnLst>
+  </p:timing>
 </p:sld>
 </file>
 
-<file path=ppt/slides/slide11.xml><?xml version="1.0" encoding="utf-8"?>
+<file path=ppt/slides/slide12.xml><?xml version="1.0" encoding="utf-8"?>
 <p:sld xmlns:a="http://schemas.openxmlformats.org/drawingml/2006/main" xmlns:r="http://schemas.openxmlformats.org/officeDocument/2006/relationships" xmlns:p="http://schemas.openxmlformats.org/presentationml/2006/main">
   <p:cSld>
     <p:spTree>
@@ -3805,6 +3889,80 @@
   <p:clrMapOvr>
     <a:masterClrMapping/>
   </p:clrMapOvr>
+  <p:timing>
+    <p:tnLst>
+      <p:par>
+        <p:cTn id="1" dur="indefinite" restart="never" nodeType="tmRoot"/>
+      </p:par>
+    </p:tnLst>
+  </p:timing>
+</p:sld>
+</file>
+
+<file path=ppt/slides/slide13.xml><?xml version="1.0" encoding="utf-8"?>
+<p:sld xmlns:a="http://schemas.openxmlformats.org/drawingml/2006/main" xmlns:r="http://schemas.openxmlformats.org/officeDocument/2006/relationships" xmlns:p="http://schemas.openxmlformats.org/presentationml/2006/main">
+  <p:cSld>
+    <p:spTree>
+      <p:nvGrpSpPr>
+        <p:cNvPr id="1" name=""/>
+        <p:cNvGrpSpPr/>
+        <p:nvPr/>
+      </p:nvGrpSpPr>
+      <p:grpSpPr>
+        <a:xfrm>
+          <a:off x="0" y="0"/>
+          <a:ext cx="0" cy="0"/>
+          <a:chOff x="0" y="0"/>
+          <a:chExt cx="0" cy="0"/>
+        </a:xfrm>
+      </p:grpSpPr>
+      <p:pic>
+        <p:nvPicPr>
+          <p:cNvPr id="2" name="Image 1"/>
+          <p:cNvPicPr>
+            <a:picLocks noChangeAspect="1"/>
+          </p:cNvPicPr>
+          <p:nvPr/>
+        </p:nvPicPr>
+        <p:blipFill>
+          <a:blip r:embed="rId2">
+            <a:extLst>
+              <a:ext uri="{28A0092B-C50C-407E-A947-70E740481C1C}">
+                <a14:useLocalDpi xmlns:a14="http://schemas.microsoft.com/office/drawing/2010/main" val="0"/>
+              </a:ext>
+            </a:extLst>
+          </a:blip>
+          <a:stretch>
+            <a:fillRect/>
+          </a:stretch>
+        </p:blipFill>
+        <p:spPr>
+          <a:xfrm>
+            <a:off x="2510444" y="1427292"/>
+            <a:ext cx="7000701" cy="4200421"/>
+          </a:xfrm>
+          <a:prstGeom prst="rect">
+            <a:avLst/>
+          </a:prstGeom>
+        </p:spPr>
+      </p:pic>
+    </p:spTree>
+    <p:extLst>
+      <p:ext uri="{BB962C8B-B14F-4D97-AF65-F5344CB8AC3E}">
+        <p14:creationId xmlns:p14="http://schemas.microsoft.com/office/powerpoint/2010/main" val="310465381"/>
+      </p:ext>
+    </p:extLst>
+  </p:cSld>
+  <p:clrMapOvr>
+    <a:masterClrMapping/>
+  </p:clrMapOvr>
+  <p:timing>
+    <p:tnLst>
+      <p:par>
+        <p:cTn id="1" dur="indefinite" restart="never" nodeType="tmRoot"/>
+      </p:par>
+    </p:tnLst>
+  </p:timing>
 </p:sld>
 </file>
 
@@ -4077,6 +4235,13 @@
   <p:clrMapOvr>
     <a:masterClrMapping/>
   </p:clrMapOvr>
+  <p:timing>
+    <p:tnLst>
+      <p:par>
+        <p:cTn id="1" dur="indefinite" restart="never" nodeType="tmRoot"/>
+      </p:par>
+    </p:tnLst>
+  </p:timing>
 </p:sld>
 </file>
 
@@ -4349,6 +4514,13 @@
   <p:clrMapOvr>
     <a:masterClrMapping/>
   </p:clrMapOvr>
+  <p:timing>
+    <p:tnLst>
+      <p:par>
+        <p:cTn id="1" dur="indefinite" restart="never" nodeType="tmRoot"/>
+      </p:par>
+    </p:tnLst>
+  </p:timing>
 </p:sld>
 </file>
 
@@ -4505,6 +4677,13 @@
   <p:clrMapOvr>
     <a:masterClrMapping/>
   </p:clrMapOvr>
+  <p:timing>
+    <p:tnLst>
+      <p:par>
+        <p:cTn id="1" dur="indefinite" restart="never" nodeType="tmRoot"/>
+      </p:par>
+    </p:tnLst>
+  </p:timing>
 </p:sld>
 </file>
 
@@ -4564,6 +4743,13 @@
   <p:clrMapOvr>
     <a:masterClrMapping/>
   </p:clrMapOvr>
+  <p:timing>
+    <p:tnLst>
+      <p:par>
+        <p:cTn id="1" dur="indefinite" restart="never" nodeType="tmRoot"/>
+      </p:par>
+    </p:tnLst>
+  </p:timing>
 </p:sld>
 </file>
 
@@ -4624,6 +4810,13 @@
   <p:clrMapOvr>
     <a:masterClrMapping/>
   </p:clrMapOvr>
+  <p:timing>
+    <p:tnLst>
+      <p:par>
+        <p:cTn id="1" dur="indefinite" restart="never" nodeType="tmRoot"/>
+      </p:par>
+    </p:tnLst>
+  </p:timing>
 </p:sld>
 </file>
 
@@ -4684,6 +4877,13 @@
   <p:clrMapOvr>
     <a:masterClrMapping/>
   </p:clrMapOvr>
+  <p:timing>
+    <p:tnLst>
+      <p:par>
+        <p:cTn id="1" dur="indefinite" restart="never" nodeType="tmRoot"/>
+      </p:par>
+    </p:tnLst>
+  </p:timing>
 </p:sld>
 </file>
 
@@ -4956,6 +5156,13 @@
   <p:clrMapOvr>
     <a:masterClrMapping/>
   </p:clrMapOvr>
+  <p:timing>
+    <p:tnLst>
+      <p:par>
+        <p:cTn id="1" dur="indefinite" restart="never" nodeType="tmRoot"/>
+      </p:par>
+    </p:tnLst>
+  </p:timing>
 </p:sld>
 </file>
 
@@ -5081,6 +5288,13 @@
   <p:clrMapOvr>
     <a:masterClrMapping/>
   </p:clrMapOvr>
+  <p:timing>
+    <p:tnLst>
+      <p:par>
+        <p:cTn id="1" dur="indefinite" restart="never" nodeType="tmRoot"/>
+      </p:par>
+    </p:tnLst>
+  </p:timing>
 </p:sld>
 </file>
 

</xml_diff>

<commit_message>
Avancement du powerpoint de présentation
Ajout de nouvelles images et autres captures d'écrans
</commit_message>
<xml_diff>
--- a/Documentation/Présentation.pptx
+++ b/Documentation/Présentation.pptx
@@ -15,9 +15,11 @@
     <p:sldId id="271" r:id="rId9"/>
     <p:sldId id="261" r:id="rId10"/>
     <p:sldId id="273" r:id="rId11"/>
-    <p:sldId id="272" r:id="rId12"/>
-    <p:sldId id="265" r:id="rId13"/>
-    <p:sldId id="274" r:id="rId14"/>
+    <p:sldId id="275" r:id="rId12"/>
+    <p:sldId id="276" r:id="rId13"/>
+    <p:sldId id="272" r:id="rId14"/>
+    <p:sldId id="265" r:id="rId15"/>
+    <p:sldId id="274" r:id="rId16"/>
   </p:sldIdLst>
   <p:sldSz cx="12192000" cy="6858000"/>
   <p:notesSz cx="6858000" cy="9144000"/>
@@ -288,7 +290,7 @@
             <a:fld id="{08B9EBBA-996F-894A-B54A-D6246ED52CEA}" type="datetimeFigureOut">
               <a:rPr lang="en-US" smtClean="0"/>
               <a:pPr/>
-              <a:t>4/20/2018</a:t>
+              <a:t>4/20/18</a:t>
             </a:fld>
             <a:endParaRPr lang="en-US" dirty="0"/>
           </a:p>
@@ -460,7 +462,7 @@
             <a:fld id="{C6C52C72-DE31-F449-A4ED-4C594FD91407}" type="datetimeFigureOut">
               <a:rPr lang="en-US" smtClean="0"/>
               <a:pPr/>
-              <a:t>4/20/2018</a:t>
+              <a:t>4/20/18</a:t>
             </a:fld>
             <a:endParaRPr lang="en-US" dirty="0"/>
           </a:p>
@@ -642,7 +644,7 @@
             <a:fld id="{ED62726E-379B-B349-9EED-81ED093FA806}" type="datetimeFigureOut">
               <a:rPr lang="en-US" smtClean="0"/>
               <a:pPr/>
-              <a:t>4/20/2018</a:t>
+              <a:t>4/20/18</a:t>
             </a:fld>
             <a:endParaRPr lang="en-US" dirty="0"/>
           </a:p>
@@ -814,7 +816,7 @@
             <a:fld id="{9B3A1323-8D79-1946-B0D7-40001CF92E9D}" type="datetimeFigureOut">
               <a:rPr lang="en-US" smtClean="0"/>
               <a:pPr/>
-              <a:t>4/20/2018</a:t>
+              <a:t>4/20/18</a:t>
             </a:fld>
             <a:endParaRPr lang="en-US" dirty="0"/>
           </a:p>
@@ -1084,7 +1086,7 @@
             <a:fld id="{8DFA1846-DA80-1C48-A609-854EA85C59AD}" type="datetimeFigureOut">
               <a:rPr lang="en-US" smtClean="0"/>
               <a:pPr/>
-              <a:t>4/20/2018</a:t>
+              <a:t>4/20/18</a:t>
             </a:fld>
             <a:endParaRPr lang="en-US" dirty="0"/>
           </a:p>
@@ -1318,7 +1320,7 @@
             <a:fld id="{57302355-E14B-8545-A8F8-0FE83CC9D524}" type="datetimeFigureOut">
               <a:rPr lang="en-US" smtClean="0"/>
               <a:pPr/>
-              <a:t>4/20/2018</a:t>
+              <a:t>4/20/18</a:t>
             </a:fld>
             <a:endParaRPr lang="en-US" dirty="0"/>
           </a:p>
@@ -1679,7 +1681,7 @@
             <a:fld id="{09B482E8-6E0E-1B4F-B1FD-C69DB9E858D9}" type="datetimeFigureOut">
               <a:rPr lang="en-US" smtClean="0"/>
               <a:pPr/>
-              <a:t>4/20/2018</a:t>
+              <a:t>4/20/18</a:t>
             </a:fld>
             <a:endParaRPr lang="en-US" dirty="0"/>
           </a:p>
@@ -1823,7 +1825,7 @@
             <a:fld id="{F13A34C8-038E-2045-AF43-DF7DBB8E0E9E}" type="datetimeFigureOut">
               <a:rPr lang="en-US" smtClean="0"/>
               <a:pPr/>
-              <a:t>4/20/2018</a:t>
+              <a:t>4/20/18</a:t>
             </a:fld>
             <a:endParaRPr lang="en-US" dirty="0"/>
           </a:p>
@@ -1920,7 +1922,7 @@
             <a:fld id="{8818C68F-D26B-8F47-958C-23B49CF8A634}" type="datetimeFigureOut">
               <a:rPr lang="en-US" smtClean="0"/>
               <a:pPr/>
-              <a:t>4/20/2018</a:t>
+              <a:t>4/20/18</a:t>
             </a:fld>
             <a:endParaRPr lang="en-US" dirty="0"/>
           </a:p>
@@ -2279,7 +2281,7 @@
             <a:fld id="{D0DF5E60-9974-AC48-9591-99C2BB44B7CF}" type="datetimeFigureOut">
               <a:rPr lang="en-US" smtClean="0"/>
               <a:pPr/>
-              <a:t>4/20/2018</a:t>
+              <a:t>4/20/18</a:t>
             </a:fld>
             <a:endParaRPr lang="en-US" dirty="0"/>
           </a:p>
@@ -2638,7 +2640,7 @@
             <a:fld id="{09B482E8-6E0E-1B4F-B1FD-C69DB9E858D9}" type="datetimeFigureOut">
               <a:rPr lang="en-US" smtClean="0"/>
               <a:pPr/>
-              <a:t>4/20/2018</a:t>
+              <a:t>4/20/18</a:t>
             </a:fld>
             <a:endParaRPr lang="en-US" dirty="0"/>
           </a:p>
@@ -2882,7 +2884,7 @@
             <a:fld id="{09B482E8-6E0E-1B4F-B1FD-C69DB9E858D9}" type="datetimeFigureOut">
               <a:rPr lang="en-US" smtClean="0"/>
               <a:pPr/>
-              <a:t>4/20/2018</a:t>
+              <a:t>4/20/18</a:t>
             </a:fld>
             <a:endParaRPr lang="en-US" dirty="0"/>
           </a:p>
@@ -3452,13 +3454,6 @@
   <p:clrMapOvr>
     <a:masterClrMapping/>
   </p:clrMapOvr>
-  <p:timing>
-    <p:tnLst>
-      <p:par>
-        <p:cTn id="1" dur="indefinite" restart="never" nodeType="tmRoot"/>
-      </p:par>
-    </p:tnLst>
-  </p:timing>
 </p:sld>
 </file>
 
@@ -3479,44 +3474,35 @@
           <a:chExt cx="0" cy="0"/>
         </a:xfrm>
       </p:grpSpPr>
-      <p:sp>
-        <p:nvSpPr>
-          <p:cNvPr id="2" name="Titre 1"/>
-          <p:cNvSpPr>
-            <a:spLocks noGrp="1"/>
-          </p:cNvSpPr>
-          <p:nvPr>
-            <p:ph type="title"/>
-          </p:nvPr>
-        </p:nvSpPr>
-        <p:spPr/>
-        <p:txBody>
-          <a:bodyPr/>
-          <a:lstStyle/>
-          <a:p>
-            <a:endParaRPr lang="fr-CH"/>
-          </a:p>
-        </p:txBody>
-      </p:sp>
-      <p:sp>
-        <p:nvSpPr>
-          <p:cNvPr id="3" name="Espace réservé du contenu 2"/>
-          <p:cNvSpPr>
-            <a:spLocks noGrp="1"/>
-          </p:cNvSpPr>
+      <p:pic>
+        <p:nvPicPr>
+          <p:cNvPr id="5" name="Espace réservé du contenu 4">
+            <a:extLst>
+              <a:ext uri="{FF2B5EF4-FFF2-40B4-BE49-F238E27FC236}">
+                <a16:creationId xmlns:a16="http://schemas.microsoft.com/office/drawing/2014/main" id="{C3F3251F-03B4-094C-8A4A-90B88DB3A4F2}"/>
+              </a:ext>
+            </a:extLst>
+          </p:cNvPr>
+          <p:cNvPicPr>
+            <a:picLocks noGrp="1" noChangeAspect="1"/>
+          </p:cNvPicPr>
           <p:nvPr>
             <p:ph idx="1"/>
           </p:nvPr>
-        </p:nvSpPr>
-        <p:spPr/>
-        <p:txBody>
-          <a:bodyPr/>
-          <a:lstStyle/>
-          <a:p>
-            <a:endParaRPr lang="fr-CH"/>
-          </a:p>
-        </p:txBody>
-      </p:sp>
+        </p:nvPicPr>
+        <p:blipFill>
+          <a:blip r:embed="rId2"/>
+          <a:stretch>
+            <a:fillRect/>
+          </a:stretch>
+        </p:blipFill>
+        <p:spPr>
+          <a:xfrm>
+            <a:off x="0" y="400809"/>
+            <a:ext cx="12192000" cy="6087061"/>
+          </a:xfrm>
+        </p:spPr>
+      </p:pic>
     </p:spTree>
     <p:extLst>
       <p:ext uri="{BB962C8B-B14F-4D97-AF65-F5344CB8AC3E}">
@@ -3531,6 +3517,242 @@
 </file>
 
 <file path=ppt/slides/slide11.xml><?xml version="1.0" encoding="utf-8"?>
+<p:sld xmlns:a="http://schemas.openxmlformats.org/drawingml/2006/main" xmlns:r="http://schemas.openxmlformats.org/officeDocument/2006/relationships" xmlns:p="http://schemas.openxmlformats.org/presentationml/2006/main">
+  <p:cSld>
+    <p:spTree>
+      <p:nvGrpSpPr>
+        <p:cNvPr id="1" name=""/>
+        <p:cNvGrpSpPr/>
+        <p:nvPr/>
+      </p:nvGrpSpPr>
+      <p:grpSpPr>
+        <a:xfrm>
+          <a:off x="0" y="0"/>
+          <a:ext cx="0" cy="0"/>
+          <a:chOff x="0" y="0"/>
+          <a:chExt cx="0" cy="0"/>
+        </a:xfrm>
+      </p:grpSpPr>
+      <p:sp>
+        <p:nvSpPr>
+          <p:cNvPr id="2" name="Titre 1">
+            <a:extLst>
+              <a:ext uri="{FF2B5EF4-FFF2-40B4-BE49-F238E27FC236}">
+                <a16:creationId xmlns:a16="http://schemas.microsoft.com/office/drawing/2014/main" id="{12BC7597-904A-E94E-9FFC-6EAE4BCDDCEB}"/>
+              </a:ext>
+            </a:extLst>
+          </p:cNvPr>
+          <p:cNvSpPr>
+            <a:spLocks noGrp="1"/>
+          </p:cNvSpPr>
+          <p:nvPr>
+            <p:ph type="title"/>
+          </p:nvPr>
+        </p:nvSpPr>
+        <p:spPr/>
+        <p:txBody>
+          <a:bodyPr/>
+          <a:lstStyle/>
+          <a:p>
+            <a:r>
+              <a:rPr lang="fr-FR" dirty="0"/>
+              <a:t>Test pour la Marque</a:t>
+            </a:r>
+          </a:p>
+        </p:txBody>
+      </p:sp>
+      <p:pic>
+        <p:nvPicPr>
+          <p:cNvPr id="13" name="Image 12">
+            <a:extLst>
+              <a:ext uri="{FF2B5EF4-FFF2-40B4-BE49-F238E27FC236}">
+                <a16:creationId xmlns:a16="http://schemas.microsoft.com/office/drawing/2014/main" id="{6E2A9322-AD65-5D47-ACA6-4D6C458C4CDA}"/>
+              </a:ext>
+            </a:extLst>
+          </p:cNvPr>
+          <p:cNvPicPr>
+            <a:picLocks noChangeAspect="1"/>
+          </p:cNvPicPr>
+          <p:nvPr/>
+        </p:nvPicPr>
+        <p:blipFill>
+          <a:blip r:embed="rId2"/>
+          <a:stretch>
+            <a:fillRect/>
+          </a:stretch>
+        </p:blipFill>
+        <p:spPr>
+          <a:xfrm>
+            <a:off x="1358900" y="2897413"/>
+            <a:ext cx="9474200" cy="584200"/>
+          </a:xfrm>
+          <a:prstGeom prst="rect">
+            <a:avLst/>
+          </a:prstGeom>
+        </p:spPr>
+      </p:pic>
+      <p:pic>
+        <p:nvPicPr>
+          <p:cNvPr id="15" name="Image 14">
+            <a:extLst>
+              <a:ext uri="{FF2B5EF4-FFF2-40B4-BE49-F238E27FC236}">
+                <a16:creationId xmlns:a16="http://schemas.microsoft.com/office/drawing/2014/main" id="{9C7288C8-A1B8-D841-95AF-E6E90F0307C7}"/>
+              </a:ext>
+            </a:extLst>
+          </p:cNvPr>
+          <p:cNvPicPr>
+            <a:picLocks noChangeAspect="1"/>
+          </p:cNvPicPr>
+          <p:nvPr/>
+        </p:nvPicPr>
+        <p:blipFill>
+          <a:blip r:embed="rId3"/>
+          <a:stretch>
+            <a:fillRect/>
+          </a:stretch>
+        </p:blipFill>
+        <p:spPr>
+          <a:xfrm>
+            <a:off x="1358900" y="3769175"/>
+            <a:ext cx="9474200" cy="1562100"/>
+          </a:xfrm>
+          <a:prstGeom prst="rect">
+            <a:avLst/>
+          </a:prstGeom>
+        </p:spPr>
+      </p:pic>
+    </p:spTree>
+    <p:extLst>
+      <p:ext uri="{BB962C8B-B14F-4D97-AF65-F5344CB8AC3E}">
+        <p14:creationId xmlns:p14="http://schemas.microsoft.com/office/powerpoint/2010/main" val="1829878732"/>
+      </p:ext>
+    </p:extLst>
+  </p:cSld>
+  <p:clrMapOvr>
+    <a:masterClrMapping/>
+  </p:clrMapOvr>
+</p:sld>
+</file>
+
+<file path=ppt/slides/slide12.xml><?xml version="1.0" encoding="utf-8"?>
+<p:sld xmlns:a="http://schemas.openxmlformats.org/drawingml/2006/main" xmlns:r="http://schemas.openxmlformats.org/officeDocument/2006/relationships" xmlns:p="http://schemas.openxmlformats.org/presentationml/2006/main">
+  <p:cSld>
+    <p:spTree>
+      <p:nvGrpSpPr>
+        <p:cNvPr id="1" name=""/>
+        <p:cNvGrpSpPr/>
+        <p:nvPr/>
+      </p:nvGrpSpPr>
+      <p:grpSpPr>
+        <a:xfrm>
+          <a:off x="0" y="0"/>
+          <a:ext cx="0" cy="0"/>
+          <a:chOff x="0" y="0"/>
+          <a:chExt cx="0" cy="0"/>
+        </a:xfrm>
+      </p:grpSpPr>
+      <p:sp>
+        <p:nvSpPr>
+          <p:cNvPr id="2" name="Titre 1">
+            <a:extLst>
+              <a:ext uri="{FF2B5EF4-FFF2-40B4-BE49-F238E27FC236}">
+                <a16:creationId xmlns:a16="http://schemas.microsoft.com/office/drawing/2014/main" id="{A76D1207-E428-CD47-9CC6-350C6A8F4B6A}"/>
+              </a:ext>
+            </a:extLst>
+          </p:cNvPr>
+          <p:cNvSpPr>
+            <a:spLocks noGrp="1"/>
+          </p:cNvSpPr>
+          <p:nvPr>
+            <p:ph type="title"/>
+          </p:nvPr>
+        </p:nvSpPr>
+        <p:spPr/>
+        <p:txBody>
+          <a:bodyPr/>
+          <a:lstStyle/>
+          <a:p>
+            <a:r>
+              <a:rPr lang="fr-FR" dirty="0"/>
+              <a:t>Test pour le modèle </a:t>
+            </a:r>
+          </a:p>
+        </p:txBody>
+      </p:sp>
+      <p:pic>
+        <p:nvPicPr>
+          <p:cNvPr id="5" name="Image 4">
+            <a:extLst>
+              <a:ext uri="{FF2B5EF4-FFF2-40B4-BE49-F238E27FC236}">
+                <a16:creationId xmlns:a16="http://schemas.microsoft.com/office/drawing/2014/main" id="{3178DC92-B79A-AA47-ADF8-596EE92B7109}"/>
+              </a:ext>
+            </a:extLst>
+          </p:cNvPr>
+          <p:cNvPicPr>
+            <a:picLocks noChangeAspect="1"/>
+          </p:cNvPicPr>
+          <p:nvPr/>
+        </p:nvPicPr>
+        <p:blipFill>
+          <a:blip r:embed="rId2"/>
+          <a:stretch>
+            <a:fillRect/>
+          </a:stretch>
+        </p:blipFill>
+        <p:spPr>
+          <a:xfrm>
+            <a:off x="647700" y="2915986"/>
+            <a:ext cx="10896600" cy="584200"/>
+          </a:xfrm>
+          <a:prstGeom prst="rect">
+            <a:avLst/>
+          </a:prstGeom>
+        </p:spPr>
+      </p:pic>
+      <p:pic>
+        <p:nvPicPr>
+          <p:cNvPr id="7" name="Image 6">
+            <a:extLst>
+              <a:ext uri="{FF2B5EF4-FFF2-40B4-BE49-F238E27FC236}">
+                <a16:creationId xmlns:a16="http://schemas.microsoft.com/office/drawing/2014/main" id="{463BB21C-FE3C-2244-A927-46ECFC38AAA4}"/>
+              </a:ext>
+            </a:extLst>
+          </p:cNvPr>
+          <p:cNvPicPr>
+            <a:picLocks noChangeAspect="1"/>
+          </p:cNvPicPr>
+          <p:nvPr/>
+        </p:nvPicPr>
+        <p:blipFill>
+          <a:blip r:embed="rId3"/>
+          <a:stretch>
+            <a:fillRect/>
+          </a:stretch>
+        </p:blipFill>
+        <p:spPr>
+          <a:xfrm>
+            <a:off x="647700" y="3791043"/>
+            <a:ext cx="10896600" cy="1757858"/>
+          </a:xfrm>
+          <a:prstGeom prst="rect">
+            <a:avLst/>
+          </a:prstGeom>
+        </p:spPr>
+      </p:pic>
+    </p:spTree>
+    <p:extLst>
+      <p:ext uri="{BB962C8B-B14F-4D97-AF65-F5344CB8AC3E}">
+        <p14:creationId xmlns:p14="http://schemas.microsoft.com/office/powerpoint/2010/main" val="425791377"/>
+      </p:ext>
+    </p:extLst>
+  </p:cSld>
+  <p:clrMapOvr>
+    <a:masterClrMapping/>
+  </p:clrMapOvr>
+</p:sld>
+</file>
+
+<file path=ppt/slides/slide13.xml><?xml version="1.0" encoding="utf-8"?>
 <p:sld xmlns:a="http://schemas.openxmlformats.org/drawingml/2006/main" xmlns:r="http://schemas.openxmlformats.org/officeDocument/2006/relationships" xmlns:p="http://schemas.openxmlformats.org/presentationml/2006/main">
   <p:cSld>
     <p:spTree>
@@ -3799,17 +4021,10 @@
   <p:clrMapOvr>
     <a:masterClrMapping/>
   </p:clrMapOvr>
-  <p:timing>
-    <p:tnLst>
-      <p:par>
-        <p:cTn id="1" dur="indefinite" restart="never" nodeType="tmRoot"/>
-      </p:par>
-    </p:tnLst>
-  </p:timing>
 </p:sld>
 </file>
 
-<file path=ppt/slides/slide12.xml><?xml version="1.0" encoding="utf-8"?>
+<file path=ppt/slides/slide14.xml><?xml version="1.0" encoding="utf-8"?>
 <p:sld xmlns:a="http://schemas.openxmlformats.org/drawingml/2006/main" xmlns:r="http://schemas.openxmlformats.org/officeDocument/2006/relationships" xmlns:p="http://schemas.openxmlformats.org/presentationml/2006/main">
   <p:cSld>
     <p:spTree>
@@ -3889,17 +4104,10 @@
   <p:clrMapOvr>
     <a:masterClrMapping/>
   </p:clrMapOvr>
-  <p:timing>
-    <p:tnLst>
-      <p:par>
-        <p:cTn id="1" dur="indefinite" restart="never" nodeType="tmRoot"/>
-      </p:par>
-    </p:tnLst>
-  </p:timing>
 </p:sld>
 </file>
 
-<file path=ppt/slides/slide13.xml><?xml version="1.0" encoding="utf-8"?>
+<file path=ppt/slides/slide15.xml><?xml version="1.0" encoding="utf-8"?>
 <p:sld xmlns:a="http://schemas.openxmlformats.org/drawingml/2006/main" xmlns:r="http://schemas.openxmlformats.org/officeDocument/2006/relationships" xmlns:p="http://schemas.openxmlformats.org/presentationml/2006/main">
   <p:cSld>
     <p:spTree>
@@ -3956,13 +4164,6 @@
   <p:clrMapOvr>
     <a:masterClrMapping/>
   </p:clrMapOvr>
-  <p:timing>
-    <p:tnLst>
-      <p:par>
-        <p:cTn id="1" dur="indefinite" restart="never" nodeType="tmRoot"/>
-      </p:par>
-    </p:tnLst>
-  </p:timing>
 </p:sld>
 </file>
 
@@ -4235,13 +4436,6 @@
   <p:clrMapOvr>
     <a:masterClrMapping/>
   </p:clrMapOvr>
-  <p:timing>
-    <p:tnLst>
-      <p:par>
-        <p:cTn id="1" dur="indefinite" restart="never" nodeType="tmRoot"/>
-      </p:par>
-    </p:tnLst>
-  </p:timing>
 </p:sld>
 </file>
 
@@ -4514,13 +4708,6 @@
   <p:clrMapOvr>
     <a:masterClrMapping/>
   </p:clrMapOvr>
-  <p:timing>
-    <p:tnLst>
-      <p:par>
-        <p:cTn id="1" dur="indefinite" restart="never" nodeType="tmRoot"/>
-      </p:par>
-    </p:tnLst>
-  </p:timing>
 </p:sld>
 </file>
 
@@ -4677,13 +4864,6 @@
   <p:clrMapOvr>
     <a:masterClrMapping/>
   </p:clrMapOvr>
-  <p:timing>
-    <p:tnLst>
-      <p:par>
-        <p:cTn id="1" dur="indefinite" restart="never" nodeType="tmRoot"/>
-      </p:par>
-    </p:tnLst>
-  </p:timing>
 </p:sld>
 </file>
 
@@ -4743,13 +4923,6 @@
   <p:clrMapOvr>
     <a:masterClrMapping/>
   </p:clrMapOvr>
-  <p:timing>
-    <p:tnLst>
-      <p:par>
-        <p:cTn id="1" dur="indefinite" restart="never" nodeType="tmRoot"/>
-      </p:par>
-    </p:tnLst>
-  </p:timing>
 </p:sld>
 </file>
 
@@ -4810,13 +4983,6 @@
   <p:clrMapOvr>
     <a:masterClrMapping/>
   </p:clrMapOvr>
-  <p:timing>
-    <p:tnLst>
-      <p:par>
-        <p:cTn id="1" dur="indefinite" restart="never" nodeType="tmRoot"/>
-      </p:par>
-    </p:tnLst>
-  </p:timing>
 </p:sld>
 </file>
 
@@ -4877,13 +5043,6 @@
   <p:clrMapOvr>
     <a:masterClrMapping/>
   </p:clrMapOvr>
-  <p:timing>
-    <p:tnLst>
-      <p:par>
-        <p:cTn id="1" dur="indefinite" restart="never" nodeType="tmRoot"/>
-      </p:par>
-    </p:tnLst>
-  </p:timing>
 </p:sld>
 </file>
 
@@ -5156,13 +5315,6 @@
   <p:clrMapOvr>
     <a:masterClrMapping/>
   </p:clrMapOvr>
-  <p:timing>
-    <p:tnLst>
-      <p:par>
-        <p:cTn id="1" dur="indefinite" restart="never" nodeType="tmRoot"/>
-      </p:par>
-    </p:tnLst>
-  </p:timing>
 </p:sld>
 </file>
 
@@ -5234,7 +5386,7 @@
           <a:p>
             <a:r>
               <a:rPr lang="fr-FR" dirty="0"/>
-              <a:t>Ajouter un article</a:t>
+              <a:t>La page ajouter un article</a:t>
             </a:r>
           </a:p>
           <a:p>
@@ -5288,13 +5440,6 @@
   <p:clrMapOvr>
     <a:masterClrMapping/>
   </p:clrMapOvr>
-  <p:timing>
-    <p:tnLst>
-      <p:par>
-        <p:cTn id="1" dur="indefinite" restart="never" nodeType="tmRoot"/>
-      </p:par>
-    </p:tnLst>
-  </p:timing>
 </p:sld>
 </file>
 

</xml_diff>

<commit_message>
Changement de la page de titre
</commit_message>
<xml_diff>
--- a/Documentation/Présentation.pptx
+++ b/Documentation/Présentation.pptx
@@ -5,7 +5,7 @@
     <p:sldMasterId id="2147483682" r:id="rId1"/>
   </p:sldMasterIdLst>
   <p:sldIdLst>
-    <p:sldId id="256" r:id="rId2"/>
+    <p:sldId id="277" r:id="rId2"/>
     <p:sldId id="257" r:id="rId3"/>
     <p:sldId id="270" r:id="rId4"/>
     <p:sldId id="259" r:id="rId5"/>
@@ -3324,14 +3324,6 @@
 <file path=ppt/slides/slide1.xml><?xml version="1.0" encoding="utf-8"?>
 <p:sld xmlns:a="http://schemas.openxmlformats.org/drawingml/2006/main" xmlns:r="http://schemas.openxmlformats.org/officeDocument/2006/relationships" xmlns:p="http://schemas.openxmlformats.org/presentationml/2006/main">
   <p:cSld>
-    <p:bg>
-      <p:bgPr>
-        <a:solidFill>
-          <a:schemeClr val="tx1"/>
-        </a:solidFill>
-        <a:effectLst/>
-      </p:bgPr>
-    </p:bg>
     <p:spTree>
       <p:nvGrpSpPr>
         <p:cNvPr id="1" name=""/>
@@ -3351,7 +3343,7 @@
           <p:cNvPr id="2" name="Titre 1">
             <a:extLst>
               <a:ext uri="{FF2B5EF4-FFF2-40B4-BE49-F238E27FC236}">
-                <a16:creationId xmlns:a16="http://schemas.microsoft.com/office/drawing/2014/main" id="{17491C7E-E6F5-C447-ACBB-B4547210D95D}"/>
+                <a16:creationId xmlns:a16="http://schemas.microsoft.com/office/drawing/2014/main" id="{0BFABA8A-665D-FD48-9774-74AC0D1188E1}"/>
               </a:ext>
             </a:extLst>
           </p:cNvPr>
@@ -3362,20 +3354,16 @@
             <p:ph type="ctrTitle"/>
           </p:nvPr>
         </p:nvSpPr>
-        <p:spPr>
-          <a:xfrm>
-            <a:off x="810001" y="1449148"/>
-            <a:ext cx="10572000" cy="2545910"/>
-          </a:xfrm>
-        </p:spPr>
-        <p:txBody>
-          <a:bodyPr/>
-          <a:lstStyle/>
-          <a:p>
-            <a:r>
-              <a:rPr lang="fr-FR" dirty="0"/>
-              <a:t>ZIRA</a:t>
-            </a:r>
+        <p:spPr/>
+        <p:txBody>
+          <a:bodyPr/>
+          <a:lstStyle/>
+          <a:p>
+            <a:r>
+              <a:rPr lang="fr-FR" dirty="0" err="1"/>
+              <a:t>Zira</a:t>
+            </a:r>
+            <a:endParaRPr lang="fr-FR" dirty="0"/>
           </a:p>
         </p:txBody>
       </p:sp>
@@ -3384,7 +3372,7 @@
           <p:cNvPr id="3" name="Sous-titre 2">
             <a:extLst>
               <a:ext uri="{FF2B5EF4-FFF2-40B4-BE49-F238E27FC236}">
-                <a16:creationId xmlns:a16="http://schemas.microsoft.com/office/drawing/2014/main" id="{FFFE1A19-D878-E54F-9A23-01854E6C5A47}"/>
+                <a16:creationId xmlns:a16="http://schemas.microsoft.com/office/drawing/2014/main" id="{47A760A9-08AC-0D43-B1AE-607B20B105F4}"/>
               </a:ext>
             </a:extLst>
           </p:cNvPr>
@@ -3395,16 +3383,9 @@
             <p:ph type="subTitle" idx="1"/>
           </p:nvPr>
         </p:nvSpPr>
-        <p:spPr>
-          <a:xfrm>
-            <a:off x="810001" y="5280847"/>
-            <a:ext cx="10572000" cy="1239696"/>
-          </a:xfrm>
-        </p:spPr>
-        <p:txBody>
-          <a:bodyPr>
-            <a:normAutofit/>
-          </a:bodyPr>
+        <p:spPr/>
+        <p:txBody>
+          <a:bodyPr/>
           <a:lstStyle/>
           <a:p>
             <a:r>
@@ -3442,12 +3423,15 @@
               <a:t>  </a:t>
             </a:r>
           </a:p>
+          <a:p>
+            <a:endParaRPr lang="fr-FR" dirty="0"/>
+          </a:p>
         </p:txBody>
       </p:sp>
     </p:spTree>
     <p:extLst>
       <p:ext uri="{BB962C8B-B14F-4D97-AF65-F5344CB8AC3E}">
-        <p14:creationId xmlns:p14="http://schemas.microsoft.com/office/powerpoint/2010/main" val="938526182"/>
+        <p14:creationId xmlns:p14="http://schemas.microsoft.com/office/powerpoint/2010/main" val="2759574033"/>
       </p:ext>
     </p:extLst>
   </p:cSld>

</xml_diff>

<commit_message>
Modifications dans le dossier
Ajout d'un nouveau dossier pour mettre les images dedans. Ajouté aussi une image dans la présentation
</commit_message>
<xml_diff>
--- a/Documentation/Présentation.pptx
+++ b/Documentation/Présentation.pptx
@@ -5,7 +5,7 @@
     <p:sldMasterId id="2147483682" r:id="rId1"/>
   </p:sldMasterIdLst>
   <p:notesMasterIdLst>
-    <p:notesMasterId r:id="rId20"/>
+    <p:notesMasterId r:id="rId21"/>
   </p:notesMasterIdLst>
   <p:sldIdLst>
     <p:sldId id="277" r:id="rId2"/>
@@ -16,16 +16,17 @@
     <p:sldId id="271" r:id="rId7"/>
     <p:sldId id="261" r:id="rId8"/>
     <p:sldId id="273" r:id="rId9"/>
-    <p:sldId id="290" r:id="rId10"/>
-    <p:sldId id="291" r:id="rId11"/>
-    <p:sldId id="292" r:id="rId12"/>
-    <p:sldId id="272" r:id="rId13"/>
-    <p:sldId id="265" r:id="rId14"/>
-    <p:sldId id="294" r:id="rId15"/>
-    <p:sldId id="293" r:id="rId16"/>
-    <p:sldId id="295" r:id="rId17"/>
-    <p:sldId id="286" r:id="rId18"/>
-    <p:sldId id="274" r:id="rId19"/>
+    <p:sldId id="296" r:id="rId10"/>
+    <p:sldId id="290" r:id="rId11"/>
+    <p:sldId id="291" r:id="rId12"/>
+    <p:sldId id="292" r:id="rId13"/>
+    <p:sldId id="272" r:id="rId14"/>
+    <p:sldId id="265" r:id="rId15"/>
+    <p:sldId id="294" r:id="rId16"/>
+    <p:sldId id="293" r:id="rId17"/>
+    <p:sldId id="295" r:id="rId18"/>
+    <p:sldId id="286" r:id="rId19"/>
+    <p:sldId id="274" r:id="rId20"/>
   </p:sldIdLst>
   <p:sldSz cx="12192000" cy="6858000"/>
   <p:notesSz cx="6858000" cy="9144000"/>
@@ -214,7 +215,7 @@
           <a:p>
             <a:fld id="{5FB19F76-E469-E74E-B70D-289AD805E026}" type="datetimeFigureOut">
               <a:rPr lang="fr-FR" smtClean="0"/>
-              <a:t>01/05/2018</a:t>
+              <a:t>03/05/2018</a:t>
             </a:fld>
             <a:endParaRPr lang="fr-FR"/>
           </a:p>
@@ -843,7 +844,7 @@
           <a:p>
             <a:fld id="{0E39B6C8-693A-9346-888B-D1AAB2B0D267}" type="slidenum">
               <a:rPr lang="fr-FR" smtClean="0"/>
-              <a:t>13</a:t>
+              <a:t>14</a:t>
             </a:fld>
             <a:endParaRPr lang="fr-FR"/>
           </a:p>
@@ -1026,7 +1027,7 @@
             <a:fld id="{08B9EBBA-996F-894A-B54A-D6246ED52CEA}" type="datetimeFigureOut">
               <a:rPr lang="en-US" smtClean="0"/>
               <a:pPr/>
-              <a:t>5/1/18</a:t>
+              <a:t>5/3/18</a:t>
             </a:fld>
             <a:endParaRPr lang="en-US" dirty="0"/>
           </a:p>
@@ -1198,7 +1199,7 @@
             <a:fld id="{C6C52C72-DE31-F449-A4ED-4C594FD91407}" type="datetimeFigureOut">
               <a:rPr lang="en-US" smtClean="0"/>
               <a:pPr/>
-              <a:t>5/1/18</a:t>
+              <a:t>5/3/18</a:t>
             </a:fld>
             <a:endParaRPr lang="en-US" dirty="0"/>
           </a:p>
@@ -1380,7 +1381,7 @@
             <a:fld id="{ED62726E-379B-B349-9EED-81ED093FA806}" type="datetimeFigureOut">
               <a:rPr lang="en-US" smtClean="0"/>
               <a:pPr/>
-              <a:t>5/1/18</a:t>
+              <a:t>5/3/18</a:t>
             </a:fld>
             <a:endParaRPr lang="en-US" dirty="0"/>
           </a:p>
@@ -1552,7 +1553,7 @@
             <a:fld id="{9B3A1323-8D79-1946-B0D7-40001CF92E9D}" type="datetimeFigureOut">
               <a:rPr lang="en-US" smtClean="0"/>
               <a:pPr/>
-              <a:t>5/1/18</a:t>
+              <a:t>5/3/18</a:t>
             </a:fld>
             <a:endParaRPr lang="en-US" dirty="0"/>
           </a:p>
@@ -1822,7 +1823,7 @@
             <a:fld id="{8DFA1846-DA80-1C48-A609-854EA85C59AD}" type="datetimeFigureOut">
               <a:rPr lang="en-US" smtClean="0"/>
               <a:pPr/>
-              <a:t>5/1/18</a:t>
+              <a:t>5/3/18</a:t>
             </a:fld>
             <a:endParaRPr lang="en-US" dirty="0"/>
           </a:p>
@@ -2056,7 +2057,7 @@
             <a:fld id="{57302355-E14B-8545-A8F8-0FE83CC9D524}" type="datetimeFigureOut">
               <a:rPr lang="en-US" smtClean="0"/>
               <a:pPr/>
-              <a:t>5/1/18</a:t>
+              <a:t>5/3/18</a:t>
             </a:fld>
             <a:endParaRPr lang="en-US" dirty="0"/>
           </a:p>
@@ -2417,7 +2418,7 @@
             <a:fld id="{09B482E8-6E0E-1B4F-B1FD-C69DB9E858D9}" type="datetimeFigureOut">
               <a:rPr lang="en-US" smtClean="0"/>
               <a:pPr/>
-              <a:t>5/1/18</a:t>
+              <a:t>5/3/18</a:t>
             </a:fld>
             <a:endParaRPr lang="en-US" dirty="0"/>
           </a:p>
@@ -2561,7 +2562,7 @@
             <a:fld id="{F13A34C8-038E-2045-AF43-DF7DBB8E0E9E}" type="datetimeFigureOut">
               <a:rPr lang="en-US" smtClean="0"/>
               <a:pPr/>
-              <a:t>5/1/18</a:t>
+              <a:t>5/3/18</a:t>
             </a:fld>
             <a:endParaRPr lang="en-US" dirty="0"/>
           </a:p>
@@ -2658,7 +2659,7 @@
             <a:fld id="{8818C68F-D26B-8F47-958C-23B49CF8A634}" type="datetimeFigureOut">
               <a:rPr lang="en-US" smtClean="0"/>
               <a:pPr/>
-              <a:t>5/1/18</a:t>
+              <a:t>5/3/18</a:t>
             </a:fld>
             <a:endParaRPr lang="en-US" dirty="0"/>
           </a:p>
@@ -3017,7 +3018,7 @@
             <a:fld id="{D0DF5E60-9974-AC48-9591-99C2BB44B7CF}" type="datetimeFigureOut">
               <a:rPr lang="en-US" smtClean="0"/>
               <a:pPr/>
-              <a:t>5/1/18</a:t>
+              <a:t>5/3/18</a:t>
             </a:fld>
             <a:endParaRPr lang="en-US" dirty="0"/>
           </a:p>
@@ -3376,7 +3377,7 @@
             <a:fld id="{09B482E8-6E0E-1B4F-B1FD-C69DB9E858D9}" type="datetimeFigureOut">
               <a:rPr lang="en-US" smtClean="0"/>
               <a:pPr/>
-              <a:t>5/1/18</a:t>
+              <a:t>5/3/18</a:t>
             </a:fld>
             <a:endParaRPr lang="en-US" dirty="0"/>
           </a:p>
@@ -3620,7 +3621,7 @@
             <a:fld id="{09B482E8-6E0E-1B4F-B1FD-C69DB9E858D9}" type="datetimeFigureOut">
               <a:rPr lang="en-US" smtClean="0"/>
               <a:pPr/>
-              <a:t>5/1/18</a:t>
+              <a:t>5/3/18</a:t>
             </a:fld>
             <a:endParaRPr lang="en-US" dirty="0"/>
           </a:p>
@@ -4194,6 +4195,69 @@
           <a:chExt cx="0" cy="0"/>
         </a:xfrm>
       </p:grpSpPr>
+      <p:sp>
+        <p:nvSpPr>
+          <p:cNvPr id="2" name="Titre 1">
+            <a:extLst>
+              <a:ext uri="{FF2B5EF4-FFF2-40B4-BE49-F238E27FC236}">
+                <a16:creationId xmlns:a16="http://schemas.microsoft.com/office/drawing/2014/main" id="{3AEED063-FBBD-1A41-89BB-234AC43026BF}"/>
+              </a:ext>
+            </a:extLst>
+          </p:cNvPr>
+          <p:cNvSpPr>
+            <a:spLocks noGrp="1"/>
+          </p:cNvSpPr>
+          <p:nvPr>
+            <p:ph type="title"/>
+          </p:nvPr>
+        </p:nvSpPr>
+        <p:spPr>
+          <a:xfrm>
+            <a:off x="2293889" y="2784528"/>
+            <a:ext cx="7729728" cy="1188720"/>
+          </a:xfrm>
+        </p:spPr>
+        <p:txBody>
+          <a:bodyPr/>
+          <a:lstStyle/>
+          <a:p>
+            <a:r>
+              <a:rPr lang="fr-FR" dirty="0"/>
+              <a:t>Application mobile</a:t>
+            </a:r>
+          </a:p>
+        </p:txBody>
+      </p:sp>
+    </p:spTree>
+    <p:extLst>
+      <p:ext uri="{BB962C8B-B14F-4D97-AF65-F5344CB8AC3E}">
+        <p14:creationId xmlns:p14="http://schemas.microsoft.com/office/powerpoint/2010/main" val="3063361243"/>
+      </p:ext>
+    </p:extLst>
+  </p:cSld>
+  <p:clrMapOvr>
+    <a:masterClrMapping/>
+  </p:clrMapOvr>
+</p:sld>
+</file>
+
+<file path=ppt/slides/slide11.xml><?xml version="1.0" encoding="utf-8"?>
+<p:sld xmlns:a="http://schemas.openxmlformats.org/drawingml/2006/main" xmlns:r="http://schemas.openxmlformats.org/officeDocument/2006/relationships" xmlns:p="http://schemas.openxmlformats.org/presentationml/2006/main">
+  <p:cSld>
+    <p:spTree>
+      <p:nvGrpSpPr>
+        <p:cNvPr id="1" name=""/>
+        <p:cNvGrpSpPr/>
+        <p:nvPr/>
+      </p:nvGrpSpPr>
+      <p:grpSpPr>
+        <a:xfrm>
+          <a:off x="0" y="0"/>
+          <a:ext cx="0" cy="0"/>
+          <a:chOff x="0" y="0"/>
+          <a:chExt cx="0" cy="0"/>
+        </a:xfrm>
+      </p:grpSpPr>
       <p:pic>
         <p:nvPicPr>
           <p:cNvPr id="5" name="Image 4">
@@ -4297,7 +4361,7 @@
 </p:sld>
 </file>
 
-<file path=ppt/slides/slide11.xml><?xml version="1.0" encoding="utf-8"?>
+<file path=ppt/slides/slide12.xml><?xml version="1.0" encoding="utf-8"?>
 <p:sld xmlns:a="http://schemas.openxmlformats.org/drawingml/2006/main" xmlns:r="http://schemas.openxmlformats.org/officeDocument/2006/relationships" xmlns:p="http://schemas.openxmlformats.org/presentationml/2006/main">
   <p:cSld>
     <p:spTree>
@@ -4357,7 +4421,7 @@
 </p:sld>
 </file>
 
-<file path=ppt/slides/slide12.xml><?xml version="1.0" encoding="utf-8"?>
+<file path=ppt/slides/slide13.xml><?xml version="1.0" encoding="utf-8"?>
 <p:sld xmlns:a="http://schemas.openxmlformats.org/drawingml/2006/main" xmlns:r="http://schemas.openxmlformats.org/officeDocument/2006/relationships" xmlns:p="http://schemas.openxmlformats.org/presentationml/2006/main">
   <p:cSld>
     <p:spTree>
@@ -4630,126 +4694,6 @@
 </p:sld>
 </file>
 
-<file path=ppt/slides/slide13.xml><?xml version="1.0" encoding="utf-8"?>
-<p:sld xmlns:a="http://schemas.openxmlformats.org/drawingml/2006/main" xmlns:r="http://schemas.openxmlformats.org/officeDocument/2006/relationships" xmlns:p="http://schemas.openxmlformats.org/presentationml/2006/main">
-  <p:cSld>
-    <p:spTree>
-      <p:nvGrpSpPr>
-        <p:cNvPr id="1" name=""/>
-        <p:cNvGrpSpPr/>
-        <p:nvPr/>
-      </p:nvGrpSpPr>
-      <p:grpSpPr>
-        <a:xfrm>
-          <a:off x="0" y="0"/>
-          <a:ext cx="0" cy="0"/>
-          <a:chOff x="0" y="0"/>
-          <a:chExt cx="0" cy="0"/>
-        </a:xfrm>
-      </p:grpSpPr>
-      <p:sp>
-        <p:nvSpPr>
-          <p:cNvPr id="2" name="Titre 1">
-            <a:extLst>
-              <a:ext uri="{FF2B5EF4-FFF2-40B4-BE49-F238E27FC236}">
-                <a16:creationId xmlns:a16="http://schemas.microsoft.com/office/drawing/2014/main" id="{2A2D0E5B-08BF-2447-849B-7EF4C7E1AE34}"/>
-              </a:ext>
-            </a:extLst>
-          </p:cNvPr>
-          <p:cNvSpPr>
-            <a:spLocks noGrp="1"/>
-          </p:cNvSpPr>
-          <p:nvPr>
-            <p:ph type="title"/>
-          </p:nvPr>
-        </p:nvSpPr>
-        <p:spPr/>
-        <p:txBody>
-          <a:bodyPr/>
-          <a:lstStyle/>
-          <a:p>
-            <a:r>
-              <a:rPr lang="fr-FR" dirty="0"/>
-              <a:t>Bilan personnel</a:t>
-            </a:r>
-          </a:p>
-        </p:txBody>
-      </p:sp>
-      <p:sp>
-        <p:nvSpPr>
-          <p:cNvPr id="3" name="Espace réservé du contenu 2">
-            <a:extLst>
-              <a:ext uri="{FF2B5EF4-FFF2-40B4-BE49-F238E27FC236}">
-                <a16:creationId xmlns:a16="http://schemas.microsoft.com/office/drawing/2014/main" id="{0C3D3EDC-1278-7E42-9277-4CDC395390A5}"/>
-              </a:ext>
-            </a:extLst>
-          </p:cNvPr>
-          <p:cNvSpPr>
-            <a:spLocks noGrp="1"/>
-          </p:cNvSpPr>
-          <p:nvPr>
-            <p:ph idx="1"/>
-          </p:nvPr>
-        </p:nvSpPr>
-        <p:spPr/>
-        <p:txBody>
-          <a:bodyPr/>
-          <a:lstStyle/>
-          <a:p>
-            <a:r>
-              <a:rPr lang="fr-FR" dirty="0"/>
-              <a:t>Avantages du projet </a:t>
-            </a:r>
-          </a:p>
-          <a:p>
-            <a:pPr lvl="1"/>
-            <a:r>
-              <a:rPr lang="fr-FR" dirty="0"/>
-              <a:t>Se rappeler les étapes</a:t>
-            </a:r>
-          </a:p>
-          <a:p>
-            <a:pPr lvl="1"/>
-            <a:r>
-              <a:rPr lang="fr-FR" dirty="0"/>
-              <a:t>Idée du travail pour le TPI</a:t>
-            </a:r>
-          </a:p>
-          <a:p>
-            <a:pPr lvl="1"/>
-            <a:r>
-              <a:rPr lang="fr-FR" dirty="0"/>
-              <a:t>Être livré à nous-même </a:t>
-            </a:r>
-          </a:p>
-          <a:p>
-            <a:pPr lvl="1"/>
-            <a:r>
-              <a:rPr lang="fr-FR" dirty="0"/>
-              <a:t>Gérer une BD</a:t>
-            </a:r>
-          </a:p>
-          <a:p>
-            <a:pPr marL="228600" lvl="1" indent="0">
-              <a:buNone/>
-            </a:pPr>
-            <a:endParaRPr lang="fr-FR" dirty="0"/>
-          </a:p>
-        </p:txBody>
-      </p:sp>
-    </p:spTree>
-    <p:extLst>
-      <p:ext uri="{BB962C8B-B14F-4D97-AF65-F5344CB8AC3E}">
-        <p14:creationId xmlns:p14="http://schemas.microsoft.com/office/powerpoint/2010/main" val="3359474809"/>
-      </p:ext>
-    </p:extLst>
-  </p:cSld>
-  <p:clrMapOvr>
-    <a:masterClrMapping/>
-  </p:clrMapOvr>
-</p:sld>
-</file>
-
 <file path=ppt/slides/slide14.xml><?xml version="1.0" encoding="utf-8"?>
 <p:sld xmlns:a="http://schemas.openxmlformats.org/drawingml/2006/main" xmlns:r="http://schemas.openxmlformats.org/officeDocument/2006/relationships" xmlns:p="http://schemas.openxmlformats.org/presentationml/2006/main">
   <p:cSld>
@@ -4772,7 +4716,7 @@
           <p:cNvPr id="2" name="Titre 1">
             <a:extLst>
               <a:ext uri="{FF2B5EF4-FFF2-40B4-BE49-F238E27FC236}">
-                <a16:creationId xmlns:a16="http://schemas.microsoft.com/office/drawing/2014/main" id="{A22F2ABD-3983-EF44-9443-E6F8FD3979E8}"/>
+                <a16:creationId xmlns:a16="http://schemas.microsoft.com/office/drawing/2014/main" id="{2A2D0E5B-08BF-2447-849B-7EF4C7E1AE34}"/>
               </a:ext>
             </a:extLst>
           </p:cNvPr>
@@ -4790,7 +4734,7 @@
           <a:p>
             <a:r>
               <a:rPr lang="fr-FR" dirty="0"/>
-              <a:t>Objectifs atteints</a:t>
+              <a:t>Bilan personnel</a:t>
             </a:r>
           </a:p>
         </p:txBody>
@@ -4800,7 +4744,7 @@
           <p:cNvPr id="3" name="Espace réservé du contenu 2">
             <a:extLst>
               <a:ext uri="{FF2B5EF4-FFF2-40B4-BE49-F238E27FC236}">
-                <a16:creationId xmlns:a16="http://schemas.microsoft.com/office/drawing/2014/main" id="{1CFB1B20-31C7-9F4B-B913-314482C35B21}"/>
+                <a16:creationId xmlns:a16="http://schemas.microsoft.com/office/drawing/2014/main" id="{0C3D3EDC-1278-7E42-9277-4CDC395390A5}"/>
               </a:ext>
             </a:extLst>
           </p:cNvPr>
@@ -4818,48 +4762,41 @@
           <a:p>
             <a:r>
               <a:rPr lang="fr-FR" dirty="0"/>
-              <a:t>Page d’accueil</a:t>
-            </a:r>
-          </a:p>
-          <a:p>
-            <a:r>
-              <a:rPr lang="fr-FR" dirty="0"/>
-              <a:t>La page article </a:t>
-            </a:r>
-          </a:p>
-          <a:p>
-            <a:r>
-              <a:rPr lang="fr-FR" dirty="0"/>
-              <a:t>Page d’ajout d’article dans le panier</a:t>
-            </a:r>
-          </a:p>
-          <a:p>
-            <a:r>
-              <a:rPr lang="fr-FR" dirty="0"/>
-              <a:t>Utilisateurs</a:t>
+              <a:t>Avantages du projet </a:t>
             </a:r>
           </a:p>
           <a:p>
             <a:pPr lvl="1"/>
             <a:r>
               <a:rPr lang="fr-FR" dirty="0"/>
-              <a:t>Connexion</a:t>
+              <a:t>Se rappeler les étapes</a:t>
             </a:r>
           </a:p>
           <a:p>
             <a:pPr lvl="1"/>
             <a:r>
               <a:rPr lang="fr-FR" dirty="0"/>
-              <a:t>Inscription</a:t>
-            </a:r>
-          </a:p>
-          <a:p>
-            <a:r>
-              <a:rPr lang="fr-FR" dirty="0"/>
-              <a:t>La page panier</a:t>
-            </a:r>
-          </a:p>
-          <a:p>
+              <a:t>Idée du travail pour le TPI</a:t>
+            </a:r>
+          </a:p>
+          <a:p>
+            <a:pPr lvl="1"/>
+            <a:r>
+              <a:rPr lang="fr-FR" dirty="0"/>
+              <a:t>Être livré à nous-même </a:t>
+            </a:r>
+          </a:p>
+          <a:p>
+            <a:pPr lvl="1"/>
+            <a:r>
+              <a:rPr lang="fr-FR" dirty="0"/>
+              <a:t>Gérer une BD</a:t>
+            </a:r>
+          </a:p>
+          <a:p>
+            <a:pPr marL="228600" lvl="1" indent="0">
+              <a:buNone/>
+            </a:pPr>
             <a:endParaRPr lang="fr-FR" dirty="0"/>
           </a:p>
         </p:txBody>
@@ -4867,7 +4804,7 @@
     </p:spTree>
     <p:extLst>
       <p:ext uri="{BB962C8B-B14F-4D97-AF65-F5344CB8AC3E}">
-        <p14:creationId xmlns:p14="http://schemas.microsoft.com/office/powerpoint/2010/main" val="468785405"/>
+        <p14:creationId xmlns:p14="http://schemas.microsoft.com/office/powerpoint/2010/main" val="3359474809"/>
       </p:ext>
     </p:extLst>
   </p:cSld>
@@ -4899,7 +4836,7 @@
           <p:cNvPr id="2" name="Titre 1">
             <a:extLst>
               <a:ext uri="{FF2B5EF4-FFF2-40B4-BE49-F238E27FC236}">
-                <a16:creationId xmlns:a16="http://schemas.microsoft.com/office/drawing/2014/main" id="{0E82B77D-52EB-DE42-BCB7-23DAABC22538}"/>
+                <a16:creationId xmlns:a16="http://schemas.microsoft.com/office/drawing/2014/main" id="{A22F2ABD-3983-EF44-9443-E6F8FD3979E8}"/>
               </a:ext>
             </a:extLst>
           </p:cNvPr>
@@ -4927,7 +4864,7 @@
           <p:cNvPr id="3" name="Espace réservé du contenu 2">
             <a:extLst>
               <a:ext uri="{FF2B5EF4-FFF2-40B4-BE49-F238E27FC236}">
-                <a16:creationId xmlns:a16="http://schemas.microsoft.com/office/drawing/2014/main" id="{C50BA94D-F8E4-8942-84DA-A7DD7E5EFFF1}"/>
+                <a16:creationId xmlns:a16="http://schemas.microsoft.com/office/drawing/2014/main" id="{1CFB1B20-31C7-9F4B-B913-314482C35B21}"/>
               </a:ext>
             </a:extLst>
           </p:cNvPr>
@@ -4945,36 +4882,56 @@
           <a:p>
             <a:r>
               <a:rPr lang="fr-FR" dirty="0"/>
-              <a:t>Partie administrateur</a:t>
+              <a:t>Page d’accueil</a:t>
+            </a:r>
+          </a:p>
+          <a:p>
+            <a:r>
+              <a:rPr lang="fr-FR" dirty="0"/>
+              <a:t>La page article </a:t>
+            </a:r>
+          </a:p>
+          <a:p>
+            <a:r>
+              <a:rPr lang="fr-FR" dirty="0"/>
+              <a:t>Page d’ajout d’article dans le panier</a:t>
+            </a:r>
+          </a:p>
+          <a:p>
+            <a:r>
+              <a:rPr lang="fr-FR" dirty="0"/>
+              <a:t>Utilisateurs</a:t>
             </a:r>
           </a:p>
           <a:p>
             <a:pPr lvl="1"/>
             <a:r>
               <a:rPr lang="fr-FR" dirty="0"/>
-              <a:t>Application mobile </a:t>
+              <a:t>Connexion</a:t>
             </a:r>
           </a:p>
           <a:p>
             <a:pPr lvl="1"/>
             <a:r>
               <a:rPr lang="fr-FR" dirty="0"/>
-              <a:t>Gérer les articles</a:t>
-            </a:r>
-          </a:p>
-          <a:p>
-            <a:pPr lvl="1"/>
-            <a:r>
-              <a:rPr lang="fr-FR" dirty="0"/>
-              <a:t>Ajouter des articles </a:t>
-            </a:r>
+              <a:t>Inscription</a:t>
+            </a:r>
+          </a:p>
+          <a:p>
+            <a:r>
+              <a:rPr lang="fr-FR" dirty="0"/>
+              <a:t>La page panier</a:t>
+            </a:r>
+          </a:p>
+          <a:p>
+            <a:endParaRPr lang="fr-FR" dirty="0"/>
           </a:p>
         </p:txBody>
       </p:sp>
     </p:spTree>
     <p:extLst>
       <p:ext uri="{BB962C8B-B14F-4D97-AF65-F5344CB8AC3E}">
-        <p14:creationId xmlns:p14="http://schemas.microsoft.com/office/powerpoint/2010/main" val="3558332106"/>
+        <p14:creationId xmlns:p14="http://schemas.microsoft.com/office/powerpoint/2010/main" val="468785405"/>
       </p:ext>
     </p:extLst>
   </p:cSld>
@@ -5006,7 +4963,7 @@
           <p:cNvPr id="2" name="Titre 1">
             <a:extLst>
               <a:ext uri="{FF2B5EF4-FFF2-40B4-BE49-F238E27FC236}">
-                <a16:creationId xmlns:a16="http://schemas.microsoft.com/office/drawing/2014/main" id="{DA302929-B9F4-4B44-BABB-0DA6E5EA3E50}"/>
+                <a16:creationId xmlns:a16="http://schemas.microsoft.com/office/drawing/2014/main" id="{0E82B77D-52EB-DE42-BCB7-23DAABC22538}"/>
               </a:ext>
             </a:extLst>
           </p:cNvPr>
@@ -5024,7 +4981,7 @@
           <a:p>
             <a:r>
               <a:rPr lang="fr-FR" dirty="0"/>
-              <a:t>Objectifs non atteints </a:t>
+              <a:t>Objectifs atteints</a:t>
             </a:r>
           </a:p>
         </p:txBody>
@@ -5034,7 +4991,7 @@
           <p:cNvPr id="3" name="Espace réservé du contenu 2">
             <a:extLst>
               <a:ext uri="{FF2B5EF4-FFF2-40B4-BE49-F238E27FC236}">
-                <a16:creationId xmlns:a16="http://schemas.microsoft.com/office/drawing/2014/main" id="{465EF24C-D727-224E-9AA4-C2650F4B6A79}"/>
+                <a16:creationId xmlns:a16="http://schemas.microsoft.com/office/drawing/2014/main" id="{C50BA94D-F8E4-8942-84DA-A7DD7E5EFFF1}"/>
               </a:ext>
             </a:extLst>
           </p:cNvPr>
@@ -5052,19 +5009,28 @@
           <a:p>
             <a:r>
               <a:rPr lang="fr-FR" dirty="0"/>
-              <a:t>La page contact </a:t>
-            </a:r>
-          </a:p>
-          <a:p>
-            <a:r>
-              <a:rPr lang="fr-FR" dirty="0"/>
-              <a:t>Contrôler les valeurs </a:t>
-            </a:r>
-          </a:p>
-          <a:p>
-            <a:r>
-              <a:rPr lang="fr-FR" dirty="0"/>
-              <a:t>Contrôler les données</a:t>
+              <a:t>Partie administrateur</a:t>
+            </a:r>
+          </a:p>
+          <a:p>
+            <a:pPr lvl="1"/>
+            <a:r>
+              <a:rPr lang="fr-FR" dirty="0"/>
+              <a:t>Application mobile </a:t>
+            </a:r>
+          </a:p>
+          <a:p>
+            <a:pPr lvl="1"/>
+            <a:r>
+              <a:rPr lang="fr-FR" dirty="0"/>
+              <a:t>Gérer les articles</a:t>
+            </a:r>
+          </a:p>
+          <a:p>
+            <a:pPr lvl="1"/>
+            <a:r>
+              <a:rPr lang="fr-FR" dirty="0"/>
+              <a:t>Ajouter des articles </a:t>
             </a:r>
           </a:p>
         </p:txBody>
@@ -5072,7 +5038,7 @@
     </p:spTree>
     <p:extLst>
       <p:ext uri="{BB962C8B-B14F-4D97-AF65-F5344CB8AC3E}">
-        <p14:creationId xmlns:p14="http://schemas.microsoft.com/office/powerpoint/2010/main" val="2321760377"/>
+        <p14:creationId xmlns:p14="http://schemas.microsoft.com/office/powerpoint/2010/main" val="3558332106"/>
       </p:ext>
     </p:extLst>
   </p:cSld>
@@ -5104,6 +5070,104 @@
           <p:cNvPr id="2" name="Titre 1">
             <a:extLst>
               <a:ext uri="{FF2B5EF4-FFF2-40B4-BE49-F238E27FC236}">
+                <a16:creationId xmlns:a16="http://schemas.microsoft.com/office/drawing/2014/main" id="{DA302929-B9F4-4B44-BABB-0DA6E5EA3E50}"/>
+              </a:ext>
+            </a:extLst>
+          </p:cNvPr>
+          <p:cNvSpPr>
+            <a:spLocks noGrp="1"/>
+          </p:cNvSpPr>
+          <p:nvPr>
+            <p:ph type="title"/>
+          </p:nvPr>
+        </p:nvSpPr>
+        <p:spPr/>
+        <p:txBody>
+          <a:bodyPr/>
+          <a:lstStyle/>
+          <a:p>
+            <a:r>
+              <a:rPr lang="fr-FR" dirty="0"/>
+              <a:t>Objectifs non atteints </a:t>
+            </a:r>
+          </a:p>
+        </p:txBody>
+      </p:sp>
+      <p:sp>
+        <p:nvSpPr>
+          <p:cNvPr id="3" name="Espace réservé du contenu 2">
+            <a:extLst>
+              <a:ext uri="{FF2B5EF4-FFF2-40B4-BE49-F238E27FC236}">
+                <a16:creationId xmlns:a16="http://schemas.microsoft.com/office/drawing/2014/main" id="{465EF24C-D727-224E-9AA4-C2650F4B6A79}"/>
+              </a:ext>
+            </a:extLst>
+          </p:cNvPr>
+          <p:cNvSpPr>
+            <a:spLocks noGrp="1"/>
+          </p:cNvSpPr>
+          <p:nvPr>
+            <p:ph idx="1"/>
+          </p:nvPr>
+        </p:nvSpPr>
+        <p:spPr/>
+        <p:txBody>
+          <a:bodyPr/>
+          <a:lstStyle/>
+          <a:p>
+            <a:r>
+              <a:rPr lang="fr-FR" dirty="0"/>
+              <a:t>La page contact </a:t>
+            </a:r>
+          </a:p>
+          <a:p>
+            <a:r>
+              <a:rPr lang="fr-FR" dirty="0"/>
+              <a:t>Contrôler les valeurs </a:t>
+            </a:r>
+          </a:p>
+          <a:p>
+            <a:r>
+              <a:rPr lang="fr-FR" dirty="0"/>
+              <a:t>Contrôler les données</a:t>
+            </a:r>
+          </a:p>
+        </p:txBody>
+      </p:sp>
+    </p:spTree>
+    <p:extLst>
+      <p:ext uri="{BB962C8B-B14F-4D97-AF65-F5344CB8AC3E}">
+        <p14:creationId xmlns:p14="http://schemas.microsoft.com/office/powerpoint/2010/main" val="2321760377"/>
+      </p:ext>
+    </p:extLst>
+  </p:cSld>
+  <p:clrMapOvr>
+    <a:masterClrMapping/>
+  </p:clrMapOvr>
+</p:sld>
+</file>
+
+<file path=ppt/slides/slide18.xml><?xml version="1.0" encoding="utf-8"?>
+<p:sld xmlns:a="http://schemas.openxmlformats.org/drawingml/2006/main" xmlns:r="http://schemas.openxmlformats.org/officeDocument/2006/relationships" xmlns:p="http://schemas.openxmlformats.org/presentationml/2006/main">
+  <p:cSld>
+    <p:spTree>
+      <p:nvGrpSpPr>
+        <p:cNvPr id="1" name=""/>
+        <p:cNvGrpSpPr/>
+        <p:nvPr/>
+      </p:nvGrpSpPr>
+      <p:grpSpPr>
+        <a:xfrm>
+          <a:off x="0" y="0"/>
+          <a:ext cx="0" cy="0"/>
+          <a:chOff x="0" y="0"/>
+          <a:chExt cx="0" cy="0"/>
+        </a:xfrm>
+      </p:grpSpPr>
+      <p:sp>
+        <p:nvSpPr>
+          <p:cNvPr id="2" name="Titre 1">
+            <a:extLst>
+              <a:ext uri="{FF2B5EF4-FFF2-40B4-BE49-F238E27FC236}">
                 <a16:creationId xmlns:a16="http://schemas.microsoft.com/office/drawing/2014/main" id="{B1DD6B8A-0932-E943-8A9A-ED5538239F7D}"/>
               </a:ext>
             </a:extLst>
@@ -5186,7 +5250,7 @@
 </p:sld>
 </file>
 
-<file path=ppt/slides/slide18.xml><?xml version="1.0" encoding="utf-8"?>
+<file path=ppt/slides/slide19.xml><?xml version="1.0" encoding="utf-8"?>
 <p:sld xmlns:a="http://schemas.openxmlformats.org/drawingml/2006/main" xmlns:r="http://schemas.openxmlformats.org/officeDocument/2006/relationships" xmlns:p="http://schemas.openxmlformats.org/presentationml/2006/main">
   <p:cSld>
     <p:spTree>
@@ -6813,7 +6877,7 @@
           <p:cNvPr id="2" name="Titre 1">
             <a:extLst>
               <a:ext uri="{FF2B5EF4-FFF2-40B4-BE49-F238E27FC236}">
-                <a16:creationId xmlns:a16="http://schemas.microsoft.com/office/drawing/2014/main" id="{3AEED063-FBBD-1A41-89BB-234AC43026BF}"/>
+                <a16:creationId xmlns:a16="http://schemas.microsoft.com/office/drawing/2014/main" id="{DA1A299F-9E3F-3643-AE7C-FF941A5F7082}"/>
               </a:ext>
             </a:extLst>
           </p:cNvPr>
@@ -6824,27 +6888,44 @@
             <p:ph type="title"/>
           </p:nvPr>
         </p:nvSpPr>
-        <p:spPr>
-          <a:xfrm>
-            <a:off x="2293889" y="2784528"/>
-            <a:ext cx="7729728" cy="1188720"/>
-          </a:xfrm>
-        </p:spPr>
-        <p:txBody>
-          <a:bodyPr/>
-          <a:lstStyle/>
-          <a:p>
-            <a:r>
-              <a:rPr lang="fr-FR" dirty="0"/>
-              <a:t>Application mobile</a:t>
-            </a:r>
+        <p:spPr/>
+        <p:txBody>
+          <a:bodyPr/>
+          <a:lstStyle/>
+          <a:p>
+            <a:endParaRPr lang="fr-FR"/>
+          </a:p>
+        </p:txBody>
+      </p:sp>
+      <p:sp>
+        <p:nvSpPr>
+          <p:cNvPr id="7" name="Espace réservé du contenu 6">
+            <a:extLst>
+              <a:ext uri="{FF2B5EF4-FFF2-40B4-BE49-F238E27FC236}">
+                <a16:creationId xmlns:a16="http://schemas.microsoft.com/office/drawing/2014/main" id="{147AFA3D-16DC-1742-A2AC-8DB3C9BBA0F7}"/>
+              </a:ext>
+            </a:extLst>
+          </p:cNvPr>
+          <p:cNvSpPr>
+            <a:spLocks noGrp="1"/>
+          </p:cNvSpPr>
+          <p:nvPr>
+            <p:ph idx="1"/>
+          </p:nvPr>
+        </p:nvSpPr>
+        <p:spPr/>
+        <p:txBody>
+          <a:bodyPr/>
+          <a:lstStyle/>
+          <a:p>
+            <a:endParaRPr lang="fr-FR"/>
           </a:p>
         </p:txBody>
       </p:sp>
     </p:spTree>
     <p:extLst>
       <p:ext uri="{BB962C8B-B14F-4D97-AF65-F5344CB8AC3E}">
-        <p14:creationId xmlns:p14="http://schemas.microsoft.com/office/powerpoint/2010/main" val="3063361243"/>
+        <p14:creationId xmlns:p14="http://schemas.microsoft.com/office/powerpoint/2010/main" val="1259435917"/>
       </p:ext>
     </p:extLst>
   </p:cSld>

</xml_diff>

<commit_message>
Ajout de choses dans la présentation
</commit_message>
<xml_diff>
--- a/Documentation/Présentation.pptx
+++ b/Documentation/Présentation.pptx
@@ -4380,10 +4380,10 @@
       </p:grpSpPr>
       <p:pic>
         <p:nvPicPr>
-          <p:cNvPr id="3" name="Image 2">
+          <p:cNvPr id="4" name="Image 3">
             <a:extLst>
               <a:ext uri="{FF2B5EF4-FFF2-40B4-BE49-F238E27FC236}">
-                <a16:creationId xmlns:a16="http://schemas.microsoft.com/office/drawing/2014/main" id="{D2638732-68B5-0243-9267-4CC7E40E076D}"/>
+                <a16:creationId xmlns:a16="http://schemas.microsoft.com/office/drawing/2014/main" id="{DD4508D1-8E88-5C42-BC08-D3200B226A71}"/>
               </a:ext>
             </a:extLst>
           </p:cNvPr>
@@ -4400,8 +4400,8 @@
         </p:blipFill>
         <p:spPr>
           <a:xfrm>
-            <a:off x="1103168" y="430069"/>
-            <a:ext cx="9620250" cy="6057194"/>
+            <a:off x="1005443" y="441943"/>
+            <a:ext cx="10054853" cy="6053859"/>
           </a:xfrm>
           <a:prstGeom prst="rect">
             <a:avLst/>
@@ -6893,35 +6893,41 @@
           <a:bodyPr/>
           <a:lstStyle/>
           <a:p>
-            <a:endParaRPr lang="fr-FR"/>
-          </a:p>
-        </p:txBody>
-      </p:sp>
-      <p:sp>
-        <p:nvSpPr>
-          <p:cNvPr id="7" name="Espace réservé du contenu 6">
+            <a:r>
+              <a:rPr lang="fr-FR" dirty="0"/>
+              <a:t>Schéma</a:t>
+            </a:r>
+          </a:p>
+        </p:txBody>
+      </p:sp>
+      <p:pic>
+        <p:nvPicPr>
+          <p:cNvPr id="4" name="Espace réservé du contenu 3">
             <a:extLst>
               <a:ext uri="{FF2B5EF4-FFF2-40B4-BE49-F238E27FC236}">
-                <a16:creationId xmlns:a16="http://schemas.microsoft.com/office/drawing/2014/main" id="{147AFA3D-16DC-1742-A2AC-8DB3C9BBA0F7}"/>
+                <a16:creationId xmlns:a16="http://schemas.microsoft.com/office/drawing/2014/main" id="{5A442F8F-2624-E44C-B318-B490127F84B4}"/>
               </a:ext>
             </a:extLst>
           </p:cNvPr>
-          <p:cNvSpPr>
-            <a:spLocks noGrp="1"/>
-          </p:cNvSpPr>
+          <p:cNvPicPr>
+            <a:picLocks noGrp="1" noChangeAspect="1"/>
+          </p:cNvPicPr>
           <p:nvPr>
             <p:ph idx="1"/>
           </p:nvPr>
-        </p:nvSpPr>
-        <p:spPr/>
-        <p:txBody>
-          <a:bodyPr/>
-          <a:lstStyle/>
-          <a:p>
-            <a:endParaRPr lang="fr-FR"/>
-          </a:p>
-        </p:txBody>
-      </p:sp>
+        </p:nvPicPr>
+        <p:blipFill rotWithShape="1">
+          <a:blip r:embed="rId2"/>
+          <a:srcRect l="1159" t="2172" r="1270" b="5863"/>
+          <a:stretch/>
+        </p:blipFill>
+        <p:spPr>
+          <a:xfrm>
+            <a:off x="0" y="3099457"/>
+            <a:ext cx="12221957" cy="1674422"/>
+          </a:xfrm>
+        </p:spPr>
+      </p:pic>
     </p:spTree>
     <p:extLst>
       <p:ext uri="{BB962C8B-B14F-4D97-AF65-F5344CB8AC3E}">

</xml_diff>